<commit_message>
Revisions just prior to MQTT talk at Music City Code on 2017-06-03
</commit_message>
<xml_diff>
--- a/LightweightPubSub.pptx
+++ b/LightweightPubSub.pptx
@@ -156,6 +156,10 @@
     </p:ext>
   </p:extLst>
 </p:presentation>
+</file>
+
+<file path=ppt/revisionInfo.xml><?xml version="1.0" encoding="utf-8"?>
+<p1510:revInfo xmlns:a="http://schemas.openxmlformats.org/drawingml/2006/main" xmlns:r="http://schemas.openxmlformats.org/officeDocument/2006/relationships" xmlns:p1510="http://schemas.microsoft.com/office/powerpoint/2015/10/main"/>
 </file>
 
 <file path=ppt/diagrams/colors1.xml><?xml version="1.0" encoding="utf-8"?>
@@ -11720,6 +11724,151 @@
           </a:p>
         </p:txBody>
       </p:sp>
+      <p:sp>
+        <p:nvSpPr>
+          <p:cNvPr id="2" name="TextBox 1">
+            <a:extLst>
+              <a:ext uri="{FF2B5EF4-FFF2-40B4-BE49-F238E27FC236}">
+                <a16:creationId xmlns:a16="http://schemas.microsoft.com/office/drawing/2014/main" id="{9E576527-75CB-44B3-9499-246128C39D81}"/>
+              </a:ext>
+            </a:extLst>
+          </p:cNvPr>
+          <p:cNvSpPr txBox="1"/>
+          <p:nvPr/>
+        </p:nvSpPr>
+        <p:spPr>
+          <a:xfrm>
+            <a:off x="5187936" y="1496858"/>
+            <a:ext cx="1775038" cy="1754326"/>
+          </a:xfrm>
+          <a:prstGeom prst="rect">
+            <a:avLst/>
+          </a:prstGeom>
+          <a:noFill/>
+        </p:spPr>
+        <p:txBody>
+          <a:bodyPr wrap="none" rtlCol="0">
+            <a:spAutoFit/>
+          </a:bodyPr>
+          <a:lstStyle/>
+          <a:p>
+            <a:r>
+              <a:rPr lang="en-US" dirty="0"/>
+              <a:t>readings/403539</a:t>
+            </a:r>
+            <a:br>
+              <a:rPr lang="en-US" dirty="0"/>
+            </a:br>
+            <a:r>
+              <a:rPr lang="en-US" dirty="0"/>
+              <a:t>{ </a:t>
+            </a:r>
+            <a:br>
+              <a:rPr lang="en-US" dirty="0"/>
+            </a:br>
+            <a:r>
+              <a:rPr lang="en-US" dirty="0"/>
+              <a:t>  "t": 2471,</a:t>
+            </a:r>
+            <a:br>
+              <a:rPr lang="en-US" dirty="0"/>
+            </a:br>
+            <a:r>
+              <a:rPr lang="en-US" dirty="0"/>
+              <a:t>  "h": 45681,</a:t>
+            </a:r>
+          </a:p>
+          <a:p>
+            <a:r>
+              <a:rPr lang="en-US" dirty="0"/>
+              <a:t>  "p": 998365</a:t>
+            </a:r>
+          </a:p>
+          <a:p>
+            <a:r>
+              <a:rPr lang="en-US" dirty="0"/>
+              <a:t>}</a:t>
+            </a:r>
+          </a:p>
+        </p:txBody>
+      </p:sp>
+      <p:sp>
+        <p:nvSpPr>
+          <p:cNvPr id="14" name="TextBox 13">
+            <a:extLst>
+              <a:ext uri="{FF2B5EF4-FFF2-40B4-BE49-F238E27FC236}">
+                <a16:creationId xmlns:a16="http://schemas.microsoft.com/office/drawing/2014/main" id="{F45F38E2-0996-489D-AA19-7CBBAFC38BA7}"/>
+              </a:ext>
+            </a:extLst>
+          </p:cNvPr>
+          <p:cNvSpPr txBox="1"/>
+          <p:nvPr/>
+        </p:nvSpPr>
+        <p:spPr>
+          <a:xfrm>
+            <a:off x="9780666" y="3345921"/>
+            <a:ext cx="1775038" cy="646331"/>
+          </a:xfrm>
+          <a:prstGeom prst="rect">
+            <a:avLst/>
+          </a:prstGeom>
+          <a:noFill/>
+        </p:spPr>
+        <p:txBody>
+          <a:bodyPr wrap="none" rtlCol="0">
+            <a:spAutoFit/>
+          </a:bodyPr>
+          <a:lstStyle/>
+          <a:p>
+            <a:r>
+              <a:rPr lang="en-US" dirty="0"/>
+              <a:t>readings/403539</a:t>
+            </a:r>
+            <a:br>
+              <a:rPr lang="en-US" dirty="0"/>
+            </a:br>
+            <a:r>
+              <a:rPr lang="en-US" dirty="0"/>
+              <a:t>{ … }</a:t>
+            </a:r>
+          </a:p>
+        </p:txBody>
+      </p:sp>
+      <p:sp>
+        <p:nvSpPr>
+          <p:cNvPr id="3" name="TextBox 2">
+            <a:extLst>
+              <a:ext uri="{FF2B5EF4-FFF2-40B4-BE49-F238E27FC236}">
+                <a16:creationId xmlns:a16="http://schemas.microsoft.com/office/drawing/2014/main" id="{F1D1349F-CCDF-4CBD-B502-8FDC71DF7671}"/>
+              </a:ext>
+            </a:extLst>
+          </p:cNvPr>
+          <p:cNvSpPr txBox="1"/>
+          <p:nvPr/>
+        </p:nvSpPr>
+        <p:spPr>
+          <a:xfrm>
+            <a:off x="2863121" y="391801"/>
+            <a:ext cx="886781" cy="369332"/>
+          </a:xfrm>
+          <a:prstGeom prst="rect">
+            <a:avLst/>
+          </a:prstGeom>
+          <a:noFill/>
+        </p:spPr>
+        <p:txBody>
+          <a:bodyPr wrap="none" rtlCol="0">
+            <a:spAutoFit/>
+          </a:bodyPr>
+          <a:lstStyle/>
+          <a:p>
+            <a:r>
+              <a:rPr lang="en-US" dirty="0"/>
+              <a:t>403539</a:t>
+            </a:r>
+          </a:p>
+        </p:txBody>
+      </p:sp>
     </p:spTree>
     <p:extLst>
       <p:ext uri="{BB962C8B-B14F-4D97-AF65-F5344CB8AC3E}">
@@ -11730,6 +11879,496 @@
   <p:clrMapOvr>
     <a:masterClrMapping/>
   </p:clrMapOvr>
+  <p:timing>
+    <p:tnLst>
+      <p:par>
+        <p:cTn id="1" dur="indefinite" restart="never" nodeType="tmRoot">
+          <p:childTnLst>
+            <p:seq concurrent="1" nextAc="seek">
+              <p:cTn id="2" dur="indefinite" nodeType="mainSeq">
+                <p:childTnLst>
+                  <p:par>
+                    <p:cTn id="3" fill="hold">
+                      <p:stCondLst>
+                        <p:cond delay="indefinite"/>
+                      </p:stCondLst>
+                      <p:childTnLst>
+                        <p:par>
+                          <p:cTn id="4" fill="hold">
+                            <p:stCondLst>
+                              <p:cond delay="0"/>
+                            </p:stCondLst>
+                            <p:childTnLst>
+                              <p:par>
+                                <p:cTn id="5" presetID="1" presetClass="entr" presetSubtype="0" fill="hold" grpId="0" nodeType="clickEffect">
+                                  <p:stCondLst>
+                                    <p:cond delay="0"/>
+                                  </p:stCondLst>
+                                  <p:childTnLst>
+                                    <p:set>
+                                      <p:cBhvr>
+                                        <p:cTn id="6" dur="1" fill="hold">
+                                          <p:stCondLst>
+                                            <p:cond delay="0"/>
+                                          </p:stCondLst>
+                                        </p:cTn>
+                                        <p:tgtEl>
+                                          <p:spTgt spid="2"/>
+                                        </p:tgtEl>
+                                        <p:attrNameLst>
+                                          <p:attrName>style.visibility</p:attrName>
+                                        </p:attrNameLst>
+                                      </p:cBhvr>
+                                      <p:to>
+                                        <p:strVal val="visible"/>
+                                      </p:to>
+                                    </p:set>
+                                  </p:childTnLst>
+                                </p:cTn>
+                              </p:par>
+                              <p:par>
+                                <p:cTn id="7" presetID="1" presetClass="entr" presetSubtype="0" fill="hold" grpId="0" nodeType="withEffect">
+                                  <p:stCondLst>
+                                    <p:cond delay="0"/>
+                                  </p:stCondLst>
+                                  <p:childTnLst>
+                                    <p:set>
+                                      <p:cBhvr>
+                                        <p:cTn id="8" dur="1" fill="hold">
+                                          <p:stCondLst>
+                                            <p:cond delay="0"/>
+                                          </p:stCondLst>
+                                        </p:cTn>
+                                        <p:tgtEl>
+                                          <p:spTgt spid="12"/>
+                                        </p:tgtEl>
+                                        <p:attrNameLst>
+                                          <p:attrName>style.visibility</p:attrName>
+                                        </p:attrNameLst>
+                                      </p:cBhvr>
+                                      <p:to>
+                                        <p:strVal val="visible"/>
+                                      </p:to>
+                                    </p:set>
+                                  </p:childTnLst>
+                                </p:cTn>
+                              </p:par>
+                            </p:childTnLst>
+                          </p:cTn>
+                        </p:par>
+                      </p:childTnLst>
+                    </p:cTn>
+                  </p:par>
+                  <p:par>
+                    <p:cTn id="9" fill="hold">
+                      <p:stCondLst>
+                        <p:cond delay="indefinite"/>
+                      </p:stCondLst>
+                      <p:childTnLst>
+                        <p:par>
+                          <p:cTn id="10" fill="hold">
+                            <p:stCondLst>
+                              <p:cond delay="0"/>
+                            </p:stCondLst>
+                            <p:childTnLst>
+                              <p:par>
+                                <p:cTn id="11" presetID="10" presetClass="exit" presetSubtype="0" fill="hold" grpId="1" nodeType="clickEffect">
+                                  <p:stCondLst>
+                                    <p:cond delay="0"/>
+                                  </p:stCondLst>
+                                  <p:childTnLst>
+                                    <p:animEffect transition="out" filter="fade">
+                                      <p:cBhvr>
+                                        <p:cTn id="12" dur="500"/>
+                                        <p:tgtEl>
+                                          <p:spTgt spid="2"/>
+                                        </p:tgtEl>
+                                      </p:cBhvr>
+                                    </p:animEffect>
+                                    <p:set>
+                                      <p:cBhvr>
+                                        <p:cTn id="13" dur="1" fill="hold">
+                                          <p:stCondLst>
+                                            <p:cond delay="499"/>
+                                          </p:stCondLst>
+                                        </p:cTn>
+                                        <p:tgtEl>
+                                          <p:spTgt spid="2"/>
+                                        </p:tgtEl>
+                                        <p:attrNameLst>
+                                          <p:attrName>style.visibility</p:attrName>
+                                        </p:attrNameLst>
+                                      </p:cBhvr>
+                                      <p:to>
+                                        <p:strVal val="hidden"/>
+                                      </p:to>
+                                    </p:set>
+                                  </p:childTnLst>
+                                </p:cTn>
+                              </p:par>
+                              <p:par>
+                                <p:cTn id="14" presetID="10" presetClass="exit" presetSubtype="0" fill="hold" grpId="1" nodeType="withEffect">
+                                  <p:stCondLst>
+                                    <p:cond delay="0"/>
+                                  </p:stCondLst>
+                                  <p:childTnLst>
+                                    <p:animEffect transition="out" filter="fade">
+                                      <p:cBhvr>
+                                        <p:cTn id="15" dur="500"/>
+                                        <p:tgtEl>
+                                          <p:spTgt spid="12"/>
+                                        </p:tgtEl>
+                                      </p:cBhvr>
+                                    </p:animEffect>
+                                    <p:set>
+                                      <p:cBhvr>
+                                        <p:cTn id="16" dur="1" fill="hold">
+                                          <p:stCondLst>
+                                            <p:cond delay="499"/>
+                                          </p:stCondLst>
+                                        </p:cTn>
+                                        <p:tgtEl>
+                                          <p:spTgt spid="12"/>
+                                        </p:tgtEl>
+                                        <p:attrNameLst>
+                                          <p:attrName>style.visibility</p:attrName>
+                                        </p:attrNameLst>
+                                      </p:cBhvr>
+                                      <p:to>
+                                        <p:strVal val="hidden"/>
+                                      </p:to>
+                                    </p:set>
+                                  </p:childTnLst>
+                                </p:cTn>
+                              </p:par>
+                            </p:childTnLst>
+                          </p:cTn>
+                        </p:par>
+                      </p:childTnLst>
+                    </p:cTn>
+                  </p:par>
+                  <p:par>
+                    <p:cTn id="17" fill="hold">
+                      <p:stCondLst>
+                        <p:cond delay="indefinite"/>
+                      </p:stCondLst>
+                      <p:childTnLst>
+                        <p:par>
+                          <p:cTn id="18" fill="hold">
+                            <p:stCondLst>
+                              <p:cond delay="0"/>
+                            </p:stCondLst>
+                            <p:childTnLst>
+                              <p:par>
+                                <p:cTn id="19" presetID="1" presetClass="entr" presetSubtype="0" fill="hold" grpId="0" nodeType="clickEffect">
+                                  <p:stCondLst>
+                                    <p:cond delay="0"/>
+                                  </p:stCondLst>
+                                  <p:childTnLst>
+                                    <p:set>
+                                      <p:cBhvr>
+                                        <p:cTn id="20" dur="1" fill="hold">
+                                          <p:stCondLst>
+                                            <p:cond delay="0"/>
+                                          </p:stCondLst>
+                                        </p:cTn>
+                                        <p:tgtEl>
+                                          <p:spTgt spid="13"/>
+                                        </p:tgtEl>
+                                        <p:attrNameLst>
+                                          <p:attrName>style.visibility</p:attrName>
+                                        </p:attrNameLst>
+                                      </p:cBhvr>
+                                      <p:to>
+                                        <p:strVal val="visible"/>
+                                      </p:to>
+                                    </p:set>
+                                  </p:childTnLst>
+                                </p:cTn>
+                              </p:par>
+                              <p:par>
+                                <p:cTn id="21" presetID="1" presetClass="entr" presetSubtype="0" fill="hold" grpId="0" nodeType="withEffect">
+                                  <p:stCondLst>
+                                    <p:cond delay="0"/>
+                                  </p:stCondLst>
+                                  <p:childTnLst>
+                                    <p:set>
+                                      <p:cBhvr>
+                                        <p:cTn id="22" dur="1" fill="hold">
+                                          <p:stCondLst>
+                                            <p:cond delay="0"/>
+                                          </p:stCondLst>
+                                        </p:cTn>
+                                        <p:tgtEl>
+                                          <p:spTgt spid="14"/>
+                                        </p:tgtEl>
+                                        <p:attrNameLst>
+                                          <p:attrName>style.visibility</p:attrName>
+                                        </p:attrNameLst>
+                                      </p:cBhvr>
+                                      <p:to>
+                                        <p:strVal val="visible"/>
+                                      </p:to>
+                                    </p:set>
+                                  </p:childTnLst>
+                                </p:cTn>
+                              </p:par>
+                            </p:childTnLst>
+                          </p:cTn>
+                        </p:par>
+                      </p:childTnLst>
+                    </p:cTn>
+                  </p:par>
+                  <p:par>
+                    <p:cTn id="23" fill="hold">
+                      <p:stCondLst>
+                        <p:cond delay="indefinite"/>
+                      </p:stCondLst>
+                      <p:childTnLst>
+                        <p:par>
+                          <p:cTn id="24" fill="hold">
+                            <p:stCondLst>
+                              <p:cond delay="0"/>
+                            </p:stCondLst>
+                            <p:childTnLst>
+                              <p:par>
+                                <p:cTn id="25" presetID="10" presetClass="exit" presetSubtype="0" fill="hold" grpId="1" nodeType="clickEffect">
+                                  <p:stCondLst>
+                                    <p:cond delay="0"/>
+                                  </p:stCondLst>
+                                  <p:childTnLst>
+                                    <p:animEffect transition="out" filter="fade">
+                                      <p:cBhvr>
+                                        <p:cTn id="26" dur="500"/>
+                                        <p:tgtEl>
+                                          <p:spTgt spid="13"/>
+                                        </p:tgtEl>
+                                      </p:cBhvr>
+                                    </p:animEffect>
+                                    <p:set>
+                                      <p:cBhvr>
+                                        <p:cTn id="27" dur="1" fill="hold">
+                                          <p:stCondLst>
+                                            <p:cond delay="499"/>
+                                          </p:stCondLst>
+                                        </p:cTn>
+                                        <p:tgtEl>
+                                          <p:spTgt spid="13"/>
+                                        </p:tgtEl>
+                                        <p:attrNameLst>
+                                          <p:attrName>style.visibility</p:attrName>
+                                        </p:attrNameLst>
+                                      </p:cBhvr>
+                                      <p:to>
+                                        <p:strVal val="hidden"/>
+                                      </p:to>
+                                    </p:set>
+                                  </p:childTnLst>
+                                </p:cTn>
+                              </p:par>
+                              <p:par>
+                                <p:cTn id="28" presetID="10" presetClass="exit" presetSubtype="0" fill="hold" grpId="1" nodeType="withEffect">
+                                  <p:stCondLst>
+                                    <p:cond delay="0"/>
+                                  </p:stCondLst>
+                                  <p:childTnLst>
+                                    <p:animEffect transition="out" filter="fade">
+                                      <p:cBhvr>
+                                        <p:cTn id="29" dur="500"/>
+                                        <p:tgtEl>
+                                          <p:spTgt spid="14"/>
+                                        </p:tgtEl>
+                                      </p:cBhvr>
+                                    </p:animEffect>
+                                    <p:set>
+                                      <p:cBhvr>
+                                        <p:cTn id="30" dur="1" fill="hold">
+                                          <p:stCondLst>
+                                            <p:cond delay="499"/>
+                                          </p:stCondLst>
+                                        </p:cTn>
+                                        <p:tgtEl>
+                                          <p:spTgt spid="14"/>
+                                        </p:tgtEl>
+                                        <p:attrNameLst>
+                                          <p:attrName>style.visibility</p:attrName>
+                                        </p:attrNameLst>
+                                      </p:cBhvr>
+                                      <p:to>
+                                        <p:strVal val="hidden"/>
+                                      </p:to>
+                                    </p:set>
+                                  </p:childTnLst>
+                                </p:cTn>
+                              </p:par>
+                            </p:childTnLst>
+                          </p:cTn>
+                        </p:par>
+                      </p:childTnLst>
+                    </p:cTn>
+                  </p:par>
+                  <p:par>
+                    <p:cTn id="31" fill="hold">
+                      <p:stCondLst>
+                        <p:cond delay="indefinite"/>
+                      </p:stCondLst>
+                      <p:childTnLst>
+                        <p:par>
+                          <p:cTn id="32" fill="hold">
+                            <p:stCondLst>
+                              <p:cond delay="0"/>
+                            </p:stCondLst>
+                            <p:childTnLst>
+                              <p:par>
+                                <p:cTn id="33" presetID="1" presetClass="entr" presetSubtype="0" fill="hold" grpId="2" nodeType="clickEffect">
+                                  <p:stCondLst>
+                                    <p:cond delay="0"/>
+                                  </p:stCondLst>
+                                  <p:childTnLst>
+                                    <p:set>
+                                      <p:cBhvr>
+                                        <p:cTn id="34" dur="1" fill="hold">
+                                          <p:stCondLst>
+                                            <p:cond delay="0"/>
+                                          </p:stCondLst>
+                                        </p:cTn>
+                                        <p:tgtEl>
+                                          <p:spTgt spid="2"/>
+                                        </p:tgtEl>
+                                        <p:attrNameLst>
+                                          <p:attrName>style.visibility</p:attrName>
+                                        </p:attrNameLst>
+                                      </p:cBhvr>
+                                      <p:to>
+                                        <p:strVal val="visible"/>
+                                      </p:to>
+                                    </p:set>
+                                  </p:childTnLst>
+                                </p:cTn>
+                              </p:par>
+                              <p:par>
+                                <p:cTn id="35" presetID="1" presetClass="entr" presetSubtype="0" fill="hold" grpId="2" nodeType="withEffect">
+                                  <p:stCondLst>
+                                    <p:cond delay="0"/>
+                                  </p:stCondLst>
+                                  <p:childTnLst>
+                                    <p:set>
+                                      <p:cBhvr>
+                                        <p:cTn id="36" dur="1" fill="hold">
+                                          <p:stCondLst>
+                                            <p:cond delay="0"/>
+                                          </p:stCondLst>
+                                        </p:cTn>
+                                        <p:tgtEl>
+                                          <p:spTgt spid="12"/>
+                                        </p:tgtEl>
+                                        <p:attrNameLst>
+                                          <p:attrName>style.visibility</p:attrName>
+                                        </p:attrNameLst>
+                                      </p:cBhvr>
+                                      <p:to>
+                                        <p:strVal val="visible"/>
+                                      </p:to>
+                                    </p:set>
+                                  </p:childTnLst>
+                                </p:cTn>
+                              </p:par>
+                              <p:par>
+                                <p:cTn id="37" presetID="1" presetClass="entr" presetSubtype="0" fill="hold" grpId="2" nodeType="withEffect">
+                                  <p:stCondLst>
+                                    <p:cond delay="0"/>
+                                  </p:stCondLst>
+                                  <p:childTnLst>
+                                    <p:set>
+                                      <p:cBhvr>
+                                        <p:cTn id="38" dur="1" fill="hold">
+                                          <p:stCondLst>
+                                            <p:cond delay="0"/>
+                                          </p:stCondLst>
+                                        </p:cTn>
+                                        <p:tgtEl>
+                                          <p:spTgt spid="13"/>
+                                        </p:tgtEl>
+                                        <p:attrNameLst>
+                                          <p:attrName>style.visibility</p:attrName>
+                                        </p:attrNameLst>
+                                      </p:cBhvr>
+                                      <p:to>
+                                        <p:strVal val="visible"/>
+                                      </p:to>
+                                    </p:set>
+                                  </p:childTnLst>
+                                </p:cTn>
+                              </p:par>
+                              <p:par>
+                                <p:cTn id="39" presetID="1" presetClass="entr" presetSubtype="0" fill="hold" grpId="2" nodeType="withEffect">
+                                  <p:stCondLst>
+                                    <p:cond delay="0"/>
+                                  </p:stCondLst>
+                                  <p:childTnLst>
+                                    <p:set>
+                                      <p:cBhvr>
+                                        <p:cTn id="40" dur="1" fill="hold">
+                                          <p:stCondLst>
+                                            <p:cond delay="0"/>
+                                          </p:stCondLst>
+                                        </p:cTn>
+                                        <p:tgtEl>
+                                          <p:spTgt spid="14"/>
+                                        </p:tgtEl>
+                                        <p:attrNameLst>
+                                          <p:attrName>style.visibility</p:attrName>
+                                        </p:attrNameLst>
+                                      </p:cBhvr>
+                                      <p:to>
+                                        <p:strVal val="visible"/>
+                                      </p:to>
+                                    </p:set>
+                                  </p:childTnLst>
+                                </p:cTn>
+                              </p:par>
+                            </p:childTnLst>
+                          </p:cTn>
+                        </p:par>
+                      </p:childTnLst>
+                    </p:cTn>
+                  </p:par>
+                </p:childTnLst>
+              </p:cTn>
+              <p:prevCondLst>
+                <p:cond evt="onPrev" delay="0">
+                  <p:tgtEl>
+                    <p:sldTgt/>
+                  </p:tgtEl>
+                </p:cond>
+              </p:prevCondLst>
+              <p:nextCondLst>
+                <p:cond evt="onNext" delay="0">
+                  <p:tgtEl>
+                    <p:sldTgt/>
+                  </p:tgtEl>
+                </p:cond>
+              </p:nextCondLst>
+            </p:seq>
+          </p:childTnLst>
+        </p:cTn>
+      </p:par>
+    </p:tnLst>
+    <p:bldLst>
+      <p:bldP spid="12" grpId="0" animBg="1"/>
+      <p:bldP spid="12" grpId="1" animBg="1"/>
+      <p:bldP spid="12" grpId="2" animBg="1"/>
+      <p:bldP spid="13" grpId="0" animBg="1"/>
+      <p:bldP spid="13" grpId="1" animBg="1"/>
+      <p:bldP spid="13" grpId="2" animBg="1"/>
+      <p:bldP spid="2" grpId="0"/>
+      <p:bldP spid="2" grpId="1"/>
+      <p:bldP spid="2" grpId="2"/>
+      <p:bldP spid="14" grpId="0"/>
+      <p:bldP spid="14" grpId="1"/>
+      <p:bldP spid="14" grpId="2"/>
+    </p:bldLst>
+  </p:timing>
 </p:sld>
 </file>
 

</xml_diff>

<commit_message>
Revisions for Beer City Code
</commit_message>
<xml_diff>
--- a/LightweightPubSub.pptx
+++ b/LightweightPubSub.pptx
@@ -5,7 +5,7 @@
     <p:sldMasterId id="2147483648" r:id="rId1"/>
   </p:sldMasterIdLst>
   <p:notesMasterIdLst>
-    <p:notesMasterId r:id="rId46"/>
+    <p:notesMasterId r:id="rId50"/>
   </p:notesMasterIdLst>
   <p:sldIdLst>
     <p:sldId id="256" r:id="rId2"/>
@@ -36,22 +36,26 @@
     <p:sldId id="295" r:id="rId27"/>
     <p:sldId id="274" r:id="rId28"/>
     <p:sldId id="265" r:id="rId29"/>
-    <p:sldId id="296" r:id="rId30"/>
-    <p:sldId id="275" r:id="rId31"/>
-    <p:sldId id="306" r:id="rId32"/>
-    <p:sldId id="297" r:id="rId33"/>
-    <p:sldId id="300" r:id="rId34"/>
-    <p:sldId id="301" r:id="rId35"/>
-    <p:sldId id="302" r:id="rId36"/>
-    <p:sldId id="298" r:id="rId37"/>
-    <p:sldId id="287" r:id="rId38"/>
-    <p:sldId id="289" r:id="rId39"/>
-    <p:sldId id="310" r:id="rId40"/>
-    <p:sldId id="312" r:id="rId41"/>
-    <p:sldId id="311" r:id="rId42"/>
-    <p:sldId id="309" r:id="rId43"/>
-    <p:sldId id="308" r:id="rId44"/>
-    <p:sldId id="282" r:id="rId45"/>
+    <p:sldId id="313" r:id="rId30"/>
+    <p:sldId id="314" r:id="rId31"/>
+    <p:sldId id="315" r:id="rId32"/>
+    <p:sldId id="296" r:id="rId33"/>
+    <p:sldId id="275" r:id="rId34"/>
+    <p:sldId id="306" r:id="rId35"/>
+    <p:sldId id="316" r:id="rId36"/>
+    <p:sldId id="297" r:id="rId37"/>
+    <p:sldId id="300" r:id="rId38"/>
+    <p:sldId id="301" r:id="rId39"/>
+    <p:sldId id="302" r:id="rId40"/>
+    <p:sldId id="298" r:id="rId41"/>
+    <p:sldId id="287" r:id="rId42"/>
+    <p:sldId id="289" r:id="rId43"/>
+    <p:sldId id="310" r:id="rId44"/>
+    <p:sldId id="312" r:id="rId45"/>
+    <p:sldId id="311" r:id="rId46"/>
+    <p:sldId id="309" r:id="rId47"/>
+    <p:sldId id="308" r:id="rId48"/>
+    <p:sldId id="282" r:id="rId49"/>
   </p:sldIdLst>
   <p:sldSz cx="12192000" cy="6858000"/>
   <p:notesSz cx="6858000" cy="9144000"/>
@@ -2794,7 +2798,7 @@
           <a:p>
             <a:fld id="{034341DA-F323-482F-83BE-7FBA8C7DDB2E}" type="datetimeFigureOut">
               <a:rPr lang="en-US" smtClean="0"/>
-              <a:t>6/3/2017</a:t>
+              <a:t>6/10/2017</a:t>
             </a:fld>
             <a:endParaRPr lang="en-US"/>
           </a:p>
@@ -3854,7 +3858,7 @@
           <a:p>
             <a:fld id="{C29F56AA-8764-4156-B7A3-0F667B5214CB}" type="datetimeFigureOut">
               <a:rPr lang="en-US" smtClean="0"/>
-              <a:t>6/3/2017</a:t>
+              <a:t>6/10/2017</a:t>
             </a:fld>
             <a:endParaRPr lang="en-US"/>
           </a:p>
@@ -4030,7 +4034,7 @@
           <a:p>
             <a:fld id="{C29F56AA-8764-4156-B7A3-0F667B5214CB}" type="datetimeFigureOut">
               <a:rPr lang="en-US" smtClean="0"/>
-              <a:t>6/3/2017</a:t>
+              <a:t>6/10/2017</a:t>
             </a:fld>
             <a:endParaRPr lang="en-US"/>
           </a:p>
@@ -4352,7 +4356,7 @@
           <a:p>
             <a:fld id="{C29F56AA-8764-4156-B7A3-0F667B5214CB}" type="datetimeFigureOut">
               <a:rPr lang="en-US" smtClean="0"/>
-              <a:t>6/3/2017</a:t>
+              <a:t>6/10/2017</a:t>
             </a:fld>
             <a:endParaRPr lang="en-US"/>
           </a:p>
@@ -4495,7 +4499,7 @@
           <a:p>
             <a:fld id="{C29F56AA-8764-4156-B7A3-0F667B5214CB}" type="datetimeFigureOut">
               <a:rPr lang="en-US" smtClean="0"/>
-              <a:t>6/3/2017</a:t>
+              <a:t>6/10/2017</a:t>
             </a:fld>
             <a:endParaRPr lang="en-US"/>
           </a:p>
@@ -4770,7 +4774,7 @@
           <a:p>
             <a:fld id="{C29F56AA-8764-4156-B7A3-0F667B5214CB}" type="datetimeFigureOut">
               <a:rPr lang="en-US" smtClean="0"/>
-              <a:t>6/3/2017</a:t>
+              <a:t>6/10/2017</a:t>
             </a:fld>
             <a:endParaRPr lang="en-US"/>
           </a:p>
@@ -5022,7 +5026,7 @@
           <a:p>
             <a:fld id="{C29F56AA-8764-4156-B7A3-0F667B5214CB}" type="datetimeFigureOut">
               <a:rPr lang="en-US" smtClean="0"/>
-              <a:t>6/3/2017</a:t>
+              <a:t>6/10/2017</a:t>
             </a:fld>
             <a:endParaRPr lang="en-US"/>
           </a:p>
@@ -5190,7 +5194,7 @@
           <a:p>
             <a:fld id="{C29F56AA-8764-4156-B7A3-0F667B5214CB}" type="datetimeFigureOut">
               <a:rPr lang="en-US" smtClean="0"/>
-              <a:t>6/3/2017</a:t>
+              <a:t>6/10/2017</a:t>
             </a:fld>
             <a:endParaRPr lang="en-US"/>
           </a:p>
@@ -5368,7 +5372,7 @@
           <a:p>
             <a:fld id="{C29F56AA-8764-4156-B7A3-0F667B5214CB}" type="datetimeFigureOut">
               <a:rPr lang="en-US" smtClean="0"/>
-              <a:t>6/3/2017</a:t>
+              <a:t>6/10/2017</a:t>
             </a:fld>
             <a:endParaRPr lang="en-US"/>
           </a:p>
@@ -5579,7 +5583,7 @@
           <a:p>
             <a:fld id="{C29F56AA-8764-4156-B7A3-0F667B5214CB}" type="datetimeFigureOut">
               <a:rPr lang="en-US" smtClean="0"/>
-              <a:t>6/3/2017</a:t>
+              <a:t>6/10/2017</a:t>
             </a:fld>
             <a:endParaRPr lang="en-US"/>
           </a:p>
@@ -8640,7 +8644,9 @@
         </p:nvSpPr>
         <p:spPr/>
         <p:txBody>
-          <a:bodyPr/>
+          <a:bodyPr>
+            <a:normAutofit lnSpcReduction="10000"/>
+          </a:bodyPr>
           <a:lstStyle/>
           <a:p>
             <a:r>
@@ -8706,6 +8712,18 @@
             <a:r>
               <a:rPr lang="en-US" dirty="0"/>
               <a:t> (“Enterprise” Broker)</a:t>
+            </a:r>
+          </a:p>
+          <a:p>
+            <a:r>
+              <a:rPr lang="en-US" dirty="0"/>
+              <a:t>Azure IoT Hub</a:t>
+            </a:r>
+          </a:p>
+          <a:p>
+            <a:r>
+              <a:rPr lang="en-US" dirty="0"/>
+              <a:t>AWS (Amazon) IoT Message Broker</a:t>
             </a:r>
           </a:p>
           <a:p>
@@ -9246,7 +9264,9 @@
         </p:nvSpPr>
         <p:spPr/>
         <p:txBody>
-          <a:bodyPr/>
+          <a:bodyPr>
+            <a:normAutofit lnSpcReduction="10000"/>
+          </a:bodyPr>
           <a:lstStyle/>
           <a:p>
             <a:pPr marL="0" indent="0">
@@ -9277,6 +9297,43 @@
               <a:rPr lang="en-US" dirty="0"/>
               <a:t>Equipment failure</a:t>
             </a:r>
+          </a:p>
+          <a:p>
+            <a:pPr lvl="1"/>
+            <a:endParaRPr lang="en-US" dirty="0"/>
+          </a:p>
+          <a:p>
+            <a:pPr marL="0" indent="0">
+              <a:buNone/>
+            </a:pPr>
+            <a:endParaRPr lang="en-US" dirty="0"/>
+          </a:p>
+          <a:p>
+            <a:pPr marL="0" indent="0">
+              <a:buNone/>
+            </a:pPr>
+            <a:endParaRPr lang="en-US" dirty="0"/>
+          </a:p>
+          <a:p>
+            <a:pPr marL="0" indent="0">
+              <a:buNone/>
+            </a:pPr>
+            <a:endParaRPr lang="en-US" sz="4400" dirty="0"/>
+          </a:p>
+          <a:p>
+            <a:pPr marL="0" indent="0" algn="ctr">
+              <a:buNone/>
+            </a:pPr>
+            <a:r>
+              <a:rPr lang="en-US" sz="3600" dirty="0"/>
+              <a:t>What if your publisher suddenly goes offline?</a:t>
+            </a:r>
+          </a:p>
+          <a:p>
+            <a:pPr marL="0" indent="0">
+              <a:buNone/>
+            </a:pPr>
+            <a:endParaRPr lang="en-US" dirty="0"/>
           </a:p>
         </p:txBody>
       </p:sp>
@@ -9383,6 +9440,33 @@
               <a:t>Server closes the connection because of a protocol error</a:t>
             </a:r>
           </a:p>
+          <a:p>
+            <a:endParaRPr lang="en-US" dirty="0"/>
+          </a:p>
+          <a:p>
+            <a:endParaRPr lang="en-US" dirty="0"/>
+          </a:p>
+          <a:p>
+            <a:pPr marL="0" indent="0" algn="ctr">
+              <a:buNone/>
+            </a:pPr>
+            <a:endParaRPr lang="en-US" sz="3500" dirty="0"/>
+          </a:p>
+          <a:p>
+            <a:pPr marL="0" indent="0" algn="ctr">
+              <a:buNone/>
+            </a:pPr>
+            <a:r>
+              <a:rPr lang="en-US" sz="3500" dirty="0"/>
+              <a:t>The Broker will publish one last message on your behalf</a:t>
+            </a:r>
+          </a:p>
+          <a:p>
+            <a:pPr marL="0" indent="0">
+              <a:buNone/>
+            </a:pPr>
+            <a:endParaRPr lang="en-US" dirty="0"/>
+          </a:p>
         </p:txBody>
       </p:sp>
     </p:spTree>
@@ -9663,18 +9747,27 @@
           <a:bodyPr/>
           <a:lstStyle/>
           <a:p>
+            <a:pPr marL="0" indent="0">
+              <a:buNone/>
+            </a:pPr>
             <a:r>
               <a:rPr lang="en-US" dirty="0"/>
               <a:t>0: At most once delivery</a:t>
             </a:r>
           </a:p>
           <a:p>
+            <a:pPr marL="0" indent="0">
+              <a:buNone/>
+            </a:pPr>
             <a:r>
               <a:rPr lang="en-US" dirty="0"/>
               <a:t>1: At least once delivery</a:t>
             </a:r>
           </a:p>
           <a:p>
+            <a:pPr marL="0" indent="0">
+              <a:buNone/>
+            </a:pPr>
             <a:r>
               <a:rPr lang="en-US" dirty="0"/>
               <a:t>2: Only once delivery</a:t>
@@ -9729,36 +9822,105 @@
           <a:p>
             <a:r>
               <a:rPr lang="en-US" dirty="0"/>
-              <a:t>SUBSCRIBE</a:t>
-            </a:r>
-          </a:p>
-        </p:txBody>
-      </p:sp>
-      <p:sp>
-        <p:nvSpPr>
-          <p:cNvPr id="3" name="Content Placeholder 2"/>
-          <p:cNvSpPr>
-            <a:spLocks noGrp="1"/>
-          </p:cNvSpPr>
+              <a:t>Quality of Service (</a:t>
+            </a:r>
+            <a:r>
+              <a:rPr lang="en-US" dirty="0" err="1"/>
+              <a:t>QoS</a:t>
+            </a:r>
+            <a:r>
+              <a:rPr lang="en-US" dirty="0"/>
+              <a:t>)</a:t>
+            </a:r>
+          </a:p>
+        </p:txBody>
+      </p:sp>
+      <p:pic>
+        <p:nvPicPr>
+          <p:cNvPr id="1026" name="Picture 2" descr="publish_qos0_flow">
+            <a:extLst>
+              <a:ext uri="{FF2B5EF4-FFF2-40B4-BE49-F238E27FC236}">
+                <a16:creationId xmlns:a16="http://schemas.microsoft.com/office/drawing/2014/main" id="{E5BF1022-A365-496D-9123-932662C11E1E}"/>
+              </a:ext>
+            </a:extLst>
+          </p:cNvPr>
+          <p:cNvPicPr>
+            <a:picLocks noGrp="1" noChangeAspect="1" noChangeArrowheads="1"/>
+          </p:cNvPicPr>
           <p:nvPr>
             <p:ph idx="1"/>
           </p:nvPr>
-        </p:nvSpPr>
-        <p:spPr/>
-        <p:txBody>
-          <a:bodyPr/>
+        </p:nvPicPr>
+        <p:blipFill>
+          <a:blip r:embed="rId2">
+            <a:extLst>
+              <a:ext uri="{28A0092B-C50C-407E-A947-70E740481C1C}">
+                <a14:useLocalDpi xmlns:a14="http://schemas.microsoft.com/office/drawing/2010/main" val="0"/>
+              </a:ext>
+            </a:extLst>
+          </a:blip>
+          <a:srcRect/>
+          <a:stretch>
+            <a:fillRect/>
+          </a:stretch>
+        </p:blipFill>
+        <p:spPr bwMode="auto">
+          <a:xfrm>
+            <a:off x="344774" y="1918741"/>
+            <a:ext cx="11125556" cy="4311153"/>
+          </a:xfrm>
+          <a:prstGeom prst="rect">
+            <a:avLst/>
+          </a:prstGeom>
+          <a:noFill/>
+          <a:extLst>
+            <a:ext uri="{909E8E84-426E-40DD-AFC4-6F175D3DCCD1}">
+              <a14:hiddenFill xmlns:a14="http://schemas.microsoft.com/office/drawing/2010/main">
+                <a:solidFill>
+                  <a:srgbClr val="FFFFFF"/>
+                </a:solidFill>
+              </a14:hiddenFill>
+            </a:ext>
+          </a:extLst>
+        </p:spPr>
+      </p:pic>
+      <p:sp>
+        <p:nvSpPr>
+          <p:cNvPr id="4" name="TextBox 3">
+            <a:extLst>
+              <a:ext uri="{FF2B5EF4-FFF2-40B4-BE49-F238E27FC236}">
+                <a16:creationId xmlns:a16="http://schemas.microsoft.com/office/drawing/2014/main" id="{BCF2CD95-9AD2-47C6-AE54-9AF9E6671CC4}"/>
+              </a:ext>
+            </a:extLst>
+          </p:cNvPr>
+          <p:cNvSpPr txBox="1"/>
+          <p:nvPr/>
+        </p:nvSpPr>
+        <p:spPr>
+          <a:xfrm>
+            <a:off x="4165636" y="6457947"/>
+            <a:ext cx="8026364" cy="369332"/>
+          </a:xfrm>
+          <a:prstGeom prst="rect">
+            <a:avLst/>
+          </a:prstGeom>
+          <a:noFill/>
+        </p:spPr>
+        <p:txBody>
+          <a:bodyPr wrap="none" rtlCol="0">
+            <a:spAutoFit/>
+          </a:bodyPr>
           <a:lstStyle/>
           <a:p>
             <a:r>
-              <a:rPr lang="en-US" dirty="0" err="1"/>
-              <a:t>QoS</a:t>
-            </a:r>
-            <a:endParaRPr lang="en-US" dirty="0"/>
-          </a:p>
-          <a:p>
-            <a:r>
-              <a:rPr lang="en-US" dirty="0"/>
-              <a:t>Topic(s) to subscribe to</a:t>
+              <a:rPr lang="en-US" dirty="0">
+                <a:solidFill>
+                  <a:schemeClr val="bg1">
+                    <a:lumMod val="85000"/>
+                  </a:schemeClr>
+                </a:solidFill>
+              </a:rPr>
+              <a:t>http://www.hivemq.com/blog/mqtt-essentials-part-6-mqtt-quality-of-service-levels</a:t>
             </a:r>
           </a:p>
         </p:txBody>
@@ -9766,7 +9928,7 @@
     </p:spTree>
     <p:extLst>
       <p:ext uri="{BB962C8B-B14F-4D97-AF65-F5344CB8AC3E}">
-        <p14:creationId xmlns:p14="http://schemas.microsoft.com/office/powerpoint/2010/main" val="1404300477"/>
+        <p14:creationId xmlns:p14="http://schemas.microsoft.com/office/powerpoint/2010/main" val="1505348057"/>
       </p:ext>
     </p:extLst>
   </p:cSld>
@@ -9881,259 +10043,111 @@
           <a:p>
             <a:r>
               <a:rPr lang="en-US" dirty="0"/>
-              <a:t>Wildcard Characters	</a:t>
-            </a:r>
-          </a:p>
-        </p:txBody>
-      </p:sp>
-      <p:sp>
-        <p:nvSpPr>
-          <p:cNvPr id="3" name="Content Placeholder 2"/>
-          <p:cNvSpPr>
-            <a:spLocks noGrp="1"/>
-          </p:cNvSpPr>
-          <p:nvPr>
-            <p:ph idx="1"/>
-          </p:nvPr>
-        </p:nvSpPr>
-        <p:spPr/>
-        <p:txBody>
-          <a:bodyPr>
-            <a:normAutofit fontScale="77500" lnSpcReduction="20000"/>
+              <a:t>Quality of Service (</a:t>
+            </a:r>
+            <a:r>
+              <a:rPr lang="en-US" dirty="0" err="1"/>
+              <a:t>QoS</a:t>
+            </a:r>
+            <a:r>
+              <a:rPr lang="en-US" dirty="0"/>
+              <a:t>)</a:t>
+            </a:r>
+          </a:p>
+        </p:txBody>
+      </p:sp>
+      <p:pic>
+        <p:nvPicPr>
+          <p:cNvPr id="3074" name="Picture 2" descr="publish_qos1_flow">
+            <a:extLst>
+              <a:ext uri="{FF2B5EF4-FFF2-40B4-BE49-F238E27FC236}">
+                <a16:creationId xmlns:a16="http://schemas.microsoft.com/office/drawing/2014/main" id="{F3E7F9DB-A4E8-46DF-9F4F-1725CB53548E}"/>
+              </a:ext>
+            </a:extLst>
+          </p:cNvPr>
+          <p:cNvPicPr>
+            <a:picLocks noChangeAspect="1" noChangeArrowheads="1"/>
+          </p:cNvPicPr>
+          <p:nvPr/>
+        </p:nvPicPr>
+        <p:blipFill>
+          <a:blip r:embed="rId2">
+            <a:extLst>
+              <a:ext uri="{28A0092B-C50C-407E-A947-70E740481C1C}">
+                <a14:useLocalDpi xmlns:a14="http://schemas.microsoft.com/office/drawing/2010/main" val="0"/>
+              </a:ext>
+            </a:extLst>
+          </a:blip>
+          <a:srcRect/>
+          <a:stretch>
+            <a:fillRect/>
+          </a:stretch>
+        </p:blipFill>
+        <p:spPr bwMode="auto">
+          <a:xfrm>
+            <a:off x="344774" y="1918740"/>
+            <a:ext cx="11125556" cy="4311153"/>
+          </a:xfrm>
+          <a:prstGeom prst="rect">
+            <a:avLst/>
+          </a:prstGeom>
+          <a:noFill/>
+          <a:extLst>
+            <a:ext uri="{909E8E84-426E-40DD-AFC4-6F175D3DCCD1}">
+              <a14:hiddenFill xmlns:a14="http://schemas.microsoft.com/office/drawing/2010/main">
+                <a:solidFill>
+                  <a:srgbClr val="FFFFFF"/>
+                </a:solidFill>
+              </a14:hiddenFill>
+            </a:ext>
+          </a:extLst>
+        </p:spPr>
+      </p:pic>
+      <p:sp>
+        <p:nvSpPr>
+          <p:cNvPr id="8" name="TextBox 7">
+            <a:extLst>
+              <a:ext uri="{FF2B5EF4-FFF2-40B4-BE49-F238E27FC236}">
+                <a16:creationId xmlns:a16="http://schemas.microsoft.com/office/drawing/2014/main" id="{16D65E68-902A-4059-A5F3-683385A21EFB}"/>
+              </a:ext>
+            </a:extLst>
+          </p:cNvPr>
+          <p:cNvSpPr txBox="1"/>
+          <p:nvPr/>
+        </p:nvSpPr>
+        <p:spPr>
+          <a:xfrm>
+            <a:off x="4165636" y="6457947"/>
+            <a:ext cx="8026364" cy="369332"/>
+          </a:xfrm>
+          <a:prstGeom prst="rect">
+            <a:avLst/>
+          </a:prstGeom>
+          <a:noFill/>
+        </p:spPr>
+        <p:txBody>
+          <a:bodyPr wrap="none" rtlCol="0">
+            <a:spAutoFit/>
           </a:bodyPr>
           <a:lstStyle/>
           <a:p>
-            <a:pPr marL="0" indent="0">
-              <a:buNone/>
-            </a:pPr>
-            <a:r>
-              <a:rPr lang="en-US" dirty="0"/>
-              <a:t>Wildcards for subscriptions: </a:t>
-            </a:r>
-            <a:r>
-              <a:rPr lang="en-US" b="1" dirty="0"/>
-              <a:t>#</a:t>
-            </a:r>
-            <a:r>
-              <a:rPr lang="en-US" dirty="0"/>
-              <a:t> and </a:t>
-            </a:r>
-            <a:r>
-              <a:rPr lang="en-US" b="1" dirty="0"/>
-              <a:t>+</a:t>
-            </a:r>
-            <a:br>
-              <a:rPr lang="en-US" dirty="0"/>
-            </a:br>
-            <a:endParaRPr lang="en-US" dirty="0"/>
-          </a:p>
-          <a:p>
-            <a:r>
-              <a:rPr lang="en-US" dirty="0"/>
-              <a:t>Example: </a:t>
-            </a:r>
             <a:r>
               <a:rPr lang="en-US" dirty="0">
-                <a:latin typeface="Consolas" panose="020B0609020204030204" pitchFamily="49" charset="0"/>
+                <a:solidFill>
+                  <a:schemeClr val="bg1">
+                    <a:lumMod val="85000"/>
+                  </a:schemeClr>
+                </a:solidFill>
               </a:rPr>
-              <a:t>pipeline/3/pump/</a:t>
-            </a:r>
-            <a:r>
-              <a:rPr lang="en-US" b="1" dirty="0">
-                <a:solidFill>
-                  <a:srgbClr val="FF0000"/>
-                </a:solidFill>
-                <a:latin typeface="Consolas" panose="020B0609020204030204" pitchFamily="49" charset="0"/>
-              </a:rPr>
-              <a:t>+</a:t>
-            </a:r>
-            <a:r>
-              <a:rPr lang="en-US" dirty="0">
-                <a:latin typeface="Consolas" panose="020B0609020204030204" pitchFamily="49" charset="0"/>
-              </a:rPr>
-              <a:t>/temperature</a:t>
-            </a:r>
-            <a:br>
-              <a:rPr lang="en-US" dirty="0"/>
-            </a:br>
-            <a:br>
-              <a:rPr lang="en-US" sz="3100" dirty="0"/>
-            </a:br>
-            <a:r>
-              <a:rPr lang="en-US" sz="3600" dirty="0">
-                <a:latin typeface="Consolas" panose="020B0609020204030204" pitchFamily="49" charset="0"/>
-              </a:rPr>
-              <a:t>pipeline/3/pump/</a:t>
-            </a:r>
-            <a:r>
-              <a:rPr lang="en-US" sz="3600" dirty="0">
-                <a:solidFill>
-                  <a:srgbClr val="FF0000"/>
-                </a:solidFill>
-                <a:latin typeface="Consolas" panose="020B0609020204030204" pitchFamily="49" charset="0"/>
-              </a:rPr>
-              <a:t>1239</a:t>
-            </a:r>
-            <a:r>
-              <a:rPr lang="en-US" sz="3600" dirty="0">
-                <a:latin typeface="Consolas" panose="020B0609020204030204" pitchFamily="49" charset="0"/>
-              </a:rPr>
-              <a:t>/temperature</a:t>
-            </a:r>
-            <a:br>
-              <a:rPr lang="en-US" sz="3600" dirty="0">
-                <a:latin typeface="Consolas" panose="020B0609020204030204" pitchFamily="49" charset="0"/>
-              </a:rPr>
-            </a:br>
-            <a:r>
-              <a:rPr lang="en-US" sz="3600" dirty="0">
-                <a:latin typeface="Consolas" panose="020B0609020204030204" pitchFamily="49" charset="0"/>
-              </a:rPr>
-              <a:t>pipeline/3/pump/</a:t>
-            </a:r>
-            <a:r>
-              <a:rPr lang="en-US" sz="3600" dirty="0">
-                <a:solidFill>
-                  <a:srgbClr val="FF0000"/>
-                </a:solidFill>
-                <a:latin typeface="Consolas" panose="020B0609020204030204" pitchFamily="49" charset="0"/>
-              </a:rPr>
-              <a:t>4445</a:t>
-            </a:r>
-            <a:r>
-              <a:rPr lang="en-US" sz="3600" dirty="0">
-                <a:latin typeface="Consolas" panose="020B0609020204030204" pitchFamily="49" charset="0"/>
-              </a:rPr>
-              <a:t>/temperature</a:t>
-            </a:r>
-            <a:br>
-              <a:rPr lang="en-US" sz="3600" dirty="0">
-                <a:latin typeface="Consolas" panose="020B0609020204030204" pitchFamily="49" charset="0"/>
-              </a:rPr>
-            </a:br>
-            <a:r>
-              <a:rPr lang="en-US" sz="3600" dirty="0">
-                <a:latin typeface="Consolas" panose="020B0609020204030204" pitchFamily="49" charset="0"/>
-              </a:rPr>
-              <a:t>pipeline/3/pump/</a:t>
-            </a:r>
-            <a:r>
-              <a:rPr lang="en-US" sz="3600" dirty="0">
-                <a:solidFill>
-                  <a:srgbClr val="FF0000"/>
-                </a:solidFill>
-                <a:latin typeface="Consolas" panose="020B0609020204030204" pitchFamily="49" charset="0"/>
-              </a:rPr>
-              <a:t>3224</a:t>
-            </a:r>
-            <a:r>
-              <a:rPr lang="en-US" sz="3600" dirty="0">
-                <a:latin typeface="Consolas" panose="020B0609020204030204" pitchFamily="49" charset="0"/>
-              </a:rPr>
-              <a:t>/temperature</a:t>
-            </a:r>
-          </a:p>
-          <a:p>
-            <a:pPr marL="0" indent="0">
-              <a:buNone/>
-            </a:pPr>
-            <a:endParaRPr lang="en-US" dirty="0"/>
-          </a:p>
-          <a:p>
-            <a:r>
-              <a:rPr lang="en-US" dirty="0"/>
-              <a:t>Example: </a:t>
-            </a:r>
-            <a:r>
-              <a:rPr lang="en-US" dirty="0">
-                <a:latin typeface="Consolas" panose="020B0609020204030204" pitchFamily="49" charset="0"/>
-              </a:rPr>
-              <a:t>pipeline/3/</a:t>
-            </a:r>
-            <a:r>
-              <a:rPr lang="en-US" b="1" dirty="0">
-                <a:solidFill>
-                  <a:srgbClr val="FF0000"/>
-                </a:solidFill>
-                <a:latin typeface="Consolas" panose="020B0609020204030204" pitchFamily="49" charset="0"/>
-              </a:rPr>
-              <a:t>#</a:t>
-            </a:r>
-            <a:br>
-              <a:rPr lang="en-US" dirty="0"/>
-            </a:br>
-            <a:br>
-              <a:rPr lang="en-US" dirty="0"/>
-            </a:br>
-            <a:r>
-              <a:rPr lang="en-US" sz="3800" dirty="0">
-                <a:latin typeface="Consolas" panose="020B0609020204030204" pitchFamily="49" charset="0"/>
-              </a:rPr>
-              <a:t>pipeline/3/</a:t>
-            </a:r>
-            <a:r>
-              <a:rPr lang="en-US" sz="3800" dirty="0">
-                <a:solidFill>
-                  <a:srgbClr val="FF0000"/>
-                </a:solidFill>
-                <a:latin typeface="Consolas" panose="020B0609020204030204" pitchFamily="49" charset="0"/>
-              </a:rPr>
-              <a:t>pump/1239/temperature</a:t>
-            </a:r>
-            <a:br>
-              <a:rPr lang="en-US" sz="3800" dirty="0">
-                <a:solidFill>
-                  <a:srgbClr val="FF0000"/>
-                </a:solidFill>
-                <a:latin typeface="Consolas" panose="020B0609020204030204" pitchFamily="49" charset="0"/>
-              </a:rPr>
-            </a:br>
-            <a:r>
-              <a:rPr lang="en-US" sz="3800" dirty="0">
-                <a:latin typeface="Consolas" panose="020B0609020204030204" pitchFamily="49" charset="0"/>
-              </a:rPr>
-              <a:t>pipeline/3/</a:t>
-            </a:r>
-            <a:r>
-              <a:rPr lang="en-US" sz="3800" dirty="0">
-                <a:solidFill>
-                  <a:srgbClr val="FF0000"/>
-                </a:solidFill>
-                <a:latin typeface="Consolas" panose="020B0609020204030204" pitchFamily="49" charset="0"/>
-              </a:rPr>
-              <a:t>pump/1239/pressure</a:t>
-            </a:r>
-            <a:br>
-              <a:rPr lang="en-US" sz="3800" dirty="0">
-                <a:latin typeface="Consolas" panose="020B0609020204030204" pitchFamily="49" charset="0"/>
-              </a:rPr>
-            </a:br>
-            <a:r>
-              <a:rPr lang="en-US" sz="3800" dirty="0">
-                <a:latin typeface="Consolas" panose="020B0609020204030204" pitchFamily="49" charset="0"/>
-              </a:rPr>
-              <a:t>pipeline/3/</a:t>
-            </a:r>
-            <a:r>
-              <a:rPr lang="en-US" sz="3800" dirty="0">
-                <a:solidFill>
-                  <a:srgbClr val="FF0000"/>
-                </a:solidFill>
-                <a:latin typeface="Consolas" panose="020B0609020204030204" pitchFamily="49" charset="0"/>
-              </a:rPr>
-              <a:t>valve/1239/state</a:t>
-            </a:r>
-            <a:br>
-              <a:rPr lang="en-US" dirty="0"/>
-            </a:br>
-            <a:endParaRPr lang="en-US" dirty="0"/>
+              <a:t>http://www.hivemq.com/blog/mqtt-essentials-part-6-mqtt-quality-of-service-levels</a:t>
+            </a:r>
           </a:p>
         </p:txBody>
       </p:sp>
     </p:spTree>
     <p:extLst>
       <p:ext uri="{BB962C8B-B14F-4D97-AF65-F5344CB8AC3E}">
-        <p14:creationId xmlns:p14="http://schemas.microsoft.com/office/powerpoint/2010/main" val="1773459131"/>
+        <p14:creationId xmlns:p14="http://schemas.microsoft.com/office/powerpoint/2010/main" val="1596539925"/>
       </p:ext>
     </p:extLst>
   </p:cSld>
@@ -10177,50 +10191,7 @@
           <a:p>
             <a:r>
               <a:rPr lang="en-US" dirty="0"/>
-              <a:t>Persistent Connection</a:t>
-            </a:r>
-          </a:p>
-        </p:txBody>
-      </p:sp>
-      <p:sp>
-        <p:nvSpPr>
-          <p:cNvPr id="3" name="Content Placeholder 2"/>
-          <p:cNvSpPr>
-            <a:spLocks noGrp="1"/>
-          </p:cNvSpPr>
-          <p:nvPr>
-            <p:ph idx="1"/>
-          </p:nvPr>
-        </p:nvSpPr>
-        <p:spPr/>
-        <p:txBody>
-          <a:bodyPr/>
-          <a:lstStyle/>
-          <a:p>
-            <a:pPr marL="0" indent="0">
-              <a:buNone/>
-            </a:pPr>
-            <a:r>
-              <a:rPr lang="en-US" dirty="0"/>
-              <a:t>When Clean Session Flag = False during CONNECT:</a:t>
-            </a:r>
-            <a:br>
-              <a:rPr lang="en-US" dirty="0"/>
-            </a:br>
-            <a:endParaRPr lang="en-US" dirty="0"/>
-          </a:p>
-          <a:p>
-            <a:pPr lvl="1"/>
-            <a:r>
-              <a:rPr lang="en-US" dirty="0"/>
-              <a:t>All subscriptions are maintained while offline</a:t>
-            </a:r>
-          </a:p>
-          <a:p>
-            <a:pPr lvl="1"/>
-            <a:r>
-              <a:rPr lang="en-US" dirty="0"/>
-              <a:t>All </a:t>
+              <a:t>Quality of Service (</a:t>
             </a:r>
             <a:r>
               <a:rPr lang="en-US" dirty="0" err="1"/>
@@ -10228,69 +10199,95 @@
             </a:r>
             <a:r>
               <a:rPr lang="en-US" dirty="0"/>
-              <a:t> 1 &amp; 2 messages not confirmed by client will finish up upon reconnect</a:t>
-            </a:r>
-          </a:p>
-          <a:p>
-            <a:pPr lvl="1"/>
-            <a:r>
-              <a:rPr lang="en-US" dirty="0"/>
-              <a:t>All new </a:t>
-            </a:r>
-            <a:r>
-              <a:rPr lang="en-US" dirty="0" err="1"/>
-              <a:t>QoS</a:t>
-            </a:r>
-            <a:r>
-              <a:rPr lang="en-US" dirty="0"/>
-              <a:t> 1 &amp; 2 sent while offline will be saved and sent upon reconnect</a:t>
-            </a:r>
-          </a:p>
-          <a:p>
-            <a:endParaRPr lang="en-US" dirty="0"/>
-          </a:p>
-          <a:p>
-            <a:endParaRPr lang="en-US" dirty="0"/>
-          </a:p>
-          <a:p>
-            <a:endParaRPr lang="en-US" dirty="0"/>
-          </a:p>
-          <a:p>
-            <a:pPr marL="0" indent="0">
-              <a:buNone/>
-            </a:pPr>
-            <a:r>
-              <a:rPr lang="en-US" sz="2400" dirty="0">
+              <a:t>)</a:t>
+            </a:r>
+          </a:p>
+        </p:txBody>
+      </p:sp>
+      <p:pic>
+        <p:nvPicPr>
+          <p:cNvPr id="2050" name="Picture 2" descr="publish_qos2_flow">
+            <a:extLst>
+              <a:ext uri="{FF2B5EF4-FFF2-40B4-BE49-F238E27FC236}">
+                <a16:creationId xmlns:a16="http://schemas.microsoft.com/office/drawing/2014/main" id="{35F49B62-7E2A-4F47-8762-54229D523E9E}"/>
+              </a:ext>
+            </a:extLst>
+          </p:cNvPr>
+          <p:cNvPicPr>
+            <a:picLocks noChangeAspect="1" noChangeArrowheads="1"/>
+          </p:cNvPicPr>
+          <p:nvPr/>
+        </p:nvPicPr>
+        <p:blipFill>
+          <a:blip r:embed="rId2">
+            <a:extLst>
+              <a:ext uri="{28A0092B-C50C-407E-A947-70E740481C1C}">
+                <a14:useLocalDpi xmlns:a14="http://schemas.microsoft.com/office/drawing/2010/main" val="0"/>
+              </a:ext>
+            </a:extLst>
+          </a:blip>
+          <a:srcRect/>
+          <a:stretch>
+            <a:fillRect/>
+          </a:stretch>
+        </p:blipFill>
+        <p:spPr bwMode="auto">
+          <a:xfrm>
+            <a:off x="344774" y="1918740"/>
+            <a:ext cx="11125556" cy="4311153"/>
+          </a:xfrm>
+          <a:prstGeom prst="rect">
+            <a:avLst/>
+          </a:prstGeom>
+          <a:noFill/>
+          <a:extLst>
+            <a:ext uri="{909E8E84-426E-40DD-AFC4-6F175D3DCCD1}">
+              <a14:hiddenFill xmlns:a14="http://schemas.microsoft.com/office/drawing/2010/main">
                 <a:solidFill>
-                  <a:schemeClr val="tx1">
-                    <a:lumMod val="75000"/>
-                    <a:lumOff val="25000"/>
+                  <a:srgbClr val="FFFFFF"/>
+                </a:solidFill>
+              </a14:hiddenFill>
+            </a:ext>
+          </a:extLst>
+        </p:spPr>
+      </p:pic>
+      <p:sp>
+        <p:nvSpPr>
+          <p:cNvPr id="7" name="TextBox 6">
+            <a:extLst>
+              <a:ext uri="{FF2B5EF4-FFF2-40B4-BE49-F238E27FC236}">
+                <a16:creationId xmlns:a16="http://schemas.microsoft.com/office/drawing/2014/main" id="{552D4E6B-36FD-4449-BA42-E1DC215A9A1B}"/>
+              </a:ext>
+            </a:extLst>
+          </p:cNvPr>
+          <p:cNvSpPr txBox="1"/>
+          <p:nvPr/>
+        </p:nvSpPr>
+        <p:spPr>
+          <a:xfrm>
+            <a:off x="4165636" y="6457947"/>
+            <a:ext cx="8026364" cy="369332"/>
+          </a:xfrm>
+          <a:prstGeom prst="rect">
+            <a:avLst/>
+          </a:prstGeom>
+          <a:noFill/>
+        </p:spPr>
+        <p:txBody>
+          <a:bodyPr wrap="none" rtlCol="0">
+            <a:spAutoFit/>
+          </a:bodyPr>
+          <a:lstStyle/>
+          <a:p>
+            <a:r>
+              <a:rPr lang="en-US" dirty="0">
+                <a:solidFill>
+                  <a:schemeClr val="bg1">
+                    <a:lumMod val="85000"/>
                   </a:schemeClr>
                 </a:solidFill>
               </a:rPr>
-              <a:t>Note: </a:t>
-            </a:r>
-            <a:r>
-              <a:rPr lang="en-US" sz="2400" dirty="0" err="1">
-                <a:solidFill>
-                  <a:schemeClr val="tx1">
-                    <a:lumMod val="75000"/>
-                    <a:lumOff val="25000"/>
-                  </a:schemeClr>
-                </a:solidFill>
-              </a:rPr>
-              <a:t>QoS</a:t>
-            </a:r>
-            <a:r>
-              <a:rPr lang="en-US" sz="2400" dirty="0">
-                <a:solidFill>
-                  <a:schemeClr val="tx1">
-                    <a:lumMod val="75000"/>
-                    <a:lumOff val="25000"/>
-                  </a:schemeClr>
-                </a:solidFill>
-              </a:rPr>
-              <a:t> 0 subscription messages are not preserved while offline</a:t>
+              <a:t>http://www.hivemq.com/blog/mqtt-essentials-part-6-mqtt-quality-of-service-levels</a:t>
             </a:r>
           </a:p>
         </p:txBody>
@@ -10298,7 +10295,7 @@
     </p:spTree>
     <p:extLst>
       <p:ext uri="{BB962C8B-B14F-4D97-AF65-F5344CB8AC3E}">
-        <p14:creationId xmlns:p14="http://schemas.microsoft.com/office/powerpoint/2010/main" val="1453693589"/>
+        <p14:creationId xmlns:p14="http://schemas.microsoft.com/office/powerpoint/2010/main" val="1324445748"/>
       </p:ext>
     </p:extLst>
   </p:cSld>
@@ -10327,7 +10324,7 @@
       </p:grpSpPr>
       <p:sp>
         <p:nvSpPr>
-          <p:cNvPr id="4" name="Title 3"/>
+          <p:cNvPr id="2" name="Title 1"/>
           <p:cNvSpPr>
             <a:spLocks noGrp="1"/>
           </p:cNvSpPr>
@@ -10342,19 +10339,19 @@
           <a:p>
             <a:r>
               <a:rPr lang="en-US" dirty="0"/>
-              <a:t>Facebook Messenger Story</a:t>
-            </a:r>
-          </a:p>
-        </p:txBody>
-      </p:sp>
-      <p:sp>
-        <p:nvSpPr>
-          <p:cNvPr id="5" name="Text Placeholder 4"/>
+              <a:t>SUBSCRIBE</a:t>
+            </a:r>
+          </a:p>
+        </p:txBody>
+      </p:sp>
+      <p:sp>
+        <p:nvSpPr>
+          <p:cNvPr id="3" name="Content Placeholder 2"/>
           <p:cNvSpPr>
             <a:spLocks noGrp="1"/>
           </p:cNvSpPr>
           <p:nvPr>
-            <p:ph type="body" idx="1"/>
+            <p:ph idx="1"/>
           </p:nvPr>
         </p:nvSpPr>
         <p:spPr/>
@@ -10362,14 +10359,24 @@
           <a:bodyPr/>
           <a:lstStyle/>
           <a:p>
-            <a:endParaRPr lang="en-US"/>
+            <a:r>
+              <a:rPr lang="en-US" dirty="0" err="1"/>
+              <a:t>QoS</a:t>
+            </a:r>
+            <a:endParaRPr lang="en-US" dirty="0"/>
+          </a:p>
+          <a:p>
+            <a:r>
+              <a:rPr lang="en-US" dirty="0"/>
+              <a:t>Topic(s) to subscribe to</a:t>
+            </a:r>
           </a:p>
         </p:txBody>
       </p:sp>
     </p:spTree>
     <p:extLst>
       <p:ext uri="{BB962C8B-B14F-4D97-AF65-F5344CB8AC3E}">
-        <p14:creationId xmlns:p14="http://schemas.microsoft.com/office/powerpoint/2010/main" val="992834903"/>
+        <p14:creationId xmlns:p14="http://schemas.microsoft.com/office/powerpoint/2010/main" val="1404300477"/>
       </p:ext>
     </p:extLst>
   </p:cSld>
@@ -10398,7 +10405,7 @@
       </p:grpSpPr>
       <p:sp>
         <p:nvSpPr>
-          <p:cNvPr id="4" name="Title 3"/>
+          <p:cNvPr id="2" name="Title 1"/>
           <p:cNvSpPr>
             <a:spLocks noGrp="1"/>
           </p:cNvSpPr>
@@ -10413,14 +10420,14 @@
           <a:p>
             <a:r>
               <a:rPr lang="en-US" dirty="0"/>
-              <a:t>Facebook Messenger</a:t>
-            </a:r>
-          </a:p>
-        </p:txBody>
-      </p:sp>
-      <p:sp>
-        <p:nvSpPr>
-          <p:cNvPr id="5" name="Content Placeholder 4"/>
+              <a:t>Wildcard Characters	</a:t>
+            </a:r>
+          </a:p>
+        </p:txBody>
+      </p:sp>
+      <p:sp>
+        <p:nvSpPr>
+          <p:cNvPr id="3" name="Content Placeholder 2"/>
           <p:cNvSpPr>
             <a:spLocks noGrp="1"/>
           </p:cNvSpPr>
@@ -10428,31 +10435,141 @@
             <p:ph idx="1"/>
           </p:nvPr>
         </p:nvSpPr>
-        <p:spPr>
-          <a:xfrm>
-            <a:off x="838200" y="1825625"/>
-            <a:ext cx="10848278" cy="4351338"/>
-          </a:xfrm>
-        </p:spPr>
-        <p:txBody>
-          <a:bodyPr/>
+        <p:spPr/>
+        <p:txBody>
+          <a:bodyPr>
+            <a:normAutofit fontScale="77500" lnSpcReduction="20000"/>
+          </a:bodyPr>
           <a:lstStyle/>
           <a:p>
-            <a:r>
-              <a:rPr lang="en-US" dirty="0"/>
-              <a:t>First implementation had issues with long latency. Was reliable but slow.</a:t>
-            </a:r>
-          </a:p>
-          <a:p>
-            <a:r>
-              <a:rPr lang="en-US" dirty="0"/>
-              <a:t>With only weeks before launch, refactored to use MQTT</a:t>
-            </a:r>
-          </a:p>
-          <a:p>
-            <a:r>
-              <a:rPr lang="en-US" dirty="0"/>
-              <a:t>Designed to use bandwidth and battery sparingly (important for mobile apps)</a:t>
+            <a:pPr marL="0" indent="0">
+              <a:buNone/>
+            </a:pPr>
+            <a:r>
+              <a:rPr lang="en-US" dirty="0"/>
+              <a:t>Wildcards for subscriptions: </a:t>
+            </a:r>
+            <a:r>
+              <a:rPr lang="en-US" b="1" dirty="0"/>
+              <a:t>#</a:t>
+            </a:r>
+            <a:r>
+              <a:rPr lang="en-US" dirty="0"/>
+              <a:t> and </a:t>
+            </a:r>
+            <a:r>
+              <a:rPr lang="en-US" b="1" dirty="0"/>
+              <a:t>+</a:t>
+            </a:r>
+            <a:br>
+              <a:rPr lang="en-US" dirty="0"/>
+            </a:br>
+            <a:endParaRPr lang="en-US" dirty="0"/>
+          </a:p>
+          <a:p>
+            <a:r>
+              <a:rPr lang="en-US" dirty="0"/>
+              <a:t>Example: </a:t>
+            </a:r>
+            <a:r>
+              <a:rPr lang="en-US" dirty="0">
+                <a:latin typeface="Consolas" panose="020B0609020204030204" pitchFamily="49" charset="0"/>
+              </a:rPr>
+              <a:t>pipeline/3/pump/</a:t>
+            </a:r>
+            <a:r>
+              <a:rPr lang="en-US" b="1" dirty="0">
+                <a:solidFill>
+                  <a:srgbClr val="FF0000"/>
+                </a:solidFill>
+                <a:latin typeface="Consolas" panose="020B0609020204030204" pitchFamily="49" charset="0"/>
+              </a:rPr>
+              <a:t>+</a:t>
+            </a:r>
+            <a:r>
+              <a:rPr lang="en-US" dirty="0">
+                <a:latin typeface="Consolas" panose="020B0609020204030204" pitchFamily="49" charset="0"/>
+              </a:rPr>
+              <a:t>/temperature</a:t>
+            </a:r>
+            <a:br>
+              <a:rPr lang="en-US" dirty="0"/>
+            </a:br>
+            <a:br>
+              <a:rPr lang="en-US" sz="3100" dirty="0"/>
+            </a:br>
+            <a:r>
+              <a:rPr lang="en-US" sz="3600" dirty="0">
+                <a:latin typeface="Consolas" panose="020B0609020204030204" pitchFamily="49" charset="0"/>
+              </a:rPr>
+              <a:t>pipeline/3/pump/</a:t>
+            </a:r>
+            <a:r>
+              <a:rPr lang="en-US" sz="3600" dirty="0">
+                <a:solidFill>
+                  <a:srgbClr val="FF0000"/>
+                </a:solidFill>
+                <a:latin typeface="Consolas" panose="020B0609020204030204" pitchFamily="49" charset="0"/>
+              </a:rPr>
+              <a:t>1239</a:t>
+            </a:r>
+            <a:r>
+              <a:rPr lang="en-US" sz="3600" dirty="0">
+                <a:latin typeface="Consolas" panose="020B0609020204030204" pitchFamily="49" charset="0"/>
+              </a:rPr>
+              <a:t>/temperature</a:t>
+            </a:r>
+            <a:br>
+              <a:rPr lang="en-US" sz="3600" dirty="0">
+                <a:latin typeface="Consolas" panose="020B0609020204030204" pitchFamily="49" charset="0"/>
+              </a:rPr>
+            </a:br>
+            <a:r>
+              <a:rPr lang="en-US" sz="3600" dirty="0">
+                <a:latin typeface="Consolas" panose="020B0609020204030204" pitchFamily="49" charset="0"/>
+              </a:rPr>
+              <a:t>pipeline/3/pump/</a:t>
+            </a:r>
+            <a:r>
+              <a:rPr lang="en-US" sz="3600" dirty="0">
+                <a:solidFill>
+                  <a:srgbClr val="FF0000"/>
+                </a:solidFill>
+                <a:latin typeface="Consolas" panose="020B0609020204030204" pitchFamily="49" charset="0"/>
+              </a:rPr>
+              <a:t>4445</a:t>
+            </a:r>
+            <a:r>
+              <a:rPr lang="en-US" sz="3600" dirty="0">
+                <a:latin typeface="Consolas" panose="020B0609020204030204" pitchFamily="49" charset="0"/>
+              </a:rPr>
+              <a:t>/temperature</a:t>
+            </a:r>
+            <a:br>
+              <a:rPr lang="en-US" sz="3600" dirty="0">
+                <a:latin typeface="Consolas" panose="020B0609020204030204" pitchFamily="49" charset="0"/>
+              </a:rPr>
+            </a:br>
+            <a:r>
+              <a:rPr lang="en-US" sz="3600" dirty="0">
+                <a:latin typeface="Consolas" panose="020B0609020204030204" pitchFamily="49" charset="0"/>
+              </a:rPr>
+              <a:t>pipeline/3/pump/</a:t>
+            </a:r>
+            <a:r>
+              <a:rPr lang="en-US" sz="3600" dirty="0">
+                <a:solidFill>
+                  <a:srgbClr val="FF0000"/>
+                </a:solidFill>
+                <a:latin typeface="Consolas" panose="020B0609020204030204" pitchFamily="49" charset="0"/>
+              </a:rPr>
+              <a:t>3224</a:t>
+            </a:r>
+            <a:r>
+              <a:rPr lang="en-US" sz="3600" dirty="0">
+                <a:latin typeface="Consolas" panose="020B0609020204030204" pitchFamily="49" charset="0"/>
+              </a:rPr>
+              <a:t>/temperature</a:t>
             </a:r>
           </a:p>
           <a:p>
@@ -10461,12 +10578,101 @@
             </a:pPr>
             <a:endParaRPr lang="en-US" dirty="0"/>
           </a:p>
+          <a:p>
+            <a:r>
+              <a:rPr lang="en-US" dirty="0"/>
+              <a:t>Example: </a:t>
+            </a:r>
+            <a:r>
+              <a:rPr lang="en-US" dirty="0">
+                <a:latin typeface="Consolas" panose="020B0609020204030204" pitchFamily="49" charset="0"/>
+              </a:rPr>
+              <a:t>pipeline/3/</a:t>
+            </a:r>
+            <a:r>
+              <a:rPr lang="en-US" b="1" dirty="0">
+                <a:solidFill>
+                  <a:srgbClr val="FF0000"/>
+                </a:solidFill>
+                <a:latin typeface="Consolas" panose="020B0609020204030204" pitchFamily="49" charset="0"/>
+              </a:rPr>
+              <a:t>#</a:t>
+            </a:r>
+            <a:br>
+              <a:rPr lang="en-US" dirty="0"/>
+            </a:br>
+            <a:br>
+              <a:rPr lang="en-US" dirty="0"/>
+            </a:br>
+            <a:r>
+              <a:rPr lang="en-US" sz="3800" dirty="0">
+                <a:latin typeface="Consolas" panose="020B0609020204030204" pitchFamily="49" charset="0"/>
+              </a:rPr>
+              <a:t>pipeline/3/</a:t>
+            </a:r>
+            <a:r>
+              <a:rPr lang="en-US" sz="3800" dirty="0">
+                <a:solidFill>
+                  <a:srgbClr val="FF0000"/>
+                </a:solidFill>
+                <a:latin typeface="Consolas" panose="020B0609020204030204" pitchFamily="49" charset="0"/>
+              </a:rPr>
+              <a:t>pump/1239/temperature</a:t>
+            </a:r>
+            <a:br>
+              <a:rPr lang="en-US" sz="3800" dirty="0">
+                <a:solidFill>
+                  <a:srgbClr val="FF0000"/>
+                </a:solidFill>
+                <a:latin typeface="Consolas" panose="020B0609020204030204" pitchFamily="49" charset="0"/>
+              </a:rPr>
+            </a:br>
+            <a:r>
+              <a:rPr lang="en-US" sz="3800" dirty="0">
+                <a:latin typeface="Consolas" panose="020B0609020204030204" pitchFamily="49" charset="0"/>
+              </a:rPr>
+              <a:t>pipeline/3/</a:t>
+            </a:r>
+            <a:r>
+              <a:rPr lang="en-US" sz="3800" dirty="0">
+                <a:solidFill>
+                  <a:srgbClr val="FF0000"/>
+                </a:solidFill>
+                <a:latin typeface="Consolas" panose="020B0609020204030204" pitchFamily="49" charset="0"/>
+              </a:rPr>
+              <a:t>pump/1239/pressure</a:t>
+            </a:r>
+            <a:br>
+              <a:rPr lang="en-US" sz="3800" dirty="0">
+                <a:latin typeface="Consolas" panose="020B0609020204030204" pitchFamily="49" charset="0"/>
+              </a:rPr>
+            </a:br>
+            <a:r>
+              <a:rPr lang="en-US" sz="3800" dirty="0">
+                <a:latin typeface="Consolas" panose="020B0609020204030204" pitchFamily="49" charset="0"/>
+              </a:rPr>
+              <a:t>pipeline/3/</a:t>
+            </a:r>
+            <a:r>
+              <a:rPr lang="en-US" sz="3800" dirty="0">
+                <a:solidFill>
+                  <a:srgbClr val="FF0000"/>
+                </a:solidFill>
+                <a:latin typeface="Consolas" panose="020B0609020204030204" pitchFamily="49" charset="0"/>
+              </a:rPr>
+              <a:t>valve/1239/state</a:t>
+            </a:r>
+            <a:br>
+              <a:rPr lang="en-US" dirty="0"/>
+            </a:br>
+            <a:endParaRPr lang="en-US" dirty="0"/>
+          </a:p>
         </p:txBody>
       </p:sp>
     </p:spTree>
     <p:extLst>
       <p:ext uri="{BB962C8B-B14F-4D97-AF65-F5344CB8AC3E}">
-        <p14:creationId xmlns:p14="http://schemas.microsoft.com/office/powerpoint/2010/main" val="1338110876"/>
+        <p14:creationId xmlns:p14="http://schemas.microsoft.com/office/powerpoint/2010/main" val="1773459131"/>
       </p:ext>
     </p:extLst>
   </p:cSld>
@@ -10495,20 +10701,37 @@
       </p:grpSpPr>
       <p:sp>
         <p:nvSpPr>
+          <p:cNvPr id="2" name="Title 1"/>
+          <p:cNvSpPr>
+            <a:spLocks noGrp="1"/>
+          </p:cNvSpPr>
+          <p:nvPr>
+            <p:ph type="title"/>
+          </p:nvPr>
+        </p:nvSpPr>
+        <p:spPr/>
+        <p:txBody>
+          <a:bodyPr/>
+          <a:lstStyle/>
+          <a:p>
+            <a:r>
+              <a:rPr lang="en-US" dirty="0"/>
+              <a:t>Persistent Connection</a:t>
+            </a:r>
+          </a:p>
+        </p:txBody>
+      </p:sp>
+      <p:sp>
+        <p:nvSpPr>
           <p:cNvPr id="3" name="Content Placeholder 2"/>
           <p:cNvSpPr>
             <a:spLocks noGrp="1"/>
           </p:cNvSpPr>
           <p:nvPr>
-            <p:ph idx="4294967295"/>
+            <p:ph idx="1"/>
           </p:nvPr>
         </p:nvSpPr>
-        <p:spPr>
-          <a:xfrm>
-            <a:off x="838200" y="1136309"/>
-            <a:ext cx="10515600" cy="4351338"/>
-          </a:xfrm>
-        </p:spPr>
+        <p:spPr/>
         <p:txBody>
           <a:bodyPr/>
           <a:lstStyle/>
@@ -10517,60 +10740,96 @@
               <a:buNone/>
             </a:pPr>
             <a:r>
-              <a:rPr lang="en-US" sz="4000" dirty="0"/>
-              <a:t>“By maintaining a MQTT connection and routing messages through our chat pipeline, we were able to often achieve phone-to-phone delivery in the hundreds of milliseconds rather than multiple seconds” </a:t>
-            </a:r>
-          </a:p>
-          <a:p>
-            <a:pPr marL="0" indent="0" algn="r">
-              <a:buNone/>
-            </a:pPr>
-            <a:r>
-              <a:rPr lang="en-US" sz="4000" dirty="0"/>
-              <a:t>– Lucy Zhang, Facebook</a:t>
-            </a:r>
+              <a:rPr lang="en-US" dirty="0"/>
+              <a:t>When Clean Session Flag = False during CONNECT:</a:t>
+            </a:r>
+            <a:br>
+              <a:rPr lang="en-US" dirty="0"/>
+            </a:br>
+            <a:endParaRPr lang="en-US" dirty="0"/>
+          </a:p>
+          <a:p>
+            <a:pPr lvl="1"/>
+            <a:r>
+              <a:rPr lang="en-US" dirty="0"/>
+              <a:t>All subscriptions are maintained while offline</a:t>
+            </a:r>
+          </a:p>
+          <a:p>
+            <a:pPr lvl="1"/>
+            <a:r>
+              <a:rPr lang="en-US" dirty="0"/>
+              <a:t>All </a:t>
+            </a:r>
+            <a:r>
+              <a:rPr lang="en-US" dirty="0" err="1"/>
+              <a:t>QoS</a:t>
+            </a:r>
+            <a:r>
+              <a:rPr lang="en-US" dirty="0"/>
+              <a:t> 1 &amp; 2 messages not confirmed by client will finish up upon reconnect</a:t>
+            </a:r>
+          </a:p>
+          <a:p>
+            <a:pPr lvl="1"/>
+            <a:r>
+              <a:rPr lang="en-US" dirty="0"/>
+              <a:t>All new </a:t>
+            </a:r>
+            <a:r>
+              <a:rPr lang="en-US" dirty="0" err="1"/>
+              <a:t>QoS</a:t>
+            </a:r>
+            <a:r>
+              <a:rPr lang="en-US" dirty="0"/>
+              <a:t> 1 &amp; 2 sent while offline will be saved and sent upon reconnect</a:t>
+            </a:r>
+          </a:p>
+          <a:p>
+            <a:endParaRPr lang="en-US" dirty="0"/>
+          </a:p>
+          <a:p>
+            <a:endParaRPr lang="en-US" dirty="0"/>
+          </a:p>
+          <a:p>
+            <a:endParaRPr lang="en-US" dirty="0"/>
           </a:p>
           <a:p>
             <a:pPr marL="0" indent="0">
               <a:buNone/>
             </a:pPr>
-            <a:endParaRPr lang="en-US" dirty="0"/>
-          </a:p>
-        </p:txBody>
-      </p:sp>
-      <p:sp>
-        <p:nvSpPr>
-          <p:cNvPr id="4" name="TextBox 3"/>
-          <p:cNvSpPr txBox="1"/>
-          <p:nvPr/>
-        </p:nvSpPr>
-        <p:spPr>
-          <a:xfrm>
-            <a:off x="801231" y="6311900"/>
-            <a:ext cx="10552569" cy="369332"/>
-          </a:xfrm>
-          <a:prstGeom prst="rect">
-            <a:avLst/>
-          </a:prstGeom>
-          <a:noFill/>
-        </p:spPr>
-        <p:txBody>
-          <a:bodyPr wrap="none" rtlCol="0">
-            <a:spAutoFit/>
-          </a:bodyPr>
-          <a:lstStyle/>
-          <a:p>
-            <a:pPr algn="ctr"/>
-            <a:r>
-              <a:rPr lang="en-US" dirty="0">
+            <a:r>
+              <a:rPr lang="en-US" sz="2400" dirty="0">
                 <a:solidFill>
                   <a:schemeClr val="tx1">
-                    <a:lumMod val="50000"/>
-                    <a:lumOff val="50000"/>
+                    <a:lumMod val="75000"/>
+                    <a:lumOff val="25000"/>
                   </a:schemeClr>
                 </a:solidFill>
               </a:rPr>
-              <a:t>https://www.facebook.com/notes/facebook-engineering/building-facebook-messenger/10150259350998920/</a:t>
+              <a:t>Note: </a:t>
+            </a:r>
+            <a:r>
+              <a:rPr lang="en-US" sz="2400" dirty="0" err="1">
+                <a:solidFill>
+                  <a:schemeClr val="tx1">
+                    <a:lumMod val="75000"/>
+                    <a:lumOff val="25000"/>
+                  </a:schemeClr>
+                </a:solidFill>
+              </a:rPr>
+              <a:t>QoS</a:t>
+            </a:r>
+            <a:r>
+              <a:rPr lang="en-US" sz="2400" dirty="0">
+                <a:solidFill>
+                  <a:schemeClr val="tx1">
+                    <a:lumMod val="75000"/>
+                    <a:lumOff val="25000"/>
+                  </a:schemeClr>
+                </a:solidFill>
+              </a:rPr>
+              <a:t> 0 subscription messages are not preserved while offline</a:t>
             </a:r>
           </a:p>
         </p:txBody>
@@ -10578,7 +10837,7 @@
     </p:spTree>
     <p:extLst>
       <p:ext uri="{BB962C8B-B14F-4D97-AF65-F5344CB8AC3E}">
-        <p14:creationId xmlns:p14="http://schemas.microsoft.com/office/powerpoint/2010/main" val="3302624920"/>
+        <p14:creationId xmlns:p14="http://schemas.microsoft.com/office/powerpoint/2010/main" val="1453693589"/>
       </p:ext>
     </p:extLst>
   </p:cSld>
@@ -10607,7 +10866,7 @@
       </p:grpSpPr>
       <p:sp>
         <p:nvSpPr>
-          <p:cNvPr id="4" name="Title 3"/>
+          <p:cNvPr id="2" name="Title 1"/>
           <p:cNvSpPr>
             <a:spLocks noGrp="1"/>
           </p:cNvSpPr>
@@ -10622,40 +10881,2281 @@
           <a:p>
             <a:r>
               <a:rPr lang="en-US" dirty="0"/>
-              <a:t>Web Apps</a:t>
-            </a:r>
-          </a:p>
-        </p:txBody>
-      </p:sp>
-      <p:sp>
-        <p:nvSpPr>
-          <p:cNvPr id="5" name="Text Placeholder 4"/>
-          <p:cNvSpPr>
-            <a:spLocks noGrp="1"/>
-          </p:cNvSpPr>
-          <p:nvPr>
-            <p:ph type="body" idx="1"/>
-          </p:nvPr>
-        </p:nvSpPr>
-        <p:spPr/>
-        <p:txBody>
-          <a:bodyPr/>
+              <a:t>Publisher/Subscriber Decoupling</a:t>
+            </a:r>
+          </a:p>
+        </p:txBody>
+      </p:sp>
+      <p:sp>
+        <p:nvSpPr>
+          <p:cNvPr id="4" name="Rectangle: Rounded Corners 3">
+            <a:extLst>
+              <a:ext uri="{FF2B5EF4-FFF2-40B4-BE49-F238E27FC236}">
+                <a16:creationId xmlns:a16="http://schemas.microsoft.com/office/drawing/2014/main" id="{DD93AAC4-4D83-4500-AF84-09AE2CA03C4E}"/>
+              </a:ext>
+            </a:extLst>
+          </p:cNvPr>
+          <p:cNvSpPr/>
+          <p:nvPr/>
+        </p:nvSpPr>
+        <p:spPr>
+          <a:xfrm>
+            <a:off x="1005966" y="3535561"/>
+            <a:ext cx="1613848" cy="819150"/>
+          </a:xfrm>
+          <a:prstGeom prst="roundRect">
+            <a:avLst/>
+          </a:prstGeom>
+        </p:spPr>
+        <p:style>
+          <a:lnRef idx="2">
+            <a:schemeClr val="accent1">
+              <a:shade val="50000"/>
+            </a:schemeClr>
+          </a:lnRef>
+          <a:fillRef idx="1">
+            <a:schemeClr val="accent1"/>
+          </a:fillRef>
+          <a:effectRef idx="0">
+            <a:schemeClr val="accent1"/>
+          </a:effectRef>
+          <a:fontRef idx="minor">
+            <a:schemeClr val="lt1"/>
+          </a:fontRef>
+        </p:style>
+        <p:txBody>
+          <a:bodyPr rtlCol="0" anchor="ctr"/>
           <a:lstStyle/>
           <a:p>
+            <a:pPr algn="ctr"/>
+            <a:r>
+              <a:rPr lang="en-US" dirty="0"/>
+              <a:t>IoT Device</a:t>
+            </a:r>
+          </a:p>
+        </p:txBody>
+      </p:sp>
+      <p:sp>
+        <p:nvSpPr>
+          <p:cNvPr id="5" name="Rectangle: Rounded Corners 4">
+            <a:extLst>
+              <a:ext uri="{FF2B5EF4-FFF2-40B4-BE49-F238E27FC236}">
+                <a16:creationId xmlns:a16="http://schemas.microsoft.com/office/drawing/2014/main" id="{1ED6DF0E-A56F-42AF-80E4-0D35592053B4}"/>
+              </a:ext>
+            </a:extLst>
+          </p:cNvPr>
+          <p:cNvSpPr/>
+          <p:nvPr/>
+        </p:nvSpPr>
+        <p:spPr>
+          <a:xfrm>
+            <a:off x="9207974" y="1519237"/>
+            <a:ext cx="1613848" cy="819150"/>
+          </a:xfrm>
+          <a:prstGeom prst="roundRect">
+            <a:avLst/>
+          </a:prstGeom>
+        </p:spPr>
+        <p:style>
+          <a:lnRef idx="2">
+            <a:schemeClr val="accent1">
+              <a:shade val="50000"/>
+            </a:schemeClr>
+          </a:lnRef>
+          <a:fillRef idx="1">
+            <a:schemeClr val="accent1"/>
+          </a:fillRef>
+          <a:effectRef idx="0">
+            <a:schemeClr val="accent1"/>
+          </a:effectRef>
+          <a:fontRef idx="minor">
+            <a:schemeClr val="lt1"/>
+          </a:fontRef>
+        </p:style>
+        <p:txBody>
+          <a:bodyPr rtlCol="0" anchor="ctr"/>
+          <a:lstStyle/>
+          <a:p>
+            <a:pPr algn="ctr"/>
+            <a:r>
+              <a:rPr lang="en-US" dirty="0"/>
+              <a:t>Application</a:t>
+            </a:r>
+          </a:p>
+        </p:txBody>
+      </p:sp>
+      <p:sp>
+        <p:nvSpPr>
+          <p:cNvPr id="6" name="Rectangle: Rounded Corners 5">
+            <a:extLst>
+              <a:ext uri="{FF2B5EF4-FFF2-40B4-BE49-F238E27FC236}">
+                <a16:creationId xmlns:a16="http://schemas.microsoft.com/office/drawing/2014/main" id="{286FCBF6-1300-418C-9F0F-873AC183BAD5}"/>
+              </a:ext>
+            </a:extLst>
+          </p:cNvPr>
+          <p:cNvSpPr/>
+          <p:nvPr/>
+        </p:nvSpPr>
+        <p:spPr>
+          <a:xfrm>
+            <a:off x="9201150" y="2971800"/>
+            <a:ext cx="1613848" cy="819150"/>
+          </a:xfrm>
+          <a:prstGeom prst="roundRect">
+            <a:avLst/>
+          </a:prstGeom>
+        </p:spPr>
+        <p:style>
+          <a:lnRef idx="2">
+            <a:schemeClr val="accent1">
+              <a:shade val="50000"/>
+            </a:schemeClr>
+          </a:lnRef>
+          <a:fillRef idx="1">
+            <a:schemeClr val="accent1"/>
+          </a:fillRef>
+          <a:effectRef idx="0">
+            <a:schemeClr val="accent1"/>
+          </a:effectRef>
+          <a:fontRef idx="minor">
+            <a:schemeClr val="lt1"/>
+          </a:fontRef>
+        </p:style>
+        <p:txBody>
+          <a:bodyPr rtlCol="0" anchor="ctr"/>
+          <a:lstStyle/>
+          <a:p>
+            <a:pPr algn="ctr"/>
+            <a:r>
+              <a:rPr lang="en-US" dirty="0"/>
+              <a:t>Mobile Device</a:t>
+            </a:r>
+          </a:p>
+        </p:txBody>
+      </p:sp>
+      <p:sp>
+        <p:nvSpPr>
+          <p:cNvPr id="7" name="Rectangle: Rounded Corners 6">
+            <a:extLst>
+              <a:ext uri="{FF2B5EF4-FFF2-40B4-BE49-F238E27FC236}">
+                <a16:creationId xmlns:a16="http://schemas.microsoft.com/office/drawing/2014/main" id="{5DE898A0-0F78-4256-B9C1-071661BE1BC4}"/>
+              </a:ext>
+            </a:extLst>
+          </p:cNvPr>
+          <p:cNvSpPr/>
+          <p:nvPr/>
+        </p:nvSpPr>
+        <p:spPr>
+          <a:xfrm>
+            <a:off x="9207974" y="4424363"/>
+            <a:ext cx="1613848" cy="819150"/>
+          </a:xfrm>
+          <a:prstGeom prst="roundRect">
+            <a:avLst/>
+          </a:prstGeom>
+        </p:spPr>
+        <p:style>
+          <a:lnRef idx="2">
+            <a:schemeClr val="accent1">
+              <a:shade val="50000"/>
+            </a:schemeClr>
+          </a:lnRef>
+          <a:fillRef idx="1">
+            <a:schemeClr val="accent1"/>
+          </a:fillRef>
+          <a:effectRef idx="0">
+            <a:schemeClr val="accent1"/>
+          </a:effectRef>
+          <a:fontRef idx="minor">
+            <a:schemeClr val="lt1"/>
+          </a:fontRef>
+        </p:style>
+        <p:txBody>
+          <a:bodyPr rtlCol="0" anchor="ctr"/>
+          <a:lstStyle/>
+          <a:p>
+            <a:pPr algn="ctr"/>
+            <a:r>
+              <a:rPr lang="en-US" dirty="0"/>
+              <a:t>Web App</a:t>
+            </a:r>
+          </a:p>
+        </p:txBody>
+      </p:sp>
+      <p:cxnSp>
+        <p:nvCxnSpPr>
+          <p:cNvPr id="8" name="Straight Arrow Connector 7">
+            <a:extLst>
+              <a:ext uri="{FF2B5EF4-FFF2-40B4-BE49-F238E27FC236}">
+                <a16:creationId xmlns:a16="http://schemas.microsoft.com/office/drawing/2014/main" id="{243CF50F-F807-4AFE-B8F9-1A95FCEBF68C}"/>
+              </a:ext>
+            </a:extLst>
+          </p:cNvPr>
+          <p:cNvCxnSpPr>
+            <a:stCxn id="4" idx="3"/>
+            <a:endCxn id="12" idx="2"/>
+          </p:cNvCxnSpPr>
+          <p:nvPr/>
+        </p:nvCxnSpPr>
+        <p:spPr>
+          <a:xfrm>
+            <a:off x="2619814" y="3945136"/>
+            <a:ext cx="1714061" cy="0"/>
+          </a:xfrm>
+          <a:prstGeom prst="straightConnector1">
+            <a:avLst/>
+          </a:prstGeom>
+          <a:ln w="76200">
+            <a:tailEnd type="triangle"/>
+          </a:ln>
+        </p:spPr>
+        <p:style>
+          <a:lnRef idx="3">
+            <a:schemeClr val="accent1"/>
+          </a:lnRef>
+          <a:fillRef idx="0">
+            <a:schemeClr val="accent1"/>
+          </a:fillRef>
+          <a:effectRef idx="2">
+            <a:schemeClr val="accent1"/>
+          </a:effectRef>
+          <a:fontRef idx="minor">
+            <a:schemeClr val="tx1"/>
+          </a:fontRef>
+        </p:style>
+      </p:cxnSp>
+      <p:cxnSp>
+        <p:nvCxnSpPr>
+          <p:cNvPr id="9" name="Straight Arrow Connector 8">
+            <a:extLst>
+              <a:ext uri="{FF2B5EF4-FFF2-40B4-BE49-F238E27FC236}">
+                <a16:creationId xmlns:a16="http://schemas.microsoft.com/office/drawing/2014/main" id="{75113D3C-5652-4C7B-BDCC-54FEB415A228}"/>
+              </a:ext>
+            </a:extLst>
+          </p:cNvPr>
+          <p:cNvCxnSpPr>
+            <a:cxnSpLocks/>
+            <a:stCxn id="12" idx="5"/>
+            <a:endCxn id="5" idx="1"/>
+          </p:cNvCxnSpPr>
+          <p:nvPr/>
+        </p:nvCxnSpPr>
+        <p:spPr>
+          <a:xfrm flipV="1">
+            <a:off x="7386875" y="1928812"/>
+            <a:ext cx="1821099" cy="1446014"/>
+          </a:xfrm>
+          <a:prstGeom prst="straightConnector1">
+            <a:avLst/>
+          </a:prstGeom>
+          <a:ln w="76200">
+            <a:tailEnd type="triangle"/>
+          </a:ln>
+        </p:spPr>
+        <p:style>
+          <a:lnRef idx="3">
+            <a:schemeClr val="accent1"/>
+          </a:lnRef>
+          <a:fillRef idx="0">
+            <a:schemeClr val="accent1"/>
+          </a:fillRef>
+          <a:effectRef idx="2">
+            <a:schemeClr val="accent1"/>
+          </a:effectRef>
+          <a:fontRef idx="minor">
+            <a:schemeClr val="tx1"/>
+          </a:fontRef>
+        </p:style>
+      </p:cxnSp>
+      <p:cxnSp>
+        <p:nvCxnSpPr>
+          <p:cNvPr id="10" name="Straight Arrow Connector 9">
+            <a:extLst>
+              <a:ext uri="{FF2B5EF4-FFF2-40B4-BE49-F238E27FC236}">
+                <a16:creationId xmlns:a16="http://schemas.microsoft.com/office/drawing/2014/main" id="{20F144C7-3BE9-40BB-BB33-37BA3FA7F108}"/>
+              </a:ext>
+            </a:extLst>
+          </p:cNvPr>
+          <p:cNvCxnSpPr>
+            <a:cxnSpLocks/>
+            <a:stCxn id="12" idx="5"/>
+            <a:endCxn id="6" idx="1"/>
+          </p:cNvCxnSpPr>
+          <p:nvPr/>
+        </p:nvCxnSpPr>
+        <p:spPr>
+          <a:xfrm>
+            <a:off x="7386875" y="3374826"/>
+            <a:ext cx="1814275" cy="6549"/>
+          </a:xfrm>
+          <a:prstGeom prst="straightConnector1">
+            <a:avLst/>
+          </a:prstGeom>
+          <a:ln w="76200">
+            <a:tailEnd type="triangle"/>
+          </a:ln>
+        </p:spPr>
+        <p:style>
+          <a:lnRef idx="3">
+            <a:schemeClr val="accent1"/>
+          </a:lnRef>
+          <a:fillRef idx="0">
+            <a:schemeClr val="accent1"/>
+          </a:fillRef>
+          <a:effectRef idx="2">
+            <a:schemeClr val="accent1"/>
+          </a:effectRef>
+          <a:fontRef idx="minor">
+            <a:schemeClr val="tx1"/>
+          </a:fontRef>
+        </p:style>
+      </p:cxnSp>
+      <p:cxnSp>
+        <p:nvCxnSpPr>
+          <p:cNvPr id="11" name="Straight Arrow Connector 10">
+            <a:extLst>
+              <a:ext uri="{FF2B5EF4-FFF2-40B4-BE49-F238E27FC236}">
+                <a16:creationId xmlns:a16="http://schemas.microsoft.com/office/drawing/2014/main" id="{C366545C-1322-4BB1-956D-44FAFD94DBC2}"/>
+              </a:ext>
+            </a:extLst>
+          </p:cNvPr>
+          <p:cNvCxnSpPr>
+            <a:cxnSpLocks/>
+            <a:stCxn id="12" idx="5"/>
+            <a:endCxn id="7" idx="1"/>
+          </p:cNvCxnSpPr>
+          <p:nvPr/>
+        </p:nvCxnSpPr>
+        <p:spPr>
+          <a:xfrm>
+            <a:off x="7386875" y="3374826"/>
+            <a:ext cx="1821099" cy="1459112"/>
+          </a:xfrm>
+          <a:prstGeom prst="straightConnector1">
+            <a:avLst/>
+          </a:prstGeom>
+          <a:ln w="76200">
+            <a:tailEnd type="triangle"/>
+          </a:ln>
+        </p:spPr>
+        <p:style>
+          <a:lnRef idx="3">
+            <a:schemeClr val="accent1"/>
+          </a:lnRef>
+          <a:fillRef idx="0">
+            <a:schemeClr val="accent1"/>
+          </a:fillRef>
+          <a:effectRef idx="2">
+            <a:schemeClr val="accent1"/>
+          </a:effectRef>
+          <a:fontRef idx="minor">
+            <a:schemeClr val="tx1"/>
+          </a:fontRef>
+        </p:style>
+      </p:cxnSp>
+      <p:sp>
+        <p:nvSpPr>
+          <p:cNvPr id="12" name="Cube 11">
+            <a:extLst>
+              <a:ext uri="{FF2B5EF4-FFF2-40B4-BE49-F238E27FC236}">
+                <a16:creationId xmlns:a16="http://schemas.microsoft.com/office/drawing/2014/main" id="{5B03EE1C-30CA-44E1-89F4-F08280C69856}"/>
+              </a:ext>
+            </a:extLst>
+          </p:cNvPr>
+          <p:cNvSpPr/>
+          <p:nvPr/>
+        </p:nvSpPr>
+        <p:spPr>
+          <a:xfrm>
+            <a:off x="4333875" y="2519362"/>
+            <a:ext cx="3053000" cy="2281238"/>
+          </a:xfrm>
+          <a:prstGeom prst="cube">
+            <a:avLst/>
+          </a:prstGeom>
+          <a:solidFill>
+            <a:schemeClr val="tx1">
+              <a:lumMod val="75000"/>
+              <a:lumOff val="25000"/>
+            </a:schemeClr>
+          </a:solidFill>
+        </p:spPr>
+        <p:style>
+          <a:lnRef idx="2">
+            <a:schemeClr val="accent1">
+              <a:shade val="50000"/>
+            </a:schemeClr>
+          </a:lnRef>
+          <a:fillRef idx="1">
+            <a:schemeClr val="accent1"/>
+          </a:fillRef>
+          <a:effectRef idx="0">
+            <a:schemeClr val="accent1"/>
+          </a:effectRef>
+          <a:fontRef idx="minor">
+            <a:schemeClr val="lt1"/>
+          </a:fontRef>
+        </p:style>
+        <p:txBody>
+          <a:bodyPr rtlCol="0" anchor="ctr"/>
+          <a:lstStyle/>
+          <a:p>
+            <a:pPr algn="ctr"/>
+            <a:r>
+              <a:rPr lang="en-US" dirty="0"/>
+              <a:t>Broker</a:t>
+            </a:r>
+          </a:p>
+        </p:txBody>
+      </p:sp>
+      <p:sp>
+        <p:nvSpPr>
+          <p:cNvPr id="13" name="TextBox 12">
+            <a:extLst>
+              <a:ext uri="{FF2B5EF4-FFF2-40B4-BE49-F238E27FC236}">
+                <a16:creationId xmlns:a16="http://schemas.microsoft.com/office/drawing/2014/main" id="{69EE6EB3-EAAF-47A0-9CC7-601C1BA7ABBA}"/>
+              </a:ext>
+            </a:extLst>
+          </p:cNvPr>
+          <p:cNvSpPr txBox="1"/>
+          <p:nvPr/>
+        </p:nvSpPr>
+        <p:spPr>
+          <a:xfrm>
+            <a:off x="2924175" y="3566517"/>
+            <a:ext cx="864339" cy="923330"/>
+          </a:xfrm>
+          <a:prstGeom prst="rect">
+            <a:avLst/>
+          </a:prstGeom>
+          <a:noFill/>
+        </p:spPr>
+        <p:txBody>
+          <a:bodyPr wrap="none" rtlCol="0">
+            <a:spAutoFit/>
+          </a:bodyPr>
+          <a:lstStyle/>
+          <a:p>
+            <a:r>
+              <a:rPr lang="en-US" dirty="0"/>
+              <a:t>Publish</a:t>
+            </a:r>
+            <a:br>
+              <a:rPr lang="en-US" dirty="0"/>
+            </a:br>
+            <a:br>
+              <a:rPr lang="en-US" dirty="0"/>
+            </a:br>
+            <a:r>
+              <a:rPr lang="en-US" dirty="0" err="1"/>
+              <a:t>QoS</a:t>
+            </a:r>
+            <a:r>
+              <a:rPr lang="en-US" dirty="0"/>
+              <a:t> 1</a:t>
+            </a:r>
+          </a:p>
+        </p:txBody>
+      </p:sp>
+      <p:sp>
+        <p:nvSpPr>
+          <p:cNvPr id="14" name="TextBox 13">
+            <a:extLst>
+              <a:ext uri="{FF2B5EF4-FFF2-40B4-BE49-F238E27FC236}">
+                <a16:creationId xmlns:a16="http://schemas.microsoft.com/office/drawing/2014/main" id="{BC21CB5D-00CC-488C-8EC8-102D6D4ABCEB}"/>
+              </a:ext>
+            </a:extLst>
+          </p:cNvPr>
+          <p:cNvSpPr txBox="1"/>
+          <p:nvPr/>
+        </p:nvSpPr>
+        <p:spPr>
+          <a:xfrm rot="19370004">
+            <a:off x="7384743" y="2389451"/>
+            <a:ext cx="1470274" cy="369332"/>
+          </a:xfrm>
+          <a:prstGeom prst="rect">
+            <a:avLst/>
+          </a:prstGeom>
+          <a:noFill/>
+        </p:spPr>
+        <p:txBody>
+          <a:bodyPr wrap="none" rtlCol="0">
+            <a:spAutoFit/>
+          </a:bodyPr>
+          <a:lstStyle/>
+          <a:p>
+            <a:r>
+              <a:rPr lang="en-US" dirty="0"/>
+              <a:t>Publish </a:t>
+            </a:r>
+            <a:r>
+              <a:rPr lang="en-US" dirty="0" err="1"/>
+              <a:t>QoS</a:t>
+            </a:r>
+            <a:r>
+              <a:rPr lang="en-US" dirty="0"/>
+              <a:t> 0</a:t>
+            </a:r>
+          </a:p>
+        </p:txBody>
+      </p:sp>
+      <p:sp>
+        <p:nvSpPr>
+          <p:cNvPr id="15" name="TextBox 14">
+            <a:extLst>
+              <a:ext uri="{FF2B5EF4-FFF2-40B4-BE49-F238E27FC236}">
+                <a16:creationId xmlns:a16="http://schemas.microsoft.com/office/drawing/2014/main" id="{96852E4A-E2DA-4CF1-98BF-D56727084A73}"/>
+              </a:ext>
+            </a:extLst>
+          </p:cNvPr>
+          <p:cNvSpPr txBox="1"/>
+          <p:nvPr/>
+        </p:nvSpPr>
+        <p:spPr>
+          <a:xfrm>
+            <a:off x="7809345" y="3025615"/>
+            <a:ext cx="864339" cy="369332"/>
+          </a:xfrm>
+          <a:prstGeom prst="rect">
+            <a:avLst/>
+          </a:prstGeom>
+          <a:noFill/>
+        </p:spPr>
+        <p:txBody>
+          <a:bodyPr wrap="none" rtlCol="0">
+            <a:spAutoFit/>
+          </a:bodyPr>
+          <a:lstStyle/>
+          <a:p>
+            <a:r>
+              <a:rPr lang="en-US" dirty="0"/>
+              <a:t>Publish</a:t>
+            </a:r>
+          </a:p>
+        </p:txBody>
+      </p:sp>
+      <p:sp>
+        <p:nvSpPr>
+          <p:cNvPr id="16" name="TextBox 15">
+            <a:extLst>
+              <a:ext uri="{FF2B5EF4-FFF2-40B4-BE49-F238E27FC236}">
+                <a16:creationId xmlns:a16="http://schemas.microsoft.com/office/drawing/2014/main" id="{3E33DBE2-B8A5-47C5-9D6B-E705ED05C7F5}"/>
+              </a:ext>
+            </a:extLst>
+          </p:cNvPr>
+          <p:cNvSpPr txBox="1"/>
+          <p:nvPr/>
+        </p:nvSpPr>
+        <p:spPr>
+          <a:xfrm rot="2306984">
+            <a:off x="7739832" y="3830099"/>
+            <a:ext cx="1470274" cy="369332"/>
+          </a:xfrm>
+          <a:prstGeom prst="rect">
+            <a:avLst/>
+          </a:prstGeom>
+          <a:noFill/>
+        </p:spPr>
+        <p:txBody>
+          <a:bodyPr wrap="none" rtlCol="0">
+            <a:spAutoFit/>
+          </a:bodyPr>
+          <a:lstStyle/>
+          <a:p>
+            <a:r>
+              <a:rPr lang="en-US" dirty="0"/>
+              <a:t>Publish </a:t>
+            </a:r>
+            <a:r>
+              <a:rPr lang="en-US" dirty="0" err="1"/>
+              <a:t>QoS</a:t>
+            </a:r>
+            <a:r>
+              <a:rPr lang="en-US" dirty="0"/>
+              <a:t> 2</a:t>
+            </a:r>
+          </a:p>
+        </p:txBody>
+      </p:sp>
+      <p:sp>
+        <p:nvSpPr>
+          <p:cNvPr id="17" name="TextBox 16">
+            <a:extLst>
+              <a:ext uri="{FF2B5EF4-FFF2-40B4-BE49-F238E27FC236}">
+                <a16:creationId xmlns:a16="http://schemas.microsoft.com/office/drawing/2014/main" id="{FBE3228F-53B0-4156-AEBE-B01778AAE522}"/>
+              </a:ext>
+            </a:extLst>
+          </p:cNvPr>
+          <p:cNvSpPr txBox="1"/>
+          <p:nvPr/>
+        </p:nvSpPr>
+        <p:spPr>
+          <a:xfrm>
+            <a:off x="8969259" y="5584538"/>
+            <a:ext cx="2091278" cy="584775"/>
+          </a:xfrm>
+          <a:prstGeom prst="rect">
+            <a:avLst/>
+          </a:prstGeom>
+          <a:noFill/>
+        </p:spPr>
+        <p:txBody>
+          <a:bodyPr wrap="none" rtlCol="0">
+            <a:spAutoFit/>
+          </a:bodyPr>
+          <a:lstStyle/>
+          <a:p>
+            <a:r>
+              <a:rPr lang="en-US" sz="3200" dirty="0">
+                <a:solidFill>
+                  <a:schemeClr val="bg2">
+                    <a:lumMod val="50000"/>
+                  </a:schemeClr>
+                </a:solidFill>
+              </a:rPr>
+              <a:t>Subscribers</a:t>
+            </a:r>
+          </a:p>
+        </p:txBody>
+      </p:sp>
+      <p:sp>
+        <p:nvSpPr>
+          <p:cNvPr id="18" name="TextBox 17">
+            <a:extLst>
+              <a:ext uri="{FF2B5EF4-FFF2-40B4-BE49-F238E27FC236}">
+                <a16:creationId xmlns:a16="http://schemas.microsoft.com/office/drawing/2014/main" id="{7BEDFF3C-C39E-42C5-8B67-B07D58797CC3}"/>
+              </a:ext>
+            </a:extLst>
+          </p:cNvPr>
+          <p:cNvSpPr txBox="1"/>
+          <p:nvPr/>
+        </p:nvSpPr>
+        <p:spPr>
+          <a:xfrm>
+            <a:off x="942299" y="5584538"/>
+            <a:ext cx="1741182" cy="584775"/>
+          </a:xfrm>
+          <a:prstGeom prst="rect">
+            <a:avLst/>
+          </a:prstGeom>
+          <a:noFill/>
+        </p:spPr>
+        <p:txBody>
+          <a:bodyPr wrap="none" rtlCol="0">
+            <a:spAutoFit/>
+          </a:bodyPr>
+          <a:lstStyle/>
+          <a:p>
+            <a:r>
+              <a:rPr lang="en-US" sz="3200" dirty="0">
+                <a:solidFill>
+                  <a:schemeClr val="bg2">
+                    <a:lumMod val="50000"/>
+                  </a:schemeClr>
+                </a:solidFill>
+              </a:rPr>
+              <a:t>Publisher</a:t>
+            </a:r>
+            <a:endParaRPr lang="en-US" dirty="0">
+              <a:solidFill>
+                <a:schemeClr val="bg2">
+                  <a:lumMod val="50000"/>
+                </a:schemeClr>
+              </a:solidFill>
+            </a:endParaRPr>
+          </a:p>
+        </p:txBody>
+      </p:sp>
+      <p:sp>
+        <p:nvSpPr>
+          <p:cNvPr id="19" name="TextBox 18">
+            <a:extLst>
+              <a:ext uri="{FF2B5EF4-FFF2-40B4-BE49-F238E27FC236}">
+                <a16:creationId xmlns:a16="http://schemas.microsoft.com/office/drawing/2014/main" id="{79FF4654-D6B9-477F-B48C-46C907677386}"/>
+              </a:ext>
+            </a:extLst>
+          </p:cNvPr>
+          <p:cNvSpPr txBox="1"/>
+          <p:nvPr/>
+        </p:nvSpPr>
+        <p:spPr>
+          <a:xfrm>
+            <a:off x="1360266" y="3197185"/>
+            <a:ext cx="905248" cy="369332"/>
+          </a:xfrm>
+          <a:prstGeom prst="rect">
+            <a:avLst/>
+          </a:prstGeom>
+          <a:noFill/>
+        </p:spPr>
+        <p:txBody>
+          <a:bodyPr wrap="none" rtlCol="0">
+            <a:spAutoFit/>
+          </a:bodyPr>
+          <a:lstStyle/>
+          <a:p>
+            <a:r>
+              <a:rPr lang="en-US" dirty="0">
+                <a:solidFill>
+                  <a:schemeClr val="bg2">
+                    <a:lumMod val="50000"/>
+                  </a:schemeClr>
+                </a:solidFill>
+              </a:rPr>
+              <a:t>Sensors</a:t>
+            </a:r>
+          </a:p>
+        </p:txBody>
+      </p:sp>
+      <p:sp>
+        <p:nvSpPr>
+          <p:cNvPr id="20" name="Rectangle 19">
+            <a:extLst>
+              <a:ext uri="{FF2B5EF4-FFF2-40B4-BE49-F238E27FC236}">
+                <a16:creationId xmlns:a16="http://schemas.microsoft.com/office/drawing/2014/main" id="{48D97172-71B8-4D46-926D-EB08460B4A24}"/>
+              </a:ext>
+            </a:extLst>
+          </p:cNvPr>
+          <p:cNvSpPr/>
+          <p:nvPr/>
+        </p:nvSpPr>
+        <p:spPr>
+          <a:xfrm>
+            <a:off x="449705" y="1519237"/>
+            <a:ext cx="7525062" cy="5016474"/>
+          </a:xfrm>
+          <a:prstGeom prst="rect">
+            <a:avLst/>
+          </a:prstGeom>
+          <a:noFill/>
+          <a:ln w="38100">
+            <a:solidFill>
+              <a:srgbClr val="FF0000"/>
+            </a:solidFill>
+          </a:ln>
+        </p:spPr>
+        <p:style>
+          <a:lnRef idx="2">
+            <a:schemeClr val="accent1">
+              <a:shade val="50000"/>
+            </a:schemeClr>
+          </a:lnRef>
+          <a:fillRef idx="1">
+            <a:schemeClr val="accent1"/>
+          </a:fillRef>
+          <a:effectRef idx="0">
+            <a:schemeClr val="accent1"/>
+          </a:effectRef>
+          <a:fontRef idx="minor">
+            <a:schemeClr val="lt1"/>
+          </a:fontRef>
+        </p:style>
+        <p:txBody>
+          <a:bodyPr rtlCol="0" anchor="ctr"/>
+          <a:lstStyle/>
+          <a:p>
+            <a:pPr algn="ctr"/>
             <a:endParaRPr lang="en-US"/>
+          </a:p>
+        </p:txBody>
+      </p:sp>
+      <p:sp>
+        <p:nvSpPr>
+          <p:cNvPr id="21" name="Rectangle 20">
+            <a:extLst>
+              <a:ext uri="{FF2B5EF4-FFF2-40B4-BE49-F238E27FC236}">
+                <a16:creationId xmlns:a16="http://schemas.microsoft.com/office/drawing/2014/main" id="{FB5BD4BD-511E-43CB-AB36-1465580C9757}"/>
+              </a:ext>
+            </a:extLst>
+          </p:cNvPr>
+          <p:cNvSpPr/>
+          <p:nvPr/>
+        </p:nvSpPr>
+        <p:spPr>
+          <a:xfrm>
+            <a:off x="4092875" y="1334125"/>
+            <a:ext cx="7525062" cy="5201586"/>
+          </a:xfrm>
+          <a:prstGeom prst="rect">
+            <a:avLst/>
+          </a:prstGeom>
+          <a:noFill/>
+          <a:ln w="38100">
+            <a:solidFill>
+              <a:srgbClr val="FF0000"/>
+            </a:solidFill>
+          </a:ln>
+        </p:spPr>
+        <p:style>
+          <a:lnRef idx="2">
+            <a:schemeClr val="accent1">
+              <a:shade val="50000"/>
+            </a:schemeClr>
+          </a:lnRef>
+          <a:fillRef idx="1">
+            <a:schemeClr val="accent1"/>
+          </a:fillRef>
+          <a:effectRef idx="0">
+            <a:schemeClr val="accent1"/>
+          </a:effectRef>
+          <a:fontRef idx="minor">
+            <a:schemeClr val="lt1"/>
+          </a:fontRef>
+        </p:style>
+        <p:txBody>
+          <a:bodyPr rtlCol="0" anchor="ctr"/>
+          <a:lstStyle/>
+          <a:p>
+            <a:pPr algn="ctr"/>
+            <a:endParaRPr lang="en-US"/>
+          </a:p>
+        </p:txBody>
+      </p:sp>
+      <p:sp>
+        <p:nvSpPr>
+          <p:cNvPr id="22" name="TextBox 21">
+            <a:extLst>
+              <a:ext uri="{FF2B5EF4-FFF2-40B4-BE49-F238E27FC236}">
+                <a16:creationId xmlns:a16="http://schemas.microsoft.com/office/drawing/2014/main" id="{1C62BFD2-E07C-46C6-871B-7EBCB9971064}"/>
+              </a:ext>
+            </a:extLst>
+          </p:cNvPr>
+          <p:cNvSpPr txBox="1"/>
+          <p:nvPr/>
+        </p:nvSpPr>
+        <p:spPr>
+          <a:xfrm>
+            <a:off x="1214723" y="2563950"/>
+            <a:ext cx="1351652" cy="461665"/>
+          </a:xfrm>
+          <a:prstGeom prst="rect">
+            <a:avLst/>
+          </a:prstGeom>
+          <a:noFill/>
+        </p:spPr>
+        <p:txBody>
+          <a:bodyPr wrap="none" rtlCol="0">
+            <a:spAutoFit/>
+          </a:bodyPr>
+          <a:lstStyle/>
+          <a:p>
+            <a:r>
+              <a:rPr lang="en-US" sz="2400" dirty="0">
+                <a:solidFill>
+                  <a:srgbClr val="FF0000"/>
+                </a:solidFill>
+              </a:rPr>
+              <a:t>Publisher</a:t>
+            </a:r>
+            <a:endParaRPr lang="en-US" dirty="0">
+              <a:solidFill>
+                <a:srgbClr val="FF0000"/>
+              </a:solidFill>
+            </a:endParaRPr>
+          </a:p>
+        </p:txBody>
+      </p:sp>
+      <p:sp>
+        <p:nvSpPr>
+          <p:cNvPr id="23" name="Rectangle 22">
+            <a:extLst>
+              <a:ext uri="{FF2B5EF4-FFF2-40B4-BE49-F238E27FC236}">
+                <a16:creationId xmlns:a16="http://schemas.microsoft.com/office/drawing/2014/main" id="{A7CD57C4-C382-4A1D-ABDD-C309DB854726}"/>
+              </a:ext>
+            </a:extLst>
+          </p:cNvPr>
+          <p:cNvSpPr/>
+          <p:nvPr/>
+        </p:nvSpPr>
+        <p:spPr>
+          <a:xfrm>
+            <a:off x="5222940" y="1804030"/>
+            <a:ext cx="1746119" cy="461665"/>
+          </a:xfrm>
+          <a:prstGeom prst="rect">
+            <a:avLst/>
+          </a:prstGeom>
+        </p:spPr>
+        <p:txBody>
+          <a:bodyPr wrap="none">
+            <a:spAutoFit/>
+          </a:bodyPr>
+          <a:lstStyle/>
+          <a:p>
+            <a:r>
+              <a:rPr lang="en-US" sz="2400" dirty="0">
+                <a:solidFill>
+                  <a:srgbClr val="FF0000"/>
+                </a:solidFill>
+              </a:rPr>
+              <a:t>"Subscriber"</a:t>
+            </a:r>
+            <a:endParaRPr lang="en-US" dirty="0">
+              <a:solidFill>
+                <a:srgbClr val="FF0000"/>
+              </a:solidFill>
+            </a:endParaRPr>
+          </a:p>
+        </p:txBody>
+      </p:sp>
+      <p:sp>
+        <p:nvSpPr>
+          <p:cNvPr id="24" name="Rectangle 23">
+            <a:extLst>
+              <a:ext uri="{FF2B5EF4-FFF2-40B4-BE49-F238E27FC236}">
+                <a16:creationId xmlns:a16="http://schemas.microsoft.com/office/drawing/2014/main" id="{987C246C-FD26-4EFC-83BC-1024E22EE4D9}"/>
+              </a:ext>
+            </a:extLst>
+          </p:cNvPr>
+          <p:cNvSpPr/>
+          <p:nvPr/>
+        </p:nvSpPr>
+        <p:spPr>
+          <a:xfrm>
+            <a:off x="5222940" y="1988486"/>
+            <a:ext cx="1598515" cy="461665"/>
+          </a:xfrm>
+          <a:prstGeom prst="rect">
+            <a:avLst/>
+          </a:prstGeom>
+        </p:spPr>
+        <p:txBody>
+          <a:bodyPr wrap="none">
+            <a:spAutoFit/>
+          </a:bodyPr>
+          <a:lstStyle/>
+          <a:p>
+            <a:r>
+              <a:rPr lang="en-US" sz="2400" dirty="0">
+                <a:solidFill>
+                  <a:srgbClr val="FF0000"/>
+                </a:solidFill>
+              </a:rPr>
+              <a:t>"Publisher"</a:t>
+            </a:r>
+            <a:endParaRPr lang="en-US" dirty="0">
+              <a:solidFill>
+                <a:srgbClr val="FF0000"/>
+              </a:solidFill>
+            </a:endParaRPr>
+          </a:p>
+        </p:txBody>
+      </p:sp>
+      <p:sp>
+        <p:nvSpPr>
+          <p:cNvPr id="25" name="TextBox 24">
+            <a:extLst>
+              <a:ext uri="{FF2B5EF4-FFF2-40B4-BE49-F238E27FC236}">
+                <a16:creationId xmlns:a16="http://schemas.microsoft.com/office/drawing/2014/main" id="{64D17D68-3428-401A-B15D-7945B40DF85D}"/>
+              </a:ext>
+            </a:extLst>
+          </p:cNvPr>
+          <p:cNvSpPr txBox="1"/>
+          <p:nvPr/>
+        </p:nvSpPr>
+        <p:spPr>
+          <a:xfrm>
+            <a:off x="9265269" y="2398215"/>
+            <a:ext cx="1499257" cy="461665"/>
+          </a:xfrm>
+          <a:prstGeom prst="rect">
+            <a:avLst/>
+          </a:prstGeom>
+          <a:noFill/>
+        </p:spPr>
+        <p:txBody>
+          <a:bodyPr wrap="none" rtlCol="0">
+            <a:spAutoFit/>
+          </a:bodyPr>
+          <a:lstStyle/>
+          <a:p>
+            <a:r>
+              <a:rPr lang="en-US" sz="2400" dirty="0">
+                <a:solidFill>
+                  <a:srgbClr val="FF0000"/>
+                </a:solidFill>
+              </a:rPr>
+              <a:t>Subscriber</a:t>
+            </a:r>
+            <a:endParaRPr lang="en-US" dirty="0">
+              <a:solidFill>
+                <a:srgbClr val="FF0000"/>
+              </a:solidFill>
+            </a:endParaRPr>
           </a:p>
         </p:txBody>
       </p:sp>
     </p:spTree>
     <p:extLst>
       <p:ext uri="{BB962C8B-B14F-4D97-AF65-F5344CB8AC3E}">
-        <p14:creationId xmlns:p14="http://schemas.microsoft.com/office/powerpoint/2010/main" val="1509704479"/>
+        <p14:creationId xmlns:p14="http://schemas.microsoft.com/office/powerpoint/2010/main" val="727911454"/>
       </p:ext>
     </p:extLst>
   </p:cSld>
   <p:clrMapOvr>
     <a:masterClrMapping/>
   </p:clrMapOvr>
+  <p:timing>
+    <p:tnLst>
+      <p:par>
+        <p:cTn id="1" dur="indefinite" restart="never" nodeType="tmRoot">
+          <p:childTnLst>
+            <p:seq concurrent="1" nextAc="seek">
+              <p:cTn id="2" dur="indefinite" nodeType="mainSeq">
+                <p:childTnLst>
+                  <p:par>
+                    <p:cTn id="3" fill="hold">
+                      <p:stCondLst>
+                        <p:cond delay="indefinite"/>
+                      </p:stCondLst>
+                      <p:childTnLst>
+                        <p:par>
+                          <p:cTn id="4" fill="hold">
+                            <p:stCondLst>
+                              <p:cond delay="0"/>
+                            </p:stCondLst>
+                            <p:childTnLst>
+                              <p:par>
+                                <p:cTn id="5" presetID="1" presetClass="entr" presetSubtype="0" fill="hold" nodeType="clickEffect">
+                                  <p:stCondLst>
+                                    <p:cond delay="0"/>
+                                  </p:stCondLst>
+                                  <p:childTnLst>
+                                    <p:set>
+                                      <p:cBhvr>
+                                        <p:cTn id="6" dur="1" fill="hold">
+                                          <p:stCondLst>
+                                            <p:cond delay="0"/>
+                                          </p:stCondLst>
+                                        </p:cTn>
+                                        <p:tgtEl>
+                                          <p:spTgt spid="8"/>
+                                        </p:tgtEl>
+                                        <p:attrNameLst>
+                                          <p:attrName>style.visibility</p:attrName>
+                                        </p:attrNameLst>
+                                      </p:cBhvr>
+                                      <p:to>
+                                        <p:strVal val="visible"/>
+                                      </p:to>
+                                    </p:set>
+                                  </p:childTnLst>
+                                </p:cTn>
+                              </p:par>
+                              <p:par>
+                                <p:cTn id="7" presetID="1" presetClass="entr" presetSubtype="0" fill="hold" grpId="0" nodeType="withEffect">
+                                  <p:stCondLst>
+                                    <p:cond delay="0"/>
+                                  </p:stCondLst>
+                                  <p:childTnLst>
+                                    <p:set>
+                                      <p:cBhvr>
+                                        <p:cTn id="8" dur="1" fill="hold">
+                                          <p:stCondLst>
+                                            <p:cond delay="0"/>
+                                          </p:stCondLst>
+                                        </p:cTn>
+                                        <p:tgtEl>
+                                          <p:spTgt spid="13"/>
+                                        </p:tgtEl>
+                                        <p:attrNameLst>
+                                          <p:attrName>style.visibility</p:attrName>
+                                        </p:attrNameLst>
+                                      </p:cBhvr>
+                                      <p:to>
+                                        <p:strVal val="visible"/>
+                                      </p:to>
+                                    </p:set>
+                                  </p:childTnLst>
+                                </p:cTn>
+                              </p:par>
+                            </p:childTnLst>
+                          </p:cTn>
+                        </p:par>
+                      </p:childTnLst>
+                    </p:cTn>
+                  </p:par>
+                  <p:par>
+                    <p:cTn id="9" fill="hold">
+                      <p:stCondLst>
+                        <p:cond delay="indefinite"/>
+                      </p:stCondLst>
+                      <p:childTnLst>
+                        <p:par>
+                          <p:cTn id="10" fill="hold">
+                            <p:stCondLst>
+                              <p:cond delay="0"/>
+                            </p:stCondLst>
+                            <p:childTnLst>
+                              <p:par>
+                                <p:cTn id="11" presetID="10" presetClass="entr" presetSubtype="0" fill="hold" grpId="0" nodeType="clickEffect">
+                                  <p:stCondLst>
+                                    <p:cond delay="0"/>
+                                  </p:stCondLst>
+                                  <p:childTnLst>
+                                    <p:set>
+                                      <p:cBhvr>
+                                        <p:cTn id="12" dur="1" fill="hold">
+                                          <p:stCondLst>
+                                            <p:cond delay="0"/>
+                                          </p:stCondLst>
+                                        </p:cTn>
+                                        <p:tgtEl>
+                                          <p:spTgt spid="20"/>
+                                        </p:tgtEl>
+                                        <p:attrNameLst>
+                                          <p:attrName>style.visibility</p:attrName>
+                                        </p:attrNameLst>
+                                      </p:cBhvr>
+                                      <p:to>
+                                        <p:strVal val="visible"/>
+                                      </p:to>
+                                    </p:set>
+                                    <p:animEffect transition="in" filter="fade">
+                                      <p:cBhvr>
+                                        <p:cTn id="13" dur="500"/>
+                                        <p:tgtEl>
+                                          <p:spTgt spid="20"/>
+                                        </p:tgtEl>
+                                      </p:cBhvr>
+                                    </p:animEffect>
+                                  </p:childTnLst>
+                                </p:cTn>
+                              </p:par>
+                              <p:par>
+                                <p:cTn id="14" presetID="10" presetClass="entr" presetSubtype="0" fill="hold" grpId="0" nodeType="withEffect">
+                                  <p:stCondLst>
+                                    <p:cond delay="0"/>
+                                  </p:stCondLst>
+                                  <p:childTnLst>
+                                    <p:set>
+                                      <p:cBhvr>
+                                        <p:cTn id="15" dur="1" fill="hold">
+                                          <p:stCondLst>
+                                            <p:cond delay="0"/>
+                                          </p:stCondLst>
+                                        </p:cTn>
+                                        <p:tgtEl>
+                                          <p:spTgt spid="22"/>
+                                        </p:tgtEl>
+                                        <p:attrNameLst>
+                                          <p:attrName>style.visibility</p:attrName>
+                                        </p:attrNameLst>
+                                      </p:cBhvr>
+                                      <p:to>
+                                        <p:strVal val="visible"/>
+                                      </p:to>
+                                    </p:set>
+                                    <p:animEffect transition="in" filter="fade">
+                                      <p:cBhvr>
+                                        <p:cTn id="16" dur="500"/>
+                                        <p:tgtEl>
+                                          <p:spTgt spid="22"/>
+                                        </p:tgtEl>
+                                      </p:cBhvr>
+                                    </p:animEffect>
+                                  </p:childTnLst>
+                                </p:cTn>
+                              </p:par>
+                              <p:par>
+                                <p:cTn id="17" presetID="10" presetClass="entr" presetSubtype="0" fill="hold" grpId="0" nodeType="withEffect">
+                                  <p:stCondLst>
+                                    <p:cond delay="0"/>
+                                  </p:stCondLst>
+                                  <p:childTnLst>
+                                    <p:set>
+                                      <p:cBhvr>
+                                        <p:cTn id="18" dur="1" fill="hold">
+                                          <p:stCondLst>
+                                            <p:cond delay="0"/>
+                                          </p:stCondLst>
+                                        </p:cTn>
+                                        <p:tgtEl>
+                                          <p:spTgt spid="23"/>
+                                        </p:tgtEl>
+                                        <p:attrNameLst>
+                                          <p:attrName>style.visibility</p:attrName>
+                                        </p:attrNameLst>
+                                      </p:cBhvr>
+                                      <p:to>
+                                        <p:strVal val="visible"/>
+                                      </p:to>
+                                    </p:set>
+                                    <p:animEffect transition="in" filter="fade">
+                                      <p:cBhvr>
+                                        <p:cTn id="19" dur="500"/>
+                                        <p:tgtEl>
+                                          <p:spTgt spid="23"/>
+                                        </p:tgtEl>
+                                      </p:cBhvr>
+                                    </p:animEffect>
+                                  </p:childTnLst>
+                                </p:cTn>
+                              </p:par>
+                            </p:childTnLst>
+                          </p:cTn>
+                        </p:par>
+                      </p:childTnLst>
+                    </p:cTn>
+                  </p:par>
+                  <p:par>
+                    <p:cTn id="20" fill="hold">
+                      <p:stCondLst>
+                        <p:cond delay="indefinite"/>
+                      </p:stCondLst>
+                      <p:childTnLst>
+                        <p:par>
+                          <p:cTn id="21" fill="hold">
+                            <p:stCondLst>
+                              <p:cond delay="0"/>
+                            </p:stCondLst>
+                            <p:childTnLst>
+                              <p:par>
+                                <p:cTn id="22" presetID="10" presetClass="exit" presetSubtype="0" fill="hold" nodeType="clickEffect">
+                                  <p:stCondLst>
+                                    <p:cond delay="0"/>
+                                  </p:stCondLst>
+                                  <p:childTnLst>
+                                    <p:animEffect transition="out" filter="fade">
+                                      <p:cBhvr>
+                                        <p:cTn id="23" dur="500"/>
+                                        <p:tgtEl>
+                                          <p:spTgt spid="8"/>
+                                        </p:tgtEl>
+                                      </p:cBhvr>
+                                    </p:animEffect>
+                                    <p:set>
+                                      <p:cBhvr>
+                                        <p:cTn id="24" dur="1" fill="hold">
+                                          <p:stCondLst>
+                                            <p:cond delay="499"/>
+                                          </p:stCondLst>
+                                        </p:cTn>
+                                        <p:tgtEl>
+                                          <p:spTgt spid="8"/>
+                                        </p:tgtEl>
+                                        <p:attrNameLst>
+                                          <p:attrName>style.visibility</p:attrName>
+                                        </p:attrNameLst>
+                                      </p:cBhvr>
+                                      <p:to>
+                                        <p:strVal val="hidden"/>
+                                      </p:to>
+                                    </p:set>
+                                  </p:childTnLst>
+                                </p:cTn>
+                              </p:par>
+                              <p:par>
+                                <p:cTn id="25" presetID="10" presetClass="exit" presetSubtype="0" fill="hold" grpId="1" nodeType="withEffect">
+                                  <p:stCondLst>
+                                    <p:cond delay="0"/>
+                                  </p:stCondLst>
+                                  <p:childTnLst>
+                                    <p:animEffect transition="out" filter="fade">
+                                      <p:cBhvr>
+                                        <p:cTn id="26" dur="500"/>
+                                        <p:tgtEl>
+                                          <p:spTgt spid="13"/>
+                                        </p:tgtEl>
+                                      </p:cBhvr>
+                                    </p:animEffect>
+                                    <p:set>
+                                      <p:cBhvr>
+                                        <p:cTn id="27" dur="1" fill="hold">
+                                          <p:stCondLst>
+                                            <p:cond delay="499"/>
+                                          </p:stCondLst>
+                                        </p:cTn>
+                                        <p:tgtEl>
+                                          <p:spTgt spid="13"/>
+                                        </p:tgtEl>
+                                        <p:attrNameLst>
+                                          <p:attrName>style.visibility</p:attrName>
+                                        </p:attrNameLst>
+                                      </p:cBhvr>
+                                      <p:to>
+                                        <p:strVal val="hidden"/>
+                                      </p:to>
+                                    </p:set>
+                                  </p:childTnLst>
+                                </p:cTn>
+                              </p:par>
+                              <p:par>
+                                <p:cTn id="28" presetID="1" presetClass="exit" presetSubtype="0" fill="hold" grpId="1" nodeType="withEffect">
+                                  <p:stCondLst>
+                                    <p:cond delay="0"/>
+                                  </p:stCondLst>
+                                  <p:childTnLst>
+                                    <p:set>
+                                      <p:cBhvr>
+                                        <p:cTn id="29" dur="1" fill="hold">
+                                          <p:stCondLst>
+                                            <p:cond delay="0"/>
+                                          </p:stCondLst>
+                                        </p:cTn>
+                                        <p:tgtEl>
+                                          <p:spTgt spid="20"/>
+                                        </p:tgtEl>
+                                        <p:attrNameLst>
+                                          <p:attrName>style.visibility</p:attrName>
+                                        </p:attrNameLst>
+                                      </p:cBhvr>
+                                      <p:to>
+                                        <p:strVal val="hidden"/>
+                                      </p:to>
+                                    </p:set>
+                                  </p:childTnLst>
+                                </p:cTn>
+                              </p:par>
+                              <p:par>
+                                <p:cTn id="30" presetID="1" presetClass="exit" presetSubtype="0" fill="hold" grpId="1" nodeType="withEffect">
+                                  <p:stCondLst>
+                                    <p:cond delay="0"/>
+                                  </p:stCondLst>
+                                  <p:childTnLst>
+                                    <p:set>
+                                      <p:cBhvr>
+                                        <p:cTn id="31" dur="1" fill="hold">
+                                          <p:stCondLst>
+                                            <p:cond delay="0"/>
+                                          </p:stCondLst>
+                                        </p:cTn>
+                                        <p:tgtEl>
+                                          <p:spTgt spid="22"/>
+                                        </p:tgtEl>
+                                        <p:attrNameLst>
+                                          <p:attrName>style.visibility</p:attrName>
+                                        </p:attrNameLst>
+                                      </p:cBhvr>
+                                      <p:to>
+                                        <p:strVal val="hidden"/>
+                                      </p:to>
+                                    </p:set>
+                                  </p:childTnLst>
+                                </p:cTn>
+                              </p:par>
+                              <p:par>
+                                <p:cTn id="32" presetID="1" presetClass="exit" presetSubtype="0" fill="hold" grpId="1" nodeType="withEffect">
+                                  <p:stCondLst>
+                                    <p:cond delay="0"/>
+                                  </p:stCondLst>
+                                  <p:childTnLst>
+                                    <p:set>
+                                      <p:cBhvr>
+                                        <p:cTn id="33" dur="1" fill="hold">
+                                          <p:stCondLst>
+                                            <p:cond delay="0"/>
+                                          </p:stCondLst>
+                                        </p:cTn>
+                                        <p:tgtEl>
+                                          <p:spTgt spid="23"/>
+                                        </p:tgtEl>
+                                        <p:attrNameLst>
+                                          <p:attrName>style.visibility</p:attrName>
+                                        </p:attrNameLst>
+                                      </p:cBhvr>
+                                      <p:to>
+                                        <p:strVal val="hidden"/>
+                                      </p:to>
+                                    </p:set>
+                                  </p:childTnLst>
+                                </p:cTn>
+                              </p:par>
+                            </p:childTnLst>
+                          </p:cTn>
+                        </p:par>
+                      </p:childTnLst>
+                    </p:cTn>
+                  </p:par>
+                  <p:par>
+                    <p:cTn id="34" fill="hold">
+                      <p:stCondLst>
+                        <p:cond delay="indefinite"/>
+                      </p:stCondLst>
+                      <p:childTnLst>
+                        <p:par>
+                          <p:cTn id="35" fill="hold">
+                            <p:stCondLst>
+                              <p:cond delay="0"/>
+                            </p:stCondLst>
+                            <p:childTnLst>
+                              <p:par>
+                                <p:cTn id="36" presetID="1" presetClass="entr" presetSubtype="0" fill="hold" nodeType="clickEffect">
+                                  <p:stCondLst>
+                                    <p:cond delay="0"/>
+                                  </p:stCondLst>
+                                  <p:childTnLst>
+                                    <p:set>
+                                      <p:cBhvr>
+                                        <p:cTn id="37" dur="1" fill="hold">
+                                          <p:stCondLst>
+                                            <p:cond delay="0"/>
+                                          </p:stCondLst>
+                                        </p:cTn>
+                                        <p:tgtEl>
+                                          <p:spTgt spid="11"/>
+                                        </p:tgtEl>
+                                        <p:attrNameLst>
+                                          <p:attrName>style.visibility</p:attrName>
+                                        </p:attrNameLst>
+                                      </p:cBhvr>
+                                      <p:to>
+                                        <p:strVal val="visible"/>
+                                      </p:to>
+                                    </p:set>
+                                  </p:childTnLst>
+                                </p:cTn>
+                              </p:par>
+                              <p:par>
+                                <p:cTn id="38" presetID="1" presetClass="entr" presetSubtype="0" fill="hold" grpId="0" nodeType="withEffect">
+                                  <p:stCondLst>
+                                    <p:cond delay="0"/>
+                                  </p:stCondLst>
+                                  <p:childTnLst>
+                                    <p:set>
+                                      <p:cBhvr>
+                                        <p:cTn id="39" dur="1" fill="hold">
+                                          <p:stCondLst>
+                                            <p:cond delay="0"/>
+                                          </p:stCondLst>
+                                        </p:cTn>
+                                        <p:tgtEl>
+                                          <p:spTgt spid="16"/>
+                                        </p:tgtEl>
+                                        <p:attrNameLst>
+                                          <p:attrName>style.visibility</p:attrName>
+                                        </p:attrNameLst>
+                                      </p:cBhvr>
+                                      <p:to>
+                                        <p:strVal val="visible"/>
+                                      </p:to>
+                                    </p:set>
+                                  </p:childTnLst>
+                                </p:cTn>
+                              </p:par>
+                              <p:par>
+                                <p:cTn id="40" presetID="1" presetClass="entr" presetSubtype="0" fill="hold" nodeType="withEffect">
+                                  <p:stCondLst>
+                                    <p:cond delay="0"/>
+                                  </p:stCondLst>
+                                  <p:childTnLst>
+                                    <p:set>
+                                      <p:cBhvr>
+                                        <p:cTn id="41" dur="1" fill="hold">
+                                          <p:stCondLst>
+                                            <p:cond delay="0"/>
+                                          </p:stCondLst>
+                                        </p:cTn>
+                                        <p:tgtEl>
+                                          <p:spTgt spid="10"/>
+                                        </p:tgtEl>
+                                        <p:attrNameLst>
+                                          <p:attrName>style.visibility</p:attrName>
+                                        </p:attrNameLst>
+                                      </p:cBhvr>
+                                      <p:to>
+                                        <p:strVal val="visible"/>
+                                      </p:to>
+                                    </p:set>
+                                  </p:childTnLst>
+                                </p:cTn>
+                              </p:par>
+                              <p:par>
+                                <p:cTn id="42" presetID="1" presetClass="entr" presetSubtype="0" fill="hold" grpId="0" nodeType="withEffect">
+                                  <p:stCondLst>
+                                    <p:cond delay="0"/>
+                                  </p:stCondLst>
+                                  <p:childTnLst>
+                                    <p:set>
+                                      <p:cBhvr>
+                                        <p:cTn id="43" dur="1" fill="hold">
+                                          <p:stCondLst>
+                                            <p:cond delay="0"/>
+                                          </p:stCondLst>
+                                        </p:cTn>
+                                        <p:tgtEl>
+                                          <p:spTgt spid="15"/>
+                                        </p:tgtEl>
+                                        <p:attrNameLst>
+                                          <p:attrName>style.visibility</p:attrName>
+                                        </p:attrNameLst>
+                                      </p:cBhvr>
+                                      <p:to>
+                                        <p:strVal val="visible"/>
+                                      </p:to>
+                                    </p:set>
+                                  </p:childTnLst>
+                                </p:cTn>
+                              </p:par>
+                              <p:par>
+                                <p:cTn id="44" presetID="1" presetClass="entr" presetSubtype="0" fill="hold" nodeType="withEffect">
+                                  <p:stCondLst>
+                                    <p:cond delay="0"/>
+                                  </p:stCondLst>
+                                  <p:childTnLst>
+                                    <p:set>
+                                      <p:cBhvr>
+                                        <p:cTn id="45" dur="1" fill="hold">
+                                          <p:stCondLst>
+                                            <p:cond delay="0"/>
+                                          </p:stCondLst>
+                                        </p:cTn>
+                                        <p:tgtEl>
+                                          <p:spTgt spid="9"/>
+                                        </p:tgtEl>
+                                        <p:attrNameLst>
+                                          <p:attrName>style.visibility</p:attrName>
+                                        </p:attrNameLst>
+                                      </p:cBhvr>
+                                      <p:to>
+                                        <p:strVal val="visible"/>
+                                      </p:to>
+                                    </p:set>
+                                  </p:childTnLst>
+                                </p:cTn>
+                              </p:par>
+                              <p:par>
+                                <p:cTn id="46" presetID="1" presetClass="entr" presetSubtype="0" fill="hold" grpId="0" nodeType="withEffect">
+                                  <p:stCondLst>
+                                    <p:cond delay="0"/>
+                                  </p:stCondLst>
+                                  <p:childTnLst>
+                                    <p:set>
+                                      <p:cBhvr>
+                                        <p:cTn id="47" dur="1" fill="hold">
+                                          <p:stCondLst>
+                                            <p:cond delay="0"/>
+                                          </p:stCondLst>
+                                        </p:cTn>
+                                        <p:tgtEl>
+                                          <p:spTgt spid="14"/>
+                                        </p:tgtEl>
+                                        <p:attrNameLst>
+                                          <p:attrName>style.visibility</p:attrName>
+                                        </p:attrNameLst>
+                                      </p:cBhvr>
+                                      <p:to>
+                                        <p:strVal val="visible"/>
+                                      </p:to>
+                                    </p:set>
+                                  </p:childTnLst>
+                                </p:cTn>
+                              </p:par>
+                            </p:childTnLst>
+                          </p:cTn>
+                        </p:par>
+                      </p:childTnLst>
+                    </p:cTn>
+                  </p:par>
+                  <p:par>
+                    <p:cTn id="48" fill="hold">
+                      <p:stCondLst>
+                        <p:cond delay="indefinite"/>
+                      </p:stCondLst>
+                      <p:childTnLst>
+                        <p:par>
+                          <p:cTn id="49" fill="hold">
+                            <p:stCondLst>
+                              <p:cond delay="0"/>
+                            </p:stCondLst>
+                            <p:childTnLst>
+                              <p:par>
+                                <p:cTn id="50" presetID="1" presetClass="entr" presetSubtype="0" fill="hold" grpId="0" nodeType="clickEffect">
+                                  <p:stCondLst>
+                                    <p:cond delay="0"/>
+                                  </p:stCondLst>
+                                  <p:childTnLst>
+                                    <p:set>
+                                      <p:cBhvr>
+                                        <p:cTn id="51" dur="1" fill="hold">
+                                          <p:stCondLst>
+                                            <p:cond delay="0"/>
+                                          </p:stCondLst>
+                                        </p:cTn>
+                                        <p:tgtEl>
+                                          <p:spTgt spid="21"/>
+                                        </p:tgtEl>
+                                        <p:attrNameLst>
+                                          <p:attrName>style.visibility</p:attrName>
+                                        </p:attrNameLst>
+                                      </p:cBhvr>
+                                      <p:to>
+                                        <p:strVal val="visible"/>
+                                      </p:to>
+                                    </p:set>
+                                  </p:childTnLst>
+                                </p:cTn>
+                              </p:par>
+                              <p:par>
+                                <p:cTn id="52" presetID="1" presetClass="entr" presetSubtype="0" fill="hold" grpId="0" nodeType="withEffect">
+                                  <p:stCondLst>
+                                    <p:cond delay="0"/>
+                                  </p:stCondLst>
+                                  <p:childTnLst>
+                                    <p:set>
+                                      <p:cBhvr>
+                                        <p:cTn id="53" dur="1" fill="hold">
+                                          <p:stCondLst>
+                                            <p:cond delay="0"/>
+                                          </p:stCondLst>
+                                        </p:cTn>
+                                        <p:tgtEl>
+                                          <p:spTgt spid="25"/>
+                                        </p:tgtEl>
+                                        <p:attrNameLst>
+                                          <p:attrName>style.visibility</p:attrName>
+                                        </p:attrNameLst>
+                                      </p:cBhvr>
+                                      <p:to>
+                                        <p:strVal val="visible"/>
+                                      </p:to>
+                                    </p:set>
+                                  </p:childTnLst>
+                                </p:cTn>
+                              </p:par>
+                              <p:par>
+                                <p:cTn id="54" presetID="1" presetClass="entr" presetSubtype="0" fill="hold" grpId="0" nodeType="withEffect">
+                                  <p:stCondLst>
+                                    <p:cond delay="0"/>
+                                  </p:stCondLst>
+                                  <p:childTnLst>
+                                    <p:set>
+                                      <p:cBhvr>
+                                        <p:cTn id="55" dur="1" fill="hold">
+                                          <p:stCondLst>
+                                            <p:cond delay="0"/>
+                                          </p:stCondLst>
+                                        </p:cTn>
+                                        <p:tgtEl>
+                                          <p:spTgt spid="24"/>
+                                        </p:tgtEl>
+                                        <p:attrNameLst>
+                                          <p:attrName>style.visibility</p:attrName>
+                                        </p:attrNameLst>
+                                      </p:cBhvr>
+                                      <p:to>
+                                        <p:strVal val="visible"/>
+                                      </p:to>
+                                    </p:set>
+                                  </p:childTnLst>
+                                </p:cTn>
+                              </p:par>
+                            </p:childTnLst>
+                          </p:cTn>
+                        </p:par>
+                      </p:childTnLst>
+                    </p:cTn>
+                  </p:par>
+                  <p:par>
+                    <p:cTn id="56" fill="hold">
+                      <p:stCondLst>
+                        <p:cond delay="indefinite"/>
+                      </p:stCondLst>
+                      <p:childTnLst>
+                        <p:par>
+                          <p:cTn id="57" fill="hold">
+                            <p:stCondLst>
+                              <p:cond delay="0"/>
+                            </p:stCondLst>
+                            <p:childTnLst>
+                              <p:par>
+                                <p:cTn id="58" presetID="10" presetClass="exit" presetSubtype="0" fill="hold" nodeType="clickEffect">
+                                  <p:stCondLst>
+                                    <p:cond delay="0"/>
+                                  </p:stCondLst>
+                                  <p:childTnLst>
+                                    <p:animEffect transition="out" filter="fade">
+                                      <p:cBhvr>
+                                        <p:cTn id="59" dur="500"/>
+                                        <p:tgtEl>
+                                          <p:spTgt spid="11"/>
+                                        </p:tgtEl>
+                                      </p:cBhvr>
+                                    </p:animEffect>
+                                    <p:set>
+                                      <p:cBhvr>
+                                        <p:cTn id="60" dur="1" fill="hold">
+                                          <p:stCondLst>
+                                            <p:cond delay="499"/>
+                                          </p:stCondLst>
+                                        </p:cTn>
+                                        <p:tgtEl>
+                                          <p:spTgt spid="11"/>
+                                        </p:tgtEl>
+                                        <p:attrNameLst>
+                                          <p:attrName>style.visibility</p:attrName>
+                                        </p:attrNameLst>
+                                      </p:cBhvr>
+                                      <p:to>
+                                        <p:strVal val="hidden"/>
+                                      </p:to>
+                                    </p:set>
+                                  </p:childTnLst>
+                                </p:cTn>
+                              </p:par>
+                              <p:par>
+                                <p:cTn id="61" presetID="10" presetClass="exit" presetSubtype="0" fill="hold" grpId="1" nodeType="withEffect">
+                                  <p:stCondLst>
+                                    <p:cond delay="0"/>
+                                  </p:stCondLst>
+                                  <p:childTnLst>
+                                    <p:animEffect transition="out" filter="fade">
+                                      <p:cBhvr>
+                                        <p:cTn id="62" dur="500"/>
+                                        <p:tgtEl>
+                                          <p:spTgt spid="16"/>
+                                        </p:tgtEl>
+                                      </p:cBhvr>
+                                    </p:animEffect>
+                                    <p:set>
+                                      <p:cBhvr>
+                                        <p:cTn id="63" dur="1" fill="hold">
+                                          <p:stCondLst>
+                                            <p:cond delay="499"/>
+                                          </p:stCondLst>
+                                        </p:cTn>
+                                        <p:tgtEl>
+                                          <p:spTgt spid="16"/>
+                                        </p:tgtEl>
+                                        <p:attrNameLst>
+                                          <p:attrName>style.visibility</p:attrName>
+                                        </p:attrNameLst>
+                                      </p:cBhvr>
+                                      <p:to>
+                                        <p:strVal val="hidden"/>
+                                      </p:to>
+                                    </p:set>
+                                  </p:childTnLst>
+                                </p:cTn>
+                              </p:par>
+                              <p:par>
+                                <p:cTn id="64" presetID="10" presetClass="exit" presetSubtype="0" fill="hold" nodeType="withEffect">
+                                  <p:stCondLst>
+                                    <p:cond delay="0"/>
+                                  </p:stCondLst>
+                                  <p:childTnLst>
+                                    <p:animEffect transition="out" filter="fade">
+                                      <p:cBhvr>
+                                        <p:cTn id="65" dur="500"/>
+                                        <p:tgtEl>
+                                          <p:spTgt spid="10"/>
+                                        </p:tgtEl>
+                                      </p:cBhvr>
+                                    </p:animEffect>
+                                    <p:set>
+                                      <p:cBhvr>
+                                        <p:cTn id="66" dur="1" fill="hold">
+                                          <p:stCondLst>
+                                            <p:cond delay="499"/>
+                                          </p:stCondLst>
+                                        </p:cTn>
+                                        <p:tgtEl>
+                                          <p:spTgt spid="10"/>
+                                        </p:tgtEl>
+                                        <p:attrNameLst>
+                                          <p:attrName>style.visibility</p:attrName>
+                                        </p:attrNameLst>
+                                      </p:cBhvr>
+                                      <p:to>
+                                        <p:strVal val="hidden"/>
+                                      </p:to>
+                                    </p:set>
+                                  </p:childTnLst>
+                                </p:cTn>
+                              </p:par>
+                              <p:par>
+                                <p:cTn id="67" presetID="10" presetClass="exit" presetSubtype="0" fill="hold" grpId="1" nodeType="withEffect">
+                                  <p:stCondLst>
+                                    <p:cond delay="0"/>
+                                  </p:stCondLst>
+                                  <p:childTnLst>
+                                    <p:animEffect transition="out" filter="fade">
+                                      <p:cBhvr>
+                                        <p:cTn id="68" dur="500"/>
+                                        <p:tgtEl>
+                                          <p:spTgt spid="15"/>
+                                        </p:tgtEl>
+                                      </p:cBhvr>
+                                    </p:animEffect>
+                                    <p:set>
+                                      <p:cBhvr>
+                                        <p:cTn id="69" dur="1" fill="hold">
+                                          <p:stCondLst>
+                                            <p:cond delay="499"/>
+                                          </p:stCondLst>
+                                        </p:cTn>
+                                        <p:tgtEl>
+                                          <p:spTgt spid="15"/>
+                                        </p:tgtEl>
+                                        <p:attrNameLst>
+                                          <p:attrName>style.visibility</p:attrName>
+                                        </p:attrNameLst>
+                                      </p:cBhvr>
+                                      <p:to>
+                                        <p:strVal val="hidden"/>
+                                      </p:to>
+                                    </p:set>
+                                  </p:childTnLst>
+                                </p:cTn>
+                              </p:par>
+                              <p:par>
+                                <p:cTn id="70" presetID="10" presetClass="exit" presetSubtype="0" fill="hold" nodeType="withEffect">
+                                  <p:stCondLst>
+                                    <p:cond delay="0"/>
+                                  </p:stCondLst>
+                                  <p:childTnLst>
+                                    <p:animEffect transition="out" filter="fade">
+                                      <p:cBhvr>
+                                        <p:cTn id="71" dur="500"/>
+                                        <p:tgtEl>
+                                          <p:spTgt spid="9"/>
+                                        </p:tgtEl>
+                                      </p:cBhvr>
+                                    </p:animEffect>
+                                    <p:set>
+                                      <p:cBhvr>
+                                        <p:cTn id="72" dur="1" fill="hold">
+                                          <p:stCondLst>
+                                            <p:cond delay="499"/>
+                                          </p:stCondLst>
+                                        </p:cTn>
+                                        <p:tgtEl>
+                                          <p:spTgt spid="9"/>
+                                        </p:tgtEl>
+                                        <p:attrNameLst>
+                                          <p:attrName>style.visibility</p:attrName>
+                                        </p:attrNameLst>
+                                      </p:cBhvr>
+                                      <p:to>
+                                        <p:strVal val="hidden"/>
+                                      </p:to>
+                                    </p:set>
+                                  </p:childTnLst>
+                                </p:cTn>
+                              </p:par>
+                              <p:par>
+                                <p:cTn id="73" presetID="10" presetClass="exit" presetSubtype="0" fill="hold" grpId="1" nodeType="withEffect">
+                                  <p:stCondLst>
+                                    <p:cond delay="0"/>
+                                  </p:stCondLst>
+                                  <p:childTnLst>
+                                    <p:animEffect transition="out" filter="fade">
+                                      <p:cBhvr>
+                                        <p:cTn id="74" dur="500"/>
+                                        <p:tgtEl>
+                                          <p:spTgt spid="14"/>
+                                        </p:tgtEl>
+                                      </p:cBhvr>
+                                    </p:animEffect>
+                                    <p:set>
+                                      <p:cBhvr>
+                                        <p:cTn id="75" dur="1" fill="hold">
+                                          <p:stCondLst>
+                                            <p:cond delay="499"/>
+                                          </p:stCondLst>
+                                        </p:cTn>
+                                        <p:tgtEl>
+                                          <p:spTgt spid="14"/>
+                                        </p:tgtEl>
+                                        <p:attrNameLst>
+                                          <p:attrName>style.visibility</p:attrName>
+                                        </p:attrNameLst>
+                                      </p:cBhvr>
+                                      <p:to>
+                                        <p:strVal val="hidden"/>
+                                      </p:to>
+                                    </p:set>
+                                  </p:childTnLst>
+                                </p:cTn>
+                              </p:par>
+                            </p:childTnLst>
+                          </p:cTn>
+                        </p:par>
+                      </p:childTnLst>
+                    </p:cTn>
+                  </p:par>
+                  <p:par>
+                    <p:cTn id="76" fill="hold">
+                      <p:stCondLst>
+                        <p:cond delay="indefinite"/>
+                      </p:stCondLst>
+                      <p:childTnLst>
+                        <p:par>
+                          <p:cTn id="77" fill="hold">
+                            <p:stCondLst>
+                              <p:cond delay="0"/>
+                            </p:stCondLst>
+                            <p:childTnLst>
+                              <p:par>
+                                <p:cTn id="78" presetID="1" presetClass="entr" presetSubtype="0" fill="hold" nodeType="clickEffect">
+                                  <p:stCondLst>
+                                    <p:cond delay="0"/>
+                                  </p:stCondLst>
+                                  <p:childTnLst>
+                                    <p:set>
+                                      <p:cBhvr>
+                                        <p:cTn id="79" dur="1" fill="hold">
+                                          <p:stCondLst>
+                                            <p:cond delay="0"/>
+                                          </p:stCondLst>
+                                        </p:cTn>
+                                        <p:tgtEl>
+                                          <p:spTgt spid="8"/>
+                                        </p:tgtEl>
+                                        <p:attrNameLst>
+                                          <p:attrName>style.visibility</p:attrName>
+                                        </p:attrNameLst>
+                                      </p:cBhvr>
+                                      <p:to>
+                                        <p:strVal val="visible"/>
+                                      </p:to>
+                                    </p:set>
+                                  </p:childTnLst>
+                                </p:cTn>
+                              </p:par>
+                              <p:par>
+                                <p:cTn id="80" presetID="1" presetClass="entr" presetSubtype="0" fill="hold" grpId="2" nodeType="withEffect">
+                                  <p:stCondLst>
+                                    <p:cond delay="0"/>
+                                  </p:stCondLst>
+                                  <p:childTnLst>
+                                    <p:set>
+                                      <p:cBhvr>
+                                        <p:cTn id="81" dur="1" fill="hold">
+                                          <p:stCondLst>
+                                            <p:cond delay="0"/>
+                                          </p:stCondLst>
+                                        </p:cTn>
+                                        <p:tgtEl>
+                                          <p:spTgt spid="13"/>
+                                        </p:tgtEl>
+                                        <p:attrNameLst>
+                                          <p:attrName>style.visibility</p:attrName>
+                                        </p:attrNameLst>
+                                      </p:cBhvr>
+                                      <p:to>
+                                        <p:strVal val="visible"/>
+                                      </p:to>
+                                    </p:set>
+                                  </p:childTnLst>
+                                </p:cTn>
+                              </p:par>
+                              <p:par>
+                                <p:cTn id="82" presetID="1" presetClass="entr" presetSubtype="0" fill="hold" nodeType="withEffect">
+                                  <p:stCondLst>
+                                    <p:cond delay="0"/>
+                                  </p:stCondLst>
+                                  <p:childTnLst>
+                                    <p:set>
+                                      <p:cBhvr>
+                                        <p:cTn id="83" dur="1" fill="hold">
+                                          <p:stCondLst>
+                                            <p:cond delay="0"/>
+                                          </p:stCondLst>
+                                        </p:cTn>
+                                        <p:tgtEl>
+                                          <p:spTgt spid="11"/>
+                                        </p:tgtEl>
+                                        <p:attrNameLst>
+                                          <p:attrName>style.visibility</p:attrName>
+                                        </p:attrNameLst>
+                                      </p:cBhvr>
+                                      <p:to>
+                                        <p:strVal val="visible"/>
+                                      </p:to>
+                                    </p:set>
+                                  </p:childTnLst>
+                                </p:cTn>
+                              </p:par>
+                              <p:par>
+                                <p:cTn id="84" presetID="1" presetClass="entr" presetSubtype="0" fill="hold" grpId="2" nodeType="withEffect">
+                                  <p:stCondLst>
+                                    <p:cond delay="0"/>
+                                  </p:stCondLst>
+                                  <p:childTnLst>
+                                    <p:set>
+                                      <p:cBhvr>
+                                        <p:cTn id="85" dur="1" fill="hold">
+                                          <p:stCondLst>
+                                            <p:cond delay="0"/>
+                                          </p:stCondLst>
+                                        </p:cTn>
+                                        <p:tgtEl>
+                                          <p:spTgt spid="16"/>
+                                        </p:tgtEl>
+                                        <p:attrNameLst>
+                                          <p:attrName>style.visibility</p:attrName>
+                                        </p:attrNameLst>
+                                      </p:cBhvr>
+                                      <p:to>
+                                        <p:strVal val="visible"/>
+                                      </p:to>
+                                    </p:set>
+                                  </p:childTnLst>
+                                </p:cTn>
+                              </p:par>
+                              <p:par>
+                                <p:cTn id="86" presetID="1" presetClass="entr" presetSubtype="0" fill="hold" nodeType="withEffect">
+                                  <p:stCondLst>
+                                    <p:cond delay="0"/>
+                                  </p:stCondLst>
+                                  <p:childTnLst>
+                                    <p:set>
+                                      <p:cBhvr>
+                                        <p:cTn id="87" dur="1" fill="hold">
+                                          <p:stCondLst>
+                                            <p:cond delay="0"/>
+                                          </p:stCondLst>
+                                        </p:cTn>
+                                        <p:tgtEl>
+                                          <p:spTgt spid="10"/>
+                                        </p:tgtEl>
+                                        <p:attrNameLst>
+                                          <p:attrName>style.visibility</p:attrName>
+                                        </p:attrNameLst>
+                                      </p:cBhvr>
+                                      <p:to>
+                                        <p:strVal val="visible"/>
+                                      </p:to>
+                                    </p:set>
+                                  </p:childTnLst>
+                                </p:cTn>
+                              </p:par>
+                              <p:par>
+                                <p:cTn id="88" presetID="1" presetClass="entr" presetSubtype="0" fill="hold" grpId="2" nodeType="withEffect">
+                                  <p:stCondLst>
+                                    <p:cond delay="0"/>
+                                  </p:stCondLst>
+                                  <p:childTnLst>
+                                    <p:set>
+                                      <p:cBhvr>
+                                        <p:cTn id="89" dur="1" fill="hold">
+                                          <p:stCondLst>
+                                            <p:cond delay="0"/>
+                                          </p:stCondLst>
+                                        </p:cTn>
+                                        <p:tgtEl>
+                                          <p:spTgt spid="15"/>
+                                        </p:tgtEl>
+                                        <p:attrNameLst>
+                                          <p:attrName>style.visibility</p:attrName>
+                                        </p:attrNameLst>
+                                      </p:cBhvr>
+                                      <p:to>
+                                        <p:strVal val="visible"/>
+                                      </p:to>
+                                    </p:set>
+                                  </p:childTnLst>
+                                </p:cTn>
+                              </p:par>
+                              <p:par>
+                                <p:cTn id="90" presetID="1" presetClass="entr" presetSubtype="0" fill="hold" nodeType="withEffect">
+                                  <p:stCondLst>
+                                    <p:cond delay="0"/>
+                                  </p:stCondLst>
+                                  <p:childTnLst>
+                                    <p:set>
+                                      <p:cBhvr>
+                                        <p:cTn id="91" dur="1" fill="hold">
+                                          <p:stCondLst>
+                                            <p:cond delay="0"/>
+                                          </p:stCondLst>
+                                        </p:cTn>
+                                        <p:tgtEl>
+                                          <p:spTgt spid="9"/>
+                                        </p:tgtEl>
+                                        <p:attrNameLst>
+                                          <p:attrName>style.visibility</p:attrName>
+                                        </p:attrNameLst>
+                                      </p:cBhvr>
+                                      <p:to>
+                                        <p:strVal val="visible"/>
+                                      </p:to>
+                                    </p:set>
+                                  </p:childTnLst>
+                                </p:cTn>
+                              </p:par>
+                              <p:par>
+                                <p:cTn id="92" presetID="1" presetClass="entr" presetSubtype="0" fill="hold" grpId="2" nodeType="withEffect">
+                                  <p:stCondLst>
+                                    <p:cond delay="0"/>
+                                  </p:stCondLst>
+                                  <p:childTnLst>
+                                    <p:set>
+                                      <p:cBhvr>
+                                        <p:cTn id="93" dur="1" fill="hold">
+                                          <p:stCondLst>
+                                            <p:cond delay="0"/>
+                                          </p:stCondLst>
+                                        </p:cTn>
+                                        <p:tgtEl>
+                                          <p:spTgt spid="14"/>
+                                        </p:tgtEl>
+                                        <p:attrNameLst>
+                                          <p:attrName>style.visibility</p:attrName>
+                                        </p:attrNameLst>
+                                      </p:cBhvr>
+                                      <p:to>
+                                        <p:strVal val="visible"/>
+                                      </p:to>
+                                    </p:set>
+                                  </p:childTnLst>
+                                </p:cTn>
+                              </p:par>
+                            </p:childTnLst>
+                          </p:cTn>
+                        </p:par>
+                      </p:childTnLst>
+                    </p:cTn>
+                  </p:par>
+                  <p:par>
+                    <p:cTn id="94" fill="hold">
+                      <p:stCondLst>
+                        <p:cond delay="indefinite"/>
+                      </p:stCondLst>
+                      <p:childTnLst>
+                        <p:par>
+                          <p:cTn id="95" fill="hold">
+                            <p:stCondLst>
+                              <p:cond delay="0"/>
+                            </p:stCondLst>
+                            <p:childTnLst>
+                              <p:par>
+                                <p:cTn id="96" presetID="1" presetClass="exit" presetSubtype="0" fill="hold" grpId="1" nodeType="clickEffect">
+                                  <p:stCondLst>
+                                    <p:cond delay="0"/>
+                                  </p:stCondLst>
+                                  <p:childTnLst>
+                                    <p:set>
+                                      <p:cBhvr>
+                                        <p:cTn id="97" dur="1" fill="hold">
+                                          <p:stCondLst>
+                                            <p:cond delay="0"/>
+                                          </p:stCondLst>
+                                        </p:cTn>
+                                        <p:tgtEl>
+                                          <p:spTgt spid="21"/>
+                                        </p:tgtEl>
+                                        <p:attrNameLst>
+                                          <p:attrName>style.visibility</p:attrName>
+                                        </p:attrNameLst>
+                                      </p:cBhvr>
+                                      <p:to>
+                                        <p:strVal val="hidden"/>
+                                      </p:to>
+                                    </p:set>
+                                  </p:childTnLst>
+                                </p:cTn>
+                              </p:par>
+                              <p:par>
+                                <p:cTn id="98" presetID="1" presetClass="exit" presetSubtype="0" fill="hold" grpId="1" nodeType="withEffect">
+                                  <p:stCondLst>
+                                    <p:cond delay="0"/>
+                                  </p:stCondLst>
+                                  <p:childTnLst>
+                                    <p:set>
+                                      <p:cBhvr>
+                                        <p:cTn id="99" dur="1" fill="hold">
+                                          <p:stCondLst>
+                                            <p:cond delay="0"/>
+                                          </p:stCondLst>
+                                        </p:cTn>
+                                        <p:tgtEl>
+                                          <p:spTgt spid="25"/>
+                                        </p:tgtEl>
+                                        <p:attrNameLst>
+                                          <p:attrName>style.visibility</p:attrName>
+                                        </p:attrNameLst>
+                                      </p:cBhvr>
+                                      <p:to>
+                                        <p:strVal val="hidden"/>
+                                      </p:to>
+                                    </p:set>
+                                  </p:childTnLst>
+                                </p:cTn>
+                              </p:par>
+                              <p:par>
+                                <p:cTn id="100" presetID="1" presetClass="exit" presetSubtype="0" fill="hold" grpId="1" nodeType="withEffect">
+                                  <p:stCondLst>
+                                    <p:cond delay="0"/>
+                                  </p:stCondLst>
+                                  <p:childTnLst>
+                                    <p:set>
+                                      <p:cBhvr>
+                                        <p:cTn id="101" dur="1" fill="hold">
+                                          <p:stCondLst>
+                                            <p:cond delay="0"/>
+                                          </p:stCondLst>
+                                        </p:cTn>
+                                        <p:tgtEl>
+                                          <p:spTgt spid="24"/>
+                                        </p:tgtEl>
+                                        <p:attrNameLst>
+                                          <p:attrName>style.visibility</p:attrName>
+                                        </p:attrNameLst>
+                                      </p:cBhvr>
+                                      <p:to>
+                                        <p:strVal val="hidden"/>
+                                      </p:to>
+                                    </p:set>
+                                  </p:childTnLst>
+                                </p:cTn>
+                              </p:par>
+                            </p:childTnLst>
+                          </p:cTn>
+                        </p:par>
+                      </p:childTnLst>
+                    </p:cTn>
+                  </p:par>
+                </p:childTnLst>
+              </p:cTn>
+              <p:prevCondLst>
+                <p:cond evt="onPrev" delay="0">
+                  <p:tgtEl>
+                    <p:sldTgt/>
+                  </p:tgtEl>
+                </p:cond>
+              </p:prevCondLst>
+              <p:nextCondLst>
+                <p:cond evt="onNext" delay="0">
+                  <p:tgtEl>
+                    <p:sldTgt/>
+                  </p:tgtEl>
+                </p:cond>
+              </p:nextCondLst>
+            </p:seq>
+          </p:childTnLst>
+        </p:cTn>
+      </p:par>
+    </p:tnLst>
+    <p:bldLst>
+      <p:bldP spid="13" grpId="0"/>
+      <p:bldP spid="13" grpId="1"/>
+      <p:bldP spid="13" grpId="2"/>
+      <p:bldP spid="14" grpId="0"/>
+      <p:bldP spid="14" grpId="1"/>
+      <p:bldP spid="14" grpId="2"/>
+      <p:bldP spid="15" grpId="0"/>
+      <p:bldP spid="15" grpId="1"/>
+      <p:bldP spid="15" grpId="2"/>
+      <p:bldP spid="16" grpId="0"/>
+      <p:bldP spid="16" grpId="1"/>
+      <p:bldP spid="16" grpId="2"/>
+      <p:bldP spid="20" grpId="0" animBg="1"/>
+      <p:bldP spid="20" grpId="1" animBg="1"/>
+      <p:bldP spid="21" grpId="0" animBg="1"/>
+      <p:bldP spid="21" grpId="1" animBg="1"/>
+      <p:bldP spid="22" grpId="0"/>
+      <p:bldP spid="22" grpId="1"/>
+      <p:bldP spid="23" grpId="0"/>
+      <p:bldP spid="23" grpId="1"/>
+      <p:bldP spid="24" grpId="0"/>
+      <p:bldP spid="24" grpId="1"/>
+      <p:bldP spid="25" grpId="0"/>
+      <p:bldP spid="25" grpId="1"/>
+    </p:bldLst>
+  </p:timing>
 </p:sld>
 </file>
 
@@ -10692,21 +13192,20 @@
           <a:lstStyle/>
           <a:p>
             <a:r>
-              <a:rPr lang="en-US" dirty="0" err="1"/>
-              <a:t>Websockets</a:t>
-            </a:r>
-            <a:endParaRPr lang="en-US" dirty="0"/>
-          </a:p>
-        </p:txBody>
-      </p:sp>
-      <p:sp>
-        <p:nvSpPr>
-          <p:cNvPr id="5" name="Content Placeholder 4"/>
+              <a:rPr lang="en-US" dirty="0"/>
+              <a:t>Facebook Messenger Story</a:t>
+            </a:r>
+          </a:p>
+        </p:txBody>
+      </p:sp>
+      <p:sp>
+        <p:nvSpPr>
+          <p:cNvPr id="5" name="Text Placeholder 4"/>
           <p:cNvSpPr>
             <a:spLocks noGrp="1"/>
           </p:cNvSpPr>
           <p:nvPr>
-            <p:ph idx="1"/>
+            <p:ph type="body" idx="1"/>
           </p:nvPr>
         </p:nvSpPr>
         <p:spPr/>
@@ -10714,67 +13213,14 @@
           <a:bodyPr/>
           <a:lstStyle/>
           <a:p>
-            <a:pPr marL="0" indent="0">
-              <a:buNone/>
-            </a:pPr>
-            <a:r>
-              <a:rPr lang="en-US" sz="4400" dirty="0"/>
-              <a:t>Communication protocol that </a:t>
-            </a:r>
-            <a:br>
-              <a:rPr lang="en-US" sz="4400" dirty="0"/>
-            </a:br>
-            <a:r>
-              <a:rPr lang="en-US" sz="4400" dirty="0"/>
-              <a:t>provides full-duplex communication channels</a:t>
-            </a:r>
-            <a:br>
-              <a:rPr lang="en-US" sz="4400" dirty="0"/>
-            </a:br>
-            <a:r>
-              <a:rPr lang="en-US" sz="4400" dirty="0"/>
-              <a:t>over a single TCP connection</a:t>
-            </a:r>
-          </a:p>
-          <a:p>
-            <a:pPr marL="0" indent="0">
-              <a:buNone/>
-            </a:pPr>
-            <a:endParaRPr lang="en-US" dirty="0"/>
-          </a:p>
-          <a:p>
-            <a:pPr marL="0" indent="0">
-              <a:buNone/>
-            </a:pPr>
-            <a:endParaRPr lang="en-US" dirty="0"/>
-          </a:p>
-          <a:p>
-            <a:pPr marL="0" indent="0">
-              <a:buNone/>
-            </a:pPr>
-            <a:endParaRPr lang="en-US" dirty="0"/>
-          </a:p>
-          <a:p>
-            <a:pPr marL="0" indent="0">
-              <a:buNone/>
-            </a:pPr>
-            <a:r>
-              <a:rPr lang="en-US" dirty="0">
-                <a:solidFill>
-                  <a:schemeClr val="bg2">
-                    <a:lumMod val="50000"/>
-                  </a:schemeClr>
-                </a:solidFill>
-              </a:rPr>
-              <a:t>Note: Not supported by all MQTT Brokers</a:t>
-            </a:r>
+            <a:endParaRPr lang="en-US"/>
           </a:p>
         </p:txBody>
       </p:sp>
     </p:spTree>
     <p:extLst>
       <p:ext uri="{BB962C8B-B14F-4D97-AF65-F5344CB8AC3E}">
-        <p14:creationId xmlns:p14="http://schemas.microsoft.com/office/powerpoint/2010/main" val="4043762935"/>
+        <p14:creationId xmlns:p14="http://schemas.microsoft.com/office/powerpoint/2010/main" val="992834903"/>
       </p:ext>
     </p:extLst>
   </p:cSld>
@@ -10803,7 +13249,7 @@
       </p:grpSpPr>
       <p:sp>
         <p:nvSpPr>
-          <p:cNvPr id="2" name="Title 1"/>
+          <p:cNvPr id="4" name="Title 3"/>
           <p:cNvSpPr>
             <a:spLocks noGrp="1"/>
           </p:cNvSpPr>
@@ -10818,90 +13264,60 @@
           <a:p>
             <a:r>
               <a:rPr lang="en-US" dirty="0"/>
-              <a:t>Eclipse </a:t>
-            </a:r>
-            <a:r>
-              <a:rPr lang="en-US" dirty="0" err="1"/>
-              <a:t>Paho</a:t>
-            </a:r>
-            <a:r>
-              <a:rPr lang="en-US" dirty="0"/>
-              <a:t> JavaScript Client</a:t>
-            </a:r>
-          </a:p>
-        </p:txBody>
-      </p:sp>
-      <p:pic>
-        <p:nvPicPr>
-          <p:cNvPr id="8" name="Picture 7"/>
-          <p:cNvPicPr>
-            <a:picLocks noChangeAspect="1"/>
-          </p:cNvPicPr>
-          <p:nvPr/>
-        </p:nvPicPr>
-        <p:blipFill>
-          <a:blip r:embed="rId2">
-            <a:extLst>
-              <a:ext uri="{BEBA8EAE-BF5A-486C-A8C5-ECC9F3942E4B}">
-                <a14:imgProps xmlns:a14="http://schemas.microsoft.com/office/drawing/2010/main">
-                  <a14:imgLayer r:embed="rId3">
-                    <a14:imgEffect>
-                      <a14:sharpenSoften amount="50000"/>
-                    </a14:imgEffect>
-                  </a14:imgLayer>
-                </a14:imgProps>
-              </a:ext>
-            </a:extLst>
-          </a:blip>
-          <a:stretch>
-            <a:fillRect/>
-          </a:stretch>
-        </p:blipFill>
+              <a:t>Facebook Messenger</a:t>
+            </a:r>
+          </a:p>
+        </p:txBody>
+      </p:sp>
+      <p:sp>
+        <p:nvSpPr>
+          <p:cNvPr id="5" name="Content Placeholder 4"/>
+          <p:cNvSpPr>
+            <a:spLocks noGrp="1"/>
+          </p:cNvSpPr>
+          <p:nvPr>
+            <p:ph idx="1"/>
+          </p:nvPr>
+        </p:nvSpPr>
         <p:spPr>
           <a:xfrm>
-            <a:off x="838200" y="2754641"/>
-            <a:ext cx="7477125" cy="2543175"/>
+            <a:off x="838200" y="1825625"/>
+            <a:ext cx="10848278" cy="4351338"/>
           </a:xfrm>
-          <a:prstGeom prst="rect">
-            <a:avLst/>
-          </a:prstGeom>
         </p:spPr>
-      </p:pic>
-      <p:sp>
-        <p:nvSpPr>
-          <p:cNvPr id="9" name="TextBox 8"/>
-          <p:cNvSpPr txBox="1"/>
-          <p:nvPr/>
-        </p:nvSpPr>
-        <p:spPr>
-          <a:xfrm>
-            <a:off x="838200" y="1429078"/>
-            <a:ext cx="9451626" cy="523220"/>
-          </a:xfrm>
-          <a:prstGeom prst="rect">
-            <a:avLst/>
-          </a:prstGeom>
-          <a:noFill/>
-        </p:spPr>
-        <p:txBody>
-          <a:bodyPr wrap="none" rtlCol="0">
-            <a:spAutoFit/>
-          </a:bodyPr>
+        <p:txBody>
+          <a:bodyPr/>
           <a:lstStyle/>
           <a:p>
             <a:r>
-              <a:rPr lang="en-US" sz="2800" dirty="0">
-                <a:latin typeface="Consolas" panose="020B0609020204030204" pitchFamily="49" charset="0"/>
-              </a:rPr>
-              <a:t>https://github.com/eclipse/paho.mqtt.javascript</a:t>
-            </a:r>
+              <a:rPr lang="en-US" dirty="0"/>
+              <a:t>First implementation had issues with long latency. Was reliable but slow.</a:t>
+            </a:r>
+          </a:p>
+          <a:p>
+            <a:r>
+              <a:rPr lang="en-US" dirty="0"/>
+              <a:t>With only weeks before launch, refactored to use MQTT</a:t>
+            </a:r>
+          </a:p>
+          <a:p>
+            <a:r>
+              <a:rPr lang="en-US" dirty="0"/>
+              <a:t>Designed to use bandwidth and battery sparingly (important for mobile apps)</a:t>
+            </a:r>
+          </a:p>
+          <a:p>
+            <a:pPr marL="0" indent="0">
+              <a:buNone/>
+            </a:pPr>
+            <a:endParaRPr lang="en-US" dirty="0"/>
           </a:p>
         </p:txBody>
       </p:sp>
     </p:spTree>
     <p:extLst>
       <p:ext uri="{BB962C8B-B14F-4D97-AF65-F5344CB8AC3E}">
-        <p14:creationId xmlns:p14="http://schemas.microsoft.com/office/powerpoint/2010/main" val="732763416"/>
+        <p14:creationId xmlns:p14="http://schemas.microsoft.com/office/powerpoint/2010/main" val="1338110876"/>
       </p:ext>
     </p:extLst>
   </p:cSld>
@@ -10930,72 +13346,59 @@
       </p:grpSpPr>
       <p:sp>
         <p:nvSpPr>
-          <p:cNvPr id="2" name="Title 1"/>
+          <p:cNvPr id="3" name="Content Placeholder 2"/>
           <p:cNvSpPr>
             <a:spLocks noGrp="1"/>
           </p:cNvSpPr>
           <p:nvPr>
-            <p:ph type="title"/>
+            <p:ph idx="4294967295"/>
           </p:nvPr>
         </p:nvSpPr>
-        <p:spPr/>
+        <p:spPr>
+          <a:xfrm>
+            <a:off x="838200" y="1136309"/>
+            <a:ext cx="10515600" cy="4351338"/>
+          </a:xfrm>
+        </p:spPr>
         <p:txBody>
           <a:bodyPr/>
           <a:lstStyle/>
           <a:p>
-            <a:r>
-              <a:rPr lang="en-US" dirty="0"/>
-              <a:t>MQTT.js</a:t>
-            </a:r>
-          </a:p>
-        </p:txBody>
-      </p:sp>
-      <p:pic>
-        <p:nvPicPr>
-          <p:cNvPr id="4" name="Picture 3"/>
-          <p:cNvPicPr>
-            <a:picLocks noChangeAspect="1"/>
-          </p:cNvPicPr>
+            <a:pPr marL="0" indent="0">
+              <a:buNone/>
+            </a:pPr>
+            <a:r>
+              <a:rPr lang="en-US" sz="4000" dirty="0"/>
+              <a:t>“By maintaining a MQTT connection and routing messages through our chat pipeline, we were able to often achieve phone-to-phone delivery in the hundreds of milliseconds rather than multiple seconds” </a:t>
+            </a:r>
+          </a:p>
+          <a:p>
+            <a:pPr marL="0" indent="0" algn="r">
+              <a:buNone/>
+            </a:pPr>
+            <a:r>
+              <a:rPr lang="en-US" sz="4000" dirty="0"/>
+              <a:t>– Lucy Zhang, Facebook</a:t>
+            </a:r>
+          </a:p>
+          <a:p>
+            <a:pPr marL="0" indent="0">
+              <a:buNone/>
+            </a:pPr>
+            <a:endParaRPr lang="en-US" dirty="0"/>
+          </a:p>
+        </p:txBody>
+      </p:sp>
+      <p:sp>
+        <p:nvSpPr>
+          <p:cNvPr id="4" name="TextBox 3"/>
+          <p:cNvSpPr txBox="1"/>
           <p:nvPr/>
-        </p:nvPicPr>
-        <p:blipFill>
-          <a:blip r:embed="rId2">
-            <a:extLst>
-              <a:ext uri="{BEBA8EAE-BF5A-486C-A8C5-ECC9F3942E4B}">
-                <a14:imgProps xmlns:a14="http://schemas.microsoft.com/office/drawing/2010/main">
-                  <a14:imgLayer r:embed="rId3">
-                    <a14:imgEffect>
-                      <a14:sharpenSoften amount="50000"/>
-                    </a14:imgEffect>
-                  </a14:imgLayer>
-                </a14:imgProps>
-              </a:ext>
-            </a:extLst>
-          </a:blip>
-          <a:stretch>
-            <a:fillRect/>
-          </a:stretch>
-        </p:blipFill>
+        </p:nvSpPr>
         <p:spPr>
           <a:xfrm>
-            <a:off x="810212" y="2679993"/>
-            <a:ext cx="7743825" cy="2543175"/>
-          </a:xfrm>
-          <a:prstGeom prst="rect">
-            <a:avLst/>
-          </a:prstGeom>
-        </p:spPr>
-      </p:pic>
-      <p:sp>
-        <p:nvSpPr>
-          <p:cNvPr id="5" name="TextBox 4"/>
-          <p:cNvSpPr txBox="1"/>
-          <p:nvPr/>
-        </p:nvSpPr>
-        <p:spPr>
-          <a:xfrm>
-            <a:off x="838200" y="1429078"/>
-            <a:ext cx="6691255" cy="523220"/>
+            <a:off x="801231" y="6311900"/>
+            <a:ext cx="10552569" cy="369332"/>
           </a:xfrm>
           <a:prstGeom prst="rect">
             <a:avLst/>
@@ -11008,11 +13411,17 @@
           </a:bodyPr>
           <a:lstStyle/>
           <a:p>
-            <a:r>
-              <a:rPr lang="en-US" sz="2800" dirty="0">
-                <a:latin typeface="Consolas" panose="020B0609020204030204" pitchFamily="49" charset="0"/>
+            <a:pPr algn="ctr"/>
+            <a:r>
+              <a:rPr lang="en-US" dirty="0">
+                <a:solidFill>
+                  <a:schemeClr val="tx1">
+                    <a:lumMod val="50000"/>
+                    <a:lumOff val="50000"/>
+                  </a:schemeClr>
+                </a:solidFill>
               </a:rPr>
-              <a:t>https://github.com/mqttjs/MQTT.js</a:t>
+              <a:t>https://www.facebook.com/notes/facebook-engineering/building-facebook-messenger/10150259350998920/</a:t>
             </a:r>
           </a:p>
         </p:txBody>
@@ -11020,7 +13429,7 @@
     </p:spTree>
     <p:extLst>
       <p:ext uri="{BB962C8B-B14F-4D97-AF65-F5344CB8AC3E}">
-        <p14:creationId xmlns:p14="http://schemas.microsoft.com/office/powerpoint/2010/main" val="3542132717"/>
+        <p14:creationId xmlns:p14="http://schemas.microsoft.com/office/powerpoint/2010/main" val="3302624920"/>
       </p:ext>
     </p:extLst>
   </p:cSld>
@@ -11049,13 +13458,7 @@
       </p:grpSpPr>
       <p:sp>
         <p:nvSpPr>
-          <p:cNvPr id="2" name="Title 1">
-            <a:extLst>
-              <a:ext uri="{FF2B5EF4-FFF2-40B4-BE49-F238E27FC236}">
-                <a16:creationId xmlns:a16="http://schemas.microsoft.com/office/drawing/2014/main" id="{C98CC361-0A19-4C50-A88E-562BFC3C3587}"/>
-              </a:ext>
-            </a:extLst>
-          </p:cNvPr>
+          <p:cNvPr id="4" name="Title 3"/>
           <p:cNvSpPr>
             <a:spLocks noGrp="1"/>
           </p:cNvSpPr>
@@ -11070,20 +13473,14 @@
           <a:p>
             <a:r>
               <a:rPr lang="en-US" dirty="0"/>
-              <a:t>Putting it all Together</a:t>
-            </a:r>
-          </a:p>
-        </p:txBody>
-      </p:sp>
-      <p:sp>
-        <p:nvSpPr>
-          <p:cNvPr id="4" name="Text Placeholder 3">
-            <a:extLst>
-              <a:ext uri="{FF2B5EF4-FFF2-40B4-BE49-F238E27FC236}">
-                <a16:creationId xmlns:a16="http://schemas.microsoft.com/office/drawing/2014/main" id="{0FD847C0-AC95-4968-B816-A5BD147DBBC8}"/>
-              </a:ext>
-            </a:extLst>
-          </p:cNvPr>
+              <a:t>Web Apps</a:t>
+            </a:r>
+          </a:p>
+        </p:txBody>
+      </p:sp>
+      <p:sp>
+        <p:nvSpPr>
+          <p:cNvPr id="5" name="Text Placeholder 4"/>
           <p:cNvSpPr>
             <a:spLocks noGrp="1"/>
           </p:cNvSpPr>
@@ -11103,7 +13500,7 @@
     </p:spTree>
     <p:extLst>
       <p:ext uri="{BB962C8B-B14F-4D97-AF65-F5344CB8AC3E}">
-        <p14:creationId xmlns:p14="http://schemas.microsoft.com/office/powerpoint/2010/main" val="381455407"/>
+        <p14:creationId xmlns:p14="http://schemas.microsoft.com/office/powerpoint/2010/main" val="1509704479"/>
       </p:ext>
     </p:extLst>
   </p:cSld>
@@ -11234,6 +13631,460 @@
           <a:chExt cx="0" cy="0"/>
         </a:xfrm>
       </p:grpSpPr>
+      <p:sp>
+        <p:nvSpPr>
+          <p:cNvPr id="4" name="Title 3"/>
+          <p:cNvSpPr>
+            <a:spLocks noGrp="1"/>
+          </p:cNvSpPr>
+          <p:nvPr>
+            <p:ph type="title"/>
+          </p:nvPr>
+        </p:nvSpPr>
+        <p:spPr/>
+        <p:txBody>
+          <a:bodyPr/>
+          <a:lstStyle/>
+          <a:p>
+            <a:r>
+              <a:rPr lang="en-US" dirty="0" err="1"/>
+              <a:t>Websockets</a:t>
+            </a:r>
+            <a:endParaRPr lang="en-US" dirty="0"/>
+          </a:p>
+        </p:txBody>
+      </p:sp>
+      <p:sp>
+        <p:nvSpPr>
+          <p:cNvPr id="5" name="Content Placeholder 4"/>
+          <p:cNvSpPr>
+            <a:spLocks noGrp="1"/>
+          </p:cNvSpPr>
+          <p:nvPr>
+            <p:ph idx="1"/>
+          </p:nvPr>
+        </p:nvSpPr>
+        <p:spPr/>
+        <p:txBody>
+          <a:bodyPr/>
+          <a:lstStyle/>
+          <a:p>
+            <a:pPr marL="0" indent="0">
+              <a:buNone/>
+            </a:pPr>
+            <a:r>
+              <a:rPr lang="en-US" sz="4400" dirty="0"/>
+              <a:t>Communication protocol that </a:t>
+            </a:r>
+            <a:br>
+              <a:rPr lang="en-US" sz="4400" dirty="0"/>
+            </a:br>
+            <a:r>
+              <a:rPr lang="en-US" sz="4400" dirty="0"/>
+              <a:t>provides full-duplex communication channels</a:t>
+            </a:r>
+            <a:br>
+              <a:rPr lang="en-US" sz="4400" dirty="0"/>
+            </a:br>
+            <a:r>
+              <a:rPr lang="en-US" sz="4400" dirty="0"/>
+              <a:t>over a single TCP connection</a:t>
+            </a:r>
+          </a:p>
+          <a:p>
+            <a:pPr marL="0" indent="0">
+              <a:buNone/>
+            </a:pPr>
+            <a:endParaRPr lang="en-US" dirty="0"/>
+          </a:p>
+          <a:p>
+            <a:pPr marL="0" indent="0">
+              <a:buNone/>
+            </a:pPr>
+            <a:endParaRPr lang="en-US" dirty="0"/>
+          </a:p>
+          <a:p>
+            <a:pPr marL="0" indent="0">
+              <a:buNone/>
+            </a:pPr>
+            <a:endParaRPr lang="en-US" dirty="0"/>
+          </a:p>
+          <a:p>
+            <a:pPr marL="0" indent="0">
+              <a:buNone/>
+            </a:pPr>
+            <a:r>
+              <a:rPr lang="en-US" dirty="0">
+                <a:solidFill>
+                  <a:schemeClr val="bg2">
+                    <a:lumMod val="50000"/>
+                  </a:schemeClr>
+                </a:solidFill>
+              </a:rPr>
+              <a:t>Note: Not supported by all MQTT Brokers</a:t>
+            </a:r>
+          </a:p>
+        </p:txBody>
+      </p:sp>
+    </p:spTree>
+    <p:extLst>
+      <p:ext uri="{BB962C8B-B14F-4D97-AF65-F5344CB8AC3E}">
+        <p14:creationId xmlns:p14="http://schemas.microsoft.com/office/powerpoint/2010/main" val="4043762935"/>
+      </p:ext>
+    </p:extLst>
+  </p:cSld>
+  <p:clrMapOvr>
+    <a:masterClrMapping/>
+  </p:clrMapOvr>
+</p:sld>
+</file>
+
+<file path=ppt/slides/slide41.xml><?xml version="1.0" encoding="utf-8"?>
+<p:sld xmlns:a="http://schemas.openxmlformats.org/drawingml/2006/main" xmlns:r="http://schemas.openxmlformats.org/officeDocument/2006/relationships" xmlns:p="http://schemas.openxmlformats.org/presentationml/2006/main">
+  <p:cSld>
+    <p:spTree>
+      <p:nvGrpSpPr>
+        <p:cNvPr id="1" name=""/>
+        <p:cNvGrpSpPr/>
+        <p:nvPr/>
+      </p:nvGrpSpPr>
+      <p:grpSpPr>
+        <a:xfrm>
+          <a:off x="0" y="0"/>
+          <a:ext cx="0" cy="0"/>
+          <a:chOff x="0" y="0"/>
+          <a:chExt cx="0" cy="0"/>
+        </a:xfrm>
+      </p:grpSpPr>
+      <p:sp>
+        <p:nvSpPr>
+          <p:cNvPr id="2" name="Title 1"/>
+          <p:cNvSpPr>
+            <a:spLocks noGrp="1"/>
+          </p:cNvSpPr>
+          <p:nvPr>
+            <p:ph type="title"/>
+          </p:nvPr>
+        </p:nvSpPr>
+        <p:spPr/>
+        <p:txBody>
+          <a:bodyPr/>
+          <a:lstStyle/>
+          <a:p>
+            <a:r>
+              <a:rPr lang="en-US" dirty="0"/>
+              <a:t>Eclipse </a:t>
+            </a:r>
+            <a:r>
+              <a:rPr lang="en-US" dirty="0" err="1"/>
+              <a:t>Paho</a:t>
+            </a:r>
+            <a:r>
+              <a:rPr lang="en-US" dirty="0"/>
+              <a:t> JavaScript Client</a:t>
+            </a:r>
+          </a:p>
+        </p:txBody>
+      </p:sp>
+      <p:pic>
+        <p:nvPicPr>
+          <p:cNvPr id="8" name="Picture 7"/>
+          <p:cNvPicPr>
+            <a:picLocks noChangeAspect="1"/>
+          </p:cNvPicPr>
+          <p:nvPr/>
+        </p:nvPicPr>
+        <p:blipFill>
+          <a:blip r:embed="rId2">
+            <a:extLst>
+              <a:ext uri="{BEBA8EAE-BF5A-486C-A8C5-ECC9F3942E4B}">
+                <a14:imgProps xmlns:a14="http://schemas.microsoft.com/office/drawing/2010/main">
+                  <a14:imgLayer r:embed="rId3">
+                    <a14:imgEffect>
+                      <a14:sharpenSoften amount="50000"/>
+                    </a14:imgEffect>
+                  </a14:imgLayer>
+                </a14:imgProps>
+              </a:ext>
+            </a:extLst>
+          </a:blip>
+          <a:stretch>
+            <a:fillRect/>
+          </a:stretch>
+        </p:blipFill>
+        <p:spPr>
+          <a:xfrm>
+            <a:off x="838200" y="2754641"/>
+            <a:ext cx="7477125" cy="2543175"/>
+          </a:xfrm>
+          <a:prstGeom prst="rect">
+            <a:avLst/>
+          </a:prstGeom>
+        </p:spPr>
+      </p:pic>
+      <p:sp>
+        <p:nvSpPr>
+          <p:cNvPr id="9" name="TextBox 8"/>
+          <p:cNvSpPr txBox="1"/>
+          <p:nvPr/>
+        </p:nvSpPr>
+        <p:spPr>
+          <a:xfrm>
+            <a:off x="838200" y="1429078"/>
+            <a:ext cx="9451626" cy="523220"/>
+          </a:xfrm>
+          <a:prstGeom prst="rect">
+            <a:avLst/>
+          </a:prstGeom>
+          <a:noFill/>
+        </p:spPr>
+        <p:txBody>
+          <a:bodyPr wrap="none" rtlCol="0">
+            <a:spAutoFit/>
+          </a:bodyPr>
+          <a:lstStyle/>
+          <a:p>
+            <a:r>
+              <a:rPr lang="en-US" sz="2800" dirty="0">
+                <a:latin typeface="Consolas" panose="020B0609020204030204" pitchFamily="49" charset="0"/>
+              </a:rPr>
+              <a:t>https://github.com/eclipse/paho.mqtt.javascript</a:t>
+            </a:r>
+          </a:p>
+        </p:txBody>
+      </p:sp>
+    </p:spTree>
+    <p:extLst>
+      <p:ext uri="{BB962C8B-B14F-4D97-AF65-F5344CB8AC3E}">
+        <p14:creationId xmlns:p14="http://schemas.microsoft.com/office/powerpoint/2010/main" val="732763416"/>
+      </p:ext>
+    </p:extLst>
+  </p:cSld>
+  <p:clrMapOvr>
+    <a:masterClrMapping/>
+  </p:clrMapOvr>
+</p:sld>
+</file>
+
+<file path=ppt/slides/slide42.xml><?xml version="1.0" encoding="utf-8"?>
+<p:sld xmlns:a="http://schemas.openxmlformats.org/drawingml/2006/main" xmlns:r="http://schemas.openxmlformats.org/officeDocument/2006/relationships" xmlns:p="http://schemas.openxmlformats.org/presentationml/2006/main">
+  <p:cSld>
+    <p:spTree>
+      <p:nvGrpSpPr>
+        <p:cNvPr id="1" name=""/>
+        <p:cNvGrpSpPr/>
+        <p:nvPr/>
+      </p:nvGrpSpPr>
+      <p:grpSpPr>
+        <a:xfrm>
+          <a:off x="0" y="0"/>
+          <a:ext cx="0" cy="0"/>
+          <a:chOff x="0" y="0"/>
+          <a:chExt cx="0" cy="0"/>
+        </a:xfrm>
+      </p:grpSpPr>
+      <p:sp>
+        <p:nvSpPr>
+          <p:cNvPr id="2" name="Title 1"/>
+          <p:cNvSpPr>
+            <a:spLocks noGrp="1"/>
+          </p:cNvSpPr>
+          <p:nvPr>
+            <p:ph type="title"/>
+          </p:nvPr>
+        </p:nvSpPr>
+        <p:spPr/>
+        <p:txBody>
+          <a:bodyPr/>
+          <a:lstStyle/>
+          <a:p>
+            <a:r>
+              <a:rPr lang="en-US" dirty="0"/>
+              <a:t>MQTT.js</a:t>
+            </a:r>
+          </a:p>
+        </p:txBody>
+      </p:sp>
+      <p:pic>
+        <p:nvPicPr>
+          <p:cNvPr id="4" name="Picture 3"/>
+          <p:cNvPicPr>
+            <a:picLocks noChangeAspect="1"/>
+          </p:cNvPicPr>
+          <p:nvPr/>
+        </p:nvPicPr>
+        <p:blipFill>
+          <a:blip r:embed="rId2">
+            <a:extLst>
+              <a:ext uri="{BEBA8EAE-BF5A-486C-A8C5-ECC9F3942E4B}">
+                <a14:imgProps xmlns:a14="http://schemas.microsoft.com/office/drawing/2010/main">
+                  <a14:imgLayer r:embed="rId3">
+                    <a14:imgEffect>
+                      <a14:sharpenSoften amount="50000"/>
+                    </a14:imgEffect>
+                  </a14:imgLayer>
+                </a14:imgProps>
+              </a:ext>
+            </a:extLst>
+          </a:blip>
+          <a:stretch>
+            <a:fillRect/>
+          </a:stretch>
+        </p:blipFill>
+        <p:spPr>
+          <a:xfrm>
+            <a:off x="810212" y="2679993"/>
+            <a:ext cx="7743825" cy="2543175"/>
+          </a:xfrm>
+          <a:prstGeom prst="rect">
+            <a:avLst/>
+          </a:prstGeom>
+        </p:spPr>
+      </p:pic>
+      <p:sp>
+        <p:nvSpPr>
+          <p:cNvPr id="5" name="TextBox 4"/>
+          <p:cNvSpPr txBox="1"/>
+          <p:nvPr/>
+        </p:nvSpPr>
+        <p:spPr>
+          <a:xfrm>
+            <a:off x="838200" y="1429078"/>
+            <a:ext cx="6691255" cy="523220"/>
+          </a:xfrm>
+          <a:prstGeom prst="rect">
+            <a:avLst/>
+          </a:prstGeom>
+          <a:noFill/>
+        </p:spPr>
+        <p:txBody>
+          <a:bodyPr wrap="none" rtlCol="0">
+            <a:spAutoFit/>
+          </a:bodyPr>
+          <a:lstStyle/>
+          <a:p>
+            <a:r>
+              <a:rPr lang="en-US" sz="2800" dirty="0">
+                <a:latin typeface="Consolas" panose="020B0609020204030204" pitchFamily="49" charset="0"/>
+              </a:rPr>
+              <a:t>https://github.com/mqttjs/MQTT.js</a:t>
+            </a:r>
+          </a:p>
+        </p:txBody>
+      </p:sp>
+    </p:spTree>
+    <p:extLst>
+      <p:ext uri="{BB962C8B-B14F-4D97-AF65-F5344CB8AC3E}">
+        <p14:creationId xmlns:p14="http://schemas.microsoft.com/office/powerpoint/2010/main" val="3542132717"/>
+      </p:ext>
+    </p:extLst>
+  </p:cSld>
+  <p:clrMapOvr>
+    <a:masterClrMapping/>
+  </p:clrMapOvr>
+</p:sld>
+</file>
+
+<file path=ppt/slides/slide43.xml><?xml version="1.0" encoding="utf-8"?>
+<p:sld xmlns:a="http://schemas.openxmlformats.org/drawingml/2006/main" xmlns:r="http://schemas.openxmlformats.org/officeDocument/2006/relationships" xmlns:p="http://schemas.openxmlformats.org/presentationml/2006/main">
+  <p:cSld>
+    <p:spTree>
+      <p:nvGrpSpPr>
+        <p:cNvPr id="1" name=""/>
+        <p:cNvGrpSpPr/>
+        <p:nvPr/>
+      </p:nvGrpSpPr>
+      <p:grpSpPr>
+        <a:xfrm>
+          <a:off x="0" y="0"/>
+          <a:ext cx="0" cy="0"/>
+          <a:chOff x="0" y="0"/>
+          <a:chExt cx="0" cy="0"/>
+        </a:xfrm>
+      </p:grpSpPr>
+      <p:sp>
+        <p:nvSpPr>
+          <p:cNvPr id="2" name="Title 1">
+            <a:extLst>
+              <a:ext uri="{FF2B5EF4-FFF2-40B4-BE49-F238E27FC236}">
+                <a16:creationId xmlns:a16="http://schemas.microsoft.com/office/drawing/2014/main" id="{C98CC361-0A19-4C50-A88E-562BFC3C3587}"/>
+              </a:ext>
+            </a:extLst>
+          </p:cNvPr>
+          <p:cNvSpPr>
+            <a:spLocks noGrp="1"/>
+          </p:cNvSpPr>
+          <p:nvPr>
+            <p:ph type="title"/>
+          </p:nvPr>
+        </p:nvSpPr>
+        <p:spPr/>
+        <p:txBody>
+          <a:bodyPr/>
+          <a:lstStyle/>
+          <a:p>
+            <a:r>
+              <a:rPr lang="en-US" dirty="0"/>
+              <a:t>Putting it all Together</a:t>
+            </a:r>
+          </a:p>
+        </p:txBody>
+      </p:sp>
+      <p:sp>
+        <p:nvSpPr>
+          <p:cNvPr id="4" name="Text Placeholder 3">
+            <a:extLst>
+              <a:ext uri="{FF2B5EF4-FFF2-40B4-BE49-F238E27FC236}">
+                <a16:creationId xmlns:a16="http://schemas.microsoft.com/office/drawing/2014/main" id="{0FD847C0-AC95-4968-B816-A5BD147DBBC8}"/>
+              </a:ext>
+            </a:extLst>
+          </p:cNvPr>
+          <p:cNvSpPr>
+            <a:spLocks noGrp="1"/>
+          </p:cNvSpPr>
+          <p:nvPr>
+            <p:ph type="body" idx="1"/>
+          </p:nvPr>
+        </p:nvSpPr>
+        <p:spPr/>
+        <p:txBody>
+          <a:bodyPr/>
+          <a:lstStyle/>
+          <a:p>
+            <a:endParaRPr lang="en-US"/>
+          </a:p>
+        </p:txBody>
+      </p:sp>
+    </p:spTree>
+    <p:extLst>
+      <p:ext uri="{BB962C8B-B14F-4D97-AF65-F5344CB8AC3E}">
+        <p14:creationId xmlns:p14="http://schemas.microsoft.com/office/powerpoint/2010/main" val="381455407"/>
+      </p:ext>
+    </p:extLst>
+  </p:cSld>
+  <p:clrMapOvr>
+    <a:masterClrMapping/>
+  </p:clrMapOvr>
+</p:sld>
+</file>
+
+<file path=ppt/slides/slide44.xml><?xml version="1.0" encoding="utf-8"?>
+<p:sld xmlns:a="http://schemas.openxmlformats.org/drawingml/2006/main" xmlns:r="http://schemas.openxmlformats.org/officeDocument/2006/relationships" xmlns:p="http://schemas.openxmlformats.org/presentationml/2006/main">
+  <p:cSld>
+    <p:spTree>
+      <p:nvGrpSpPr>
+        <p:cNvPr id="1" name=""/>
+        <p:cNvGrpSpPr/>
+        <p:nvPr/>
+      </p:nvGrpSpPr>
+      <p:grpSpPr>
+        <a:xfrm>
+          <a:off x="0" y="0"/>
+          <a:ext cx="0" cy="0"/>
+          <a:chOff x="0" y="0"/>
+          <a:chExt cx="0" cy="0"/>
+        </a:xfrm>
+      </p:grpSpPr>
       <p:pic>
         <p:nvPicPr>
           <p:cNvPr id="1026" name="Picture 2" descr="SparkFun Atmospheric Sensor Breakout - BME280"/>
@@ -11314,7 +14165,7 @@
 </p:sld>
 </file>
 
-<file path=ppt/slides/slide41.xml><?xml version="1.0" encoding="utf-8"?>
+<file path=ppt/slides/slide45.xml><?xml version="1.0" encoding="utf-8"?>
 <p:sld xmlns:a="http://schemas.openxmlformats.org/drawingml/2006/main" xmlns:r="http://schemas.openxmlformats.org/officeDocument/2006/relationships" xmlns:p="http://schemas.openxmlformats.org/presentationml/2006/main">
   <p:cSld>
     <p:spTree>
@@ -12372,7 +15223,7 @@
 </p:sld>
 </file>
 
-<file path=ppt/slides/slide42.xml><?xml version="1.0" encoding="utf-8"?>
+<file path=ppt/slides/slide46.xml><?xml version="1.0" encoding="utf-8"?>
 <p:sld xmlns:a="http://schemas.openxmlformats.org/drawingml/2006/main" xmlns:r="http://schemas.openxmlformats.org/officeDocument/2006/relationships" xmlns:p="http://schemas.openxmlformats.org/presentationml/2006/main">
   <p:cSld>
     <p:spTree>
@@ -12486,7 +15337,7 @@
 </p:sld>
 </file>
 
-<file path=ppt/slides/slide43.xml><?xml version="1.0" encoding="utf-8"?>
+<file path=ppt/slides/slide47.xml><?xml version="1.0" encoding="utf-8"?>
 <p:sld xmlns:a="http://schemas.openxmlformats.org/drawingml/2006/main" xmlns:r="http://schemas.openxmlformats.org/officeDocument/2006/relationships" xmlns:p="http://schemas.openxmlformats.org/presentationml/2006/main">
   <p:cSld>
     <p:spTree>
@@ -12729,7 +15580,7 @@
 </p:sld>
 </file>
 
-<file path=ppt/slides/slide44.xml><?xml version="1.0" encoding="utf-8"?>
+<file path=ppt/slides/slide48.xml><?xml version="1.0" encoding="utf-8"?>
 <p:sld xmlns:a="http://schemas.openxmlformats.org/drawingml/2006/main" xmlns:r="http://schemas.openxmlformats.org/officeDocument/2006/relationships" xmlns:p="http://schemas.openxmlformats.org/presentationml/2006/main" show="0">
   <p:cSld>
     <p:spTree>

</xml_diff>

<commit_message>
Prior to KCDC presentations
</commit_message>
<xml_diff>
--- a/LightweightPubSub.pptx
+++ b/LightweightPubSub.pptx
@@ -5,7 +5,7 @@
     <p:sldMasterId id="2147483648" r:id="rId1"/>
   </p:sldMasterIdLst>
   <p:notesMasterIdLst>
-    <p:notesMasterId r:id="rId50"/>
+    <p:notesMasterId r:id="rId51"/>
   </p:notesMasterIdLst>
   <p:sldIdLst>
     <p:sldId id="256" r:id="rId2"/>
@@ -38,24 +38,25 @@
     <p:sldId id="265" r:id="rId29"/>
     <p:sldId id="313" r:id="rId30"/>
     <p:sldId id="314" r:id="rId31"/>
-    <p:sldId id="315" r:id="rId32"/>
-    <p:sldId id="296" r:id="rId33"/>
-    <p:sldId id="275" r:id="rId34"/>
-    <p:sldId id="306" r:id="rId35"/>
-    <p:sldId id="316" r:id="rId36"/>
-    <p:sldId id="297" r:id="rId37"/>
-    <p:sldId id="300" r:id="rId38"/>
-    <p:sldId id="301" r:id="rId39"/>
-    <p:sldId id="302" r:id="rId40"/>
-    <p:sldId id="298" r:id="rId41"/>
-    <p:sldId id="287" r:id="rId42"/>
-    <p:sldId id="289" r:id="rId43"/>
-    <p:sldId id="310" r:id="rId44"/>
-    <p:sldId id="312" r:id="rId45"/>
-    <p:sldId id="311" r:id="rId46"/>
-    <p:sldId id="309" r:id="rId47"/>
-    <p:sldId id="308" r:id="rId48"/>
-    <p:sldId id="282" r:id="rId49"/>
+    <p:sldId id="317" r:id="rId32"/>
+    <p:sldId id="315" r:id="rId33"/>
+    <p:sldId id="296" r:id="rId34"/>
+    <p:sldId id="275" r:id="rId35"/>
+    <p:sldId id="306" r:id="rId36"/>
+    <p:sldId id="316" r:id="rId37"/>
+    <p:sldId id="297" r:id="rId38"/>
+    <p:sldId id="300" r:id="rId39"/>
+    <p:sldId id="301" r:id="rId40"/>
+    <p:sldId id="302" r:id="rId41"/>
+    <p:sldId id="298" r:id="rId42"/>
+    <p:sldId id="287" r:id="rId43"/>
+    <p:sldId id="289" r:id="rId44"/>
+    <p:sldId id="310" r:id="rId45"/>
+    <p:sldId id="312" r:id="rId46"/>
+    <p:sldId id="311" r:id="rId47"/>
+    <p:sldId id="309" r:id="rId48"/>
+    <p:sldId id="308" r:id="rId49"/>
+    <p:sldId id="282" r:id="rId50"/>
   </p:sldIdLst>
   <p:sldSz cx="12192000" cy="6858000"/>
   <p:notesSz cx="6858000" cy="9144000"/>
@@ -156,7 +157,7 @@
   </p:defaultTextStyle>
   <p:extLst>
     <p:ext uri="{EFAFB233-063F-42B5-8137-9DF3F51BA10A}">
-      <p15:sldGuideLst xmlns:p15="http://schemas.microsoft.com/office/powerpoint/2012/main"/>
+      <p15:sldGuideLst xmlns:p15="http://schemas.microsoft.com/office/powerpoint/2012/main" xmlns=""/>
     </p:ext>
   </p:extLst>
 </p:presentation>
@@ -1043,6 +1044,13 @@
         </dgm:presLayoutVars>
       </dgm:prSet>
       <dgm:spPr/>
+      <dgm:t>
+        <a:bodyPr/>
+        <a:lstStyle/>
+        <a:p>
+          <a:endParaRPr lang="en-US"/>
+        </a:p>
+      </dgm:t>
     </dgm:pt>
     <dgm:pt modelId="{89FF7BC8-E718-4A23-A9CF-5853E0293005}" type="pres">
       <dgm:prSet presAssocID="{AB8A6984-0197-483B-BFAF-9ED94486892D}" presName="dummy" presStyleCnt="0"/>
@@ -1055,10 +1063,24 @@
         </dgm:presLayoutVars>
       </dgm:prSet>
       <dgm:spPr/>
+      <dgm:t>
+        <a:bodyPr/>
+        <a:lstStyle/>
+        <a:p>
+          <a:endParaRPr lang="en-US"/>
+        </a:p>
+      </dgm:t>
     </dgm:pt>
     <dgm:pt modelId="{17A6AE0B-E9A4-4E3D-AEFF-55388B1A12D9}" type="pres">
       <dgm:prSet presAssocID="{E023EE7F-CED8-4065-A304-2B4A1C4D8A42}" presName="sibTrans" presStyleLbl="node1" presStyleIdx="0" presStyleCnt="3"/>
       <dgm:spPr/>
+      <dgm:t>
+        <a:bodyPr/>
+        <a:lstStyle/>
+        <a:p>
+          <a:endParaRPr lang="en-US"/>
+        </a:p>
+      </dgm:t>
     </dgm:pt>
     <dgm:pt modelId="{435451E8-154C-43E7-A737-BF1209E135E8}" type="pres">
       <dgm:prSet presAssocID="{7293F13F-EF28-451F-9668-B6B17731D2CC}" presName="dummy" presStyleCnt="0"/>
@@ -1071,10 +1093,24 @@
         </dgm:presLayoutVars>
       </dgm:prSet>
       <dgm:spPr/>
+      <dgm:t>
+        <a:bodyPr/>
+        <a:lstStyle/>
+        <a:p>
+          <a:endParaRPr lang="en-US"/>
+        </a:p>
+      </dgm:t>
     </dgm:pt>
     <dgm:pt modelId="{E5E4ECF5-AD93-45EC-8E77-2C8A1C95383A}" type="pres">
       <dgm:prSet presAssocID="{D13697DC-B2BA-4C11-8C1E-16400086DE25}" presName="sibTrans" presStyleLbl="node1" presStyleIdx="1" presStyleCnt="3"/>
       <dgm:spPr/>
+      <dgm:t>
+        <a:bodyPr/>
+        <a:lstStyle/>
+        <a:p>
+          <a:endParaRPr lang="en-US"/>
+        </a:p>
+      </dgm:t>
     </dgm:pt>
     <dgm:pt modelId="{EF1F8813-05E0-4F37-B3CB-078CAA754228}" type="pres">
       <dgm:prSet presAssocID="{E74A3415-E433-4ACE-A9B2-F49B2AA23A62}" presName="dummy" presStyleCnt="0"/>
@@ -1087,21 +1123,35 @@
         </dgm:presLayoutVars>
       </dgm:prSet>
       <dgm:spPr/>
+      <dgm:t>
+        <a:bodyPr/>
+        <a:lstStyle/>
+        <a:p>
+          <a:endParaRPr lang="en-US"/>
+        </a:p>
+      </dgm:t>
     </dgm:pt>
     <dgm:pt modelId="{2ECBCCA0-DF58-408C-8B75-BECE95CE7369}" type="pres">
       <dgm:prSet presAssocID="{F29242FB-9360-40B4-8800-DD5BDEE40D8B}" presName="sibTrans" presStyleLbl="node1" presStyleIdx="2" presStyleCnt="3"/>
       <dgm:spPr/>
+      <dgm:t>
+        <a:bodyPr/>
+        <a:lstStyle/>
+        <a:p>
+          <a:endParaRPr lang="en-US"/>
+        </a:p>
+      </dgm:t>
     </dgm:pt>
   </dgm:ptLst>
   <dgm:cxnLst>
+    <dgm:cxn modelId="{52877183-0484-473A-B3BC-6AF7D30FAC45}" type="presOf" srcId="{232FBF3E-308B-48F5-8394-AAB98CD35526}" destId="{26D0F925-43EE-4595-A9D6-2E343A3B554B}" srcOrd="0" destOrd="0" presId="urn:microsoft.com/office/officeart/2005/8/layout/cycle1"/>
+    <dgm:cxn modelId="{CF537F55-8EF8-473B-AB78-59EEA0713856}" type="presOf" srcId="{D13697DC-B2BA-4C11-8C1E-16400086DE25}" destId="{E5E4ECF5-AD93-45EC-8E77-2C8A1C95383A}" srcOrd="0" destOrd="0" presId="urn:microsoft.com/office/officeart/2005/8/layout/cycle1"/>
+    <dgm:cxn modelId="{FC351F9E-364F-4C22-B55E-205B5AB38EDA}" type="presOf" srcId="{E023EE7F-CED8-4065-A304-2B4A1C4D8A42}" destId="{17A6AE0B-E9A4-4E3D-AEFF-55388B1A12D9}" srcOrd="0" destOrd="0" presId="urn:microsoft.com/office/officeart/2005/8/layout/cycle1"/>
+    <dgm:cxn modelId="{D1E8113F-5947-4CAD-9CBD-8ACF123A5618}" srcId="{232FBF3E-308B-48F5-8394-AAB98CD35526}" destId="{AB8A6984-0197-483B-BFAF-9ED94486892D}" srcOrd="0" destOrd="0" parTransId="{C07D5215-94CE-41D6-A262-0A44634D6499}" sibTransId="{E023EE7F-CED8-4065-A304-2B4A1C4D8A42}"/>
     <dgm:cxn modelId="{F9FEE31B-E523-4C63-8526-02965CD6883C}" type="presOf" srcId="{7293F13F-EF28-451F-9668-B6B17731D2CC}" destId="{4228DD0E-AA9D-475C-BE99-8E1A47767C3A}" srcOrd="0" destOrd="0" presId="urn:microsoft.com/office/officeart/2005/8/layout/cycle1"/>
+    <dgm:cxn modelId="{22315C41-0450-4F80-922D-C52D73F4DBA6}" type="presOf" srcId="{AB8A6984-0197-483B-BFAF-9ED94486892D}" destId="{8DF0D3FB-37DC-489A-AE0B-18A345D2743D}" srcOrd="0" destOrd="0" presId="urn:microsoft.com/office/officeart/2005/8/layout/cycle1"/>
     <dgm:cxn modelId="{821C2522-62B6-40D9-A262-E972D3966478}" type="presOf" srcId="{F29242FB-9360-40B4-8800-DD5BDEE40D8B}" destId="{2ECBCCA0-DF58-408C-8B75-BECE95CE7369}" srcOrd="0" destOrd="0" presId="urn:microsoft.com/office/officeart/2005/8/layout/cycle1"/>
-    <dgm:cxn modelId="{D1E8113F-5947-4CAD-9CBD-8ACF123A5618}" srcId="{232FBF3E-308B-48F5-8394-AAB98CD35526}" destId="{AB8A6984-0197-483B-BFAF-9ED94486892D}" srcOrd="0" destOrd="0" parTransId="{C07D5215-94CE-41D6-A262-0A44634D6499}" sibTransId="{E023EE7F-CED8-4065-A304-2B4A1C4D8A42}"/>
-    <dgm:cxn modelId="{22315C41-0450-4F80-922D-C52D73F4DBA6}" type="presOf" srcId="{AB8A6984-0197-483B-BFAF-9ED94486892D}" destId="{8DF0D3FB-37DC-489A-AE0B-18A345D2743D}" srcOrd="0" destOrd="0" presId="urn:microsoft.com/office/officeart/2005/8/layout/cycle1"/>
     <dgm:cxn modelId="{67D13F66-AA5E-4282-85BB-B9D9E652663E}" srcId="{232FBF3E-308B-48F5-8394-AAB98CD35526}" destId="{7293F13F-EF28-451F-9668-B6B17731D2CC}" srcOrd="1" destOrd="0" parTransId="{71729048-F2F4-46AB-A578-3F052A2BA62A}" sibTransId="{D13697DC-B2BA-4C11-8C1E-16400086DE25}"/>
-    <dgm:cxn modelId="{CF537F55-8EF8-473B-AB78-59EEA0713856}" type="presOf" srcId="{D13697DC-B2BA-4C11-8C1E-16400086DE25}" destId="{E5E4ECF5-AD93-45EC-8E77-2C8A1C95383A}" srcOrd="0" destOrd="0" presId="urn:microsoft.com/office/officeart/2005/8/layout/cycle1"/>
-    <dgm:cxn modelId="{52877183-0484-473A-B3BC-6AF7D30FAC45}" type="presOf" srcId="{232FBF3E-308B-48F5-8394-AAB98CD35526}" destId="{26D0F925-43EE-4595-A9D6-2E343A3B554B}" srcOrd="0" destOrd="0" presId="urn:microsoft.com/office/officeart/2005/8/layout/cycle1"/>
-    <dgm:cxn modelId="{FC351F9E-364F-4C22-B55E-205B5AB38EDA}" type="presOf" srcId="{E023EE7F-CED8-4065-A304-2B4A1C4D8A42}" destId="{17A6AE0B-E9A4-4E3D-AEFF-55388B1A12D9}" srcOrd="0" destOrd="0" presId="urn:microsoft.com/office/officeart/2005/8/layout/cycle1"/>
     <dgm:cxn modelId="{A66649C5-445E-480A-9CA3-E25E1936901B}" type="presOf" srcId="{E74A3415-E433-4ACE-A9B2-F49B2AA23A62}" destId="{55CB1DD2-2A98-4E44-8300-4304A44A9517}" srcOrd="0" destOrd="0" presId="urn:microsoft.com/office/officeart/2005/8/layout/cycle1"/>
     <dgm:cxn modelId="{820FF0FF-5C63-43B6-A176-B51A9736D19C}" srcId="{232FBF3E-308B-48F5-8394-AAB98CD35526}" destId="{E74A3415-E433-4ACE-A9B2-F49B2AA23A62}" srcOrd="2" destOrd="0" parTransId="{6DE8DB75-0DB6-4DD7-AB33-A65418C2B445}" sibTransId="{F29242FB-9360-40B4-8800-DD5BDEE40D8B}"/>
     <dgm:cxn modelId="{FCEA3678-45E0-4DBA-8683-74937513ECB3}" type="presParOf" srcId="{26D0F925-43EE-4595-A9D6-2E343A3B554B}" destId="{89FF7BC8-E718-4A23-A9CF-5853E0293005}" srcOrd="0" destOrd="0" presId="urn:microsoft.com/office/officeart/2005/8/layout/cycle1"/>
@@ -1169,7 +1219,7 @@
         </a:bodyPr>
         <a:lstStyle/>
         <a:p>
-          <a:pPr marL="0" lvl="0" indent="0" algn="ctr" defTabSz="1822450">
+          <a:pPr lvl="0" algn="ctr" defTabSz="1822450">
             <a:lnSpc>
               <a:spcPct val="90000"/>
             </a:lnSpc>
@@ -1179,7 +1229,6 @@
             <a:spcAft>
               <a:spcPct val="35000"/>
             </a:spcAft>
-            <a:buNone/>
           </a:pPr>
           <a:r>
             <a:rPr lang="en-US" sz="4100" kern="1200" dirty="0"/>
@@ -1285,7 +1334,7 @@
         </a:bodyPr>
         <a:lstStyle/>
         <a:p>
-          <a:pPr marL="0" lvl="0" indent="0" algn="ctr" defTabSz="1822450">
+          <a:pPr lvl="0" algn="ctr" defTabSz="1822450">
             <a:lnSpc>
               <a:spcPct val="90000"/>
             </a:lnSpc>
@@ -1295,7 +1344,6 @@
             <a:spcAft>
               <a:spcPct val="35000"/>
             </a:spcAft>
-            <a:buNone/>
           </a:pPr>
           <a:r>
             <a:rPr lang="en-US" sz="4100" kern="1200" dirty="0"/>
@@ -1401,7 +1449,7 @@
         </a:bodyPr>
         <a:lstStyle/>
         <a:p>
-          <a:pPr marL="0" lvl="0" indent="0" algn="ctr" defTabSz="1822450">
+          <a:pPr lvl="0" algn="ctr" defTabSz="1822450">
             <a:lnSpc>
               <a:spcPct val="90000"/>
             </a:lnSpc>
@@ -1411,7 +1459,6 @@
             <a:spcAft>
               <a:spcPct val="35000"/>
             </a:spcAft>
-            <a:buNone/>
           </a:pPr>
           <a:r>
             <a:rPr lang="en-US" sz="4100" kern="1200" dirty="0"/>
@@ -2798,7 +2845,7 @@
           <a:p>
             <a:fld id="{034341DA-F323-482F-83BE-7FBA8C7DDB2E}" type="datetimeFigureOut">
               <a:rPr lang="en-US" smtClean="0"/>
-              <a:t>6/10/2017</a:t>
+              <a:t>8/3/17</a:t>
             </a:fld>
             <a:endParaRPr lang="en-US"/>
           </a:p>
@@ -3858,7 +3905,7 @@
           <a:p>
             <a:fld id="{C29F56AA-8764-4156-B7A3-0F667B5214CB}" type="datetimeFigureOut">
               <a:rPr lang="en-US" smtClean="0"/>
-              <a:t>6/10/2017</a:t>
+              <a:t>8/3/17</a:t>
             </a:fld>
             <a:endParaRPr lang="en-US"/>
           </a:p>
@@ -4034,7 +4081,7 @@
           <a:p>
             <a:fld id="{C29F56AA-8764-4156-B7A3-0F667B5214CB}" type="datetimeFigureOut">
               <a:rPr lang="en-US" smtClean="0"/>
-              <a:t>6/10/2017</a:t>
+              <a:t>8/3/17</a:t>
             </a:fld>
             <a:endParaRPr lang="en-US"/>
           </a:p>
@@ -4356,7 +4403,7 @@
           <a:p>
             <a:fld id="{C29F56AA-8764-4156-B7A3-0F667B5214CB}" type="datetimeFigureOut">
               <a:rPr lang="en-US" smtClean="0"/>
-              <a:t>6/10/2017</a:t>
+              <a:t>8/3/17</a:t>
             </a:fld>
             <a:endParaRPr lang="en-US"/>
           </a:p>
@@ -4499,7 +4546,7 @@
           <a:p>
             <a:fld id="{C29F56AA-8764-4156-B7A3-0F667B5214CB}" type="datetimeFigureOut">
               <a:rPr lang="en-US" smtClean="0"/>
-              <a:t>6/10/2017</a:t>
+              <a:t>8/3/17</a:t>
             </a:fld>
             <a:endParaRPr lang="en-US"/>
           </a:p>
@@ -4774,7 +4821,7 @@
           <a:p>
             <a:fld id="{C29F56AA-8764-4156-B7A3-0F667B5214CB}" type="datetimeFigureOut">
               <a:rPr lang="en-US" smtClean="0"/>
-              <a:t>6/10/2017</a:t>
+              <a:t>8/3/17</a:t>
             </a:fld>
             <a:endParaRPr lang="en-US"/>
           </a:p>
@@ -5026,7 +5073,7 @@
           <a:p>
             <a:fld id="{C29F56AA-8764-4156-B7A3-0F667B5214CB}" type="datetimeFigureOut">
               <a:rPr lang="en-US" smtClean="0"/>
-              <a:t>6/10/2017</a:t>
+              <a:t>8/3/17</a:t>
             </a:fld>
             <a:endParaRPr lang="en-US"/>
           </a:p>
@@ -5194,7 +5241,7 @@
           <a:p>
             <a:fld id="{C29F56AA-8764-4156-B7A3-0F667B5214CB}" type="datetimeFigureOut">
               <a:rPr lang="en-US" smtClean="0"/>
-              <a:t>6/10/2017</a:t>
+              <a:t>8/3/17</a:t>
             </a:fld>
             <a:endParaRPr lang="en-US"/>
           </a:p>
@@ -5372,7 +5419,7 @@
           <a:p>
             <a:fld id="{C29F56AA-8764-4156-B7A3-0F667B5214CB}" type="datetimeFigureOut">
               <a:rPr lang="en-US" smtClean="0"/>
-              <a:t>6/10/2017</a:t>
+              <a:t>8/3/17</a:t>
             </a:fld>
             <a:endParaRPr lang="en-US"/>
           </a:p>
@@ -5583,7 +5630,7 @@
           <a:p>
             <a:fld id="{C29F56AA-8764-4156-B7A3-0F667B5214CB}" type="datetimeFigureOut">
               <a:rPr lang="en-US" smtClean="0"/>
-              <a:t>6/10/2017</a:t>
+              <a:t>8/3/17</a:t>
             </a:fld>
             <a:endParaRPr lang="en-US"/>
           </a:p>
@@ -6058,6 +6105,13 @@
               </a:rPr>
               <a:t>PUB/SUB</a:t>
             </a:r>
+            <a:r>
+              <a:rPr lang="en-US" sz="7200" b="1" cap="small" dirty="0">
+                <a:latin typeface="Oswald Regular" panose="02000503000000000000" pitchFamily="2" charset="0"/>
+                <a:cs typeface="Segoe UI Light" panose="020B0502040204020203" pitchFamily="34" charset="0"/>
+              </a:rPr>
+              <a:t/>
+            </a:r>
             <a:br>
               <a:rPr lang="en-US" sz="7200" b="1" cap="small" dirty="0">
                 <a:latin typeface="Oswald Regular" panose="02000503000000000000" pitchFamily="2" charset="0"/>
@@ -6168,6 +6222,16 @@
               </a:rPr>
               <a:t>Jason Follas</a:t>
             </a:r>
+            <a:r>
+              <a:rPr lang="en-US" cap="small" dirty="0">
+                <a:solidFill>
+                  <a:schemeClr val="bg2">
+                    <a:lumMod val="50000"/>
+                  </a:schemeClr>
+                </a:solidFill>
+              </a:rPr>
+              <a:t/>
+            </a:r>
             <a:br>
               <a:rPr lang="en-US" cap="small" dirty="0">
                 <a:solidFill>
@@ -6219,6 +6283,13 @@
   <p:clrMapOvr>
     <a:masterClrMapping/>
   </p:clrMapOvr>
+  <p:timing>
+    <p:tnLst>
+      <p:par>
+        <p:cTn xmlns:p14="http://schemas.microsoft.com/office/powerpoint/2010/main" id="1" dur="indefinite" restart="never" nodeType="tmRoot"/>
+      </p:par>
+    </p:tnLst>
+  </p:timing>
 </p:sld>
 </file>
 
@@ -6352,6 +6423,13 @@
   <p:clrMapOvr>
     <a:masterClrMapping/>
   </p:clrMapOvr>
+  <p:timing>
+    <p:tnLst>
+      <p:par>
+        <p:cTn xmlns:p14="http://schemas.microsoft.com/office/powerpoint/2010/main" id="1" dur="indefinite" restart="never" nodeType="tmRoot"/>
+      </p:par>
+    </p:tnLst>
+  </p:timing>
 </p:sld>
 </file>
 
@@ -6423,6 +6501,13 @@
   <p:clrMapOvr>
     <a:masterClrMapping/>
   </p:clrMapOvr>
+  <p:timing>
+    <p:tnLst>
+      <p:par>
+        <p:cTn xmlns:p14="http://schemas.microsoft.com/office/powerpoint/2010/main" id="1" dur="indefinite" restart="never" nodeType="tmRoot"/>
+      </p:par>
+    </p:tnLst>
+  </p:timing>
 </p:sld>
 </file>
 
@@ -6568,6 +6653,13 @@
   <p:clrMapOvr>
     <a:masterClrMapping/>
   </p:clrMapOvr>
+  <p:timing>
+    <p:tnLst>
+      <p:par>
+        <p:cTn xmlns:p14="http://schemas.microsoft.com/office/powerpoint/2010/main" id="1" dur="indefinite" restart="never" nodeType="tmRoot"/>
+      </p:par>
+    </p:tnLst>
+  </p:timing>
 </p:sld>
 </file>
 
@@ -6619,7 +6711,7 @@
           </a:prstGeom>
           <a:noFill/>
           <a:extLst>
-            <a:ext uri="{909E8E84-426E-40DD-AFC4-6F175D3DCCD1}">
+            <a:ext uri="{909E8E84-426E-40dd-AFC4-6F175D3DCCD1}">
               <a14:hiddenFill xmlns:a14="http://schemas.microsoft.com/office/drawing/2010/main">
                 <a:solidFill>
                   <a:srgbClr val="FFFFFF"/>
@@ -6639,6 +6731,13 @@
   <p:clrMapOvr>
     <a:masterClrMapping/>
   </p:clrMapOvr>
+  <p:timing>
+    <p:tnLst>
+      <p:par>
+        <p:cTn xmlns:p14="http://schemas.microsoft.com/office/powerpoint/2010/main" id="1" dur="indefinite" restart="never" nodeType="tmRoot"/>
+      </p:par>
+    </p:tnLst>
+  </p:timing>
 </p:sld>
 </file>
 
@@ -6879,6 +6978,13 @@
   <p:clrMapOvr>
     <a:masterClrMapping/>
   </p:clrMapOvr>
+  <p:timing>
+    <p:tnLst>
+      <p:par>
+        <p:cTn xmlns:p14="http://schemas.microsoft.com/office/powerpoint/2010/main" id="1" dur="indefinite" restart="never" nodeType="tmRoot"/>
+      </p:par>
+    </p:tnLst>
+  </p:timing>
 </p:sld>
 </file>
 
@@ -6964,6 +7070,13 @@
   <p:clrMapOvr>
     <a:masterClrMapping/>
   </p:clrMapOvr>
+  <p:timing>
+    <p:tnLst>
+      <p:par>
+        <p:cTn xmlns:p14="http://schemas.microsoft.com/office/powerpoint/2010/main" id="1" dur="indefinite" restart="never" nodeType="tmRoot"/>
+      </p:par>
+    </p:tnLst>
+  </p:timing>
 </p:sld>
 </file>
 
@@ -7047,6 +7160,13 @@
   <p:clrMapOvr>
     <a:masterClrMapping/>
   </p:clrMapOvr>
+  <p:timing>
+    <p:tnLst>
+      <p:par>
+        <p:cTn xmlns:p14="http://schemas.microsoft.com/office/powerpoint/2010/main" id="1" dur="indefinite" restart="never" nodeType="tmRoot"/>
+      </p:par>
+    </p:tnLst>
+  </p:timing>
 </p:sld>
 </file>
 
@@ -7118,6 +7238,13 @@
   <p:clrMapOvr>
     <a:masterClrMapping/>
   </p:clrMapOvr>
+  <p:timing>
+    <p:tnLst>
+      <p:par>
+        <p:cTn xmlns:p14="http://schemas.microsoft.com/office/powerpoint/2010/main" id="1" dur="indefinite" restart="never" nodeType="tmRoot"/>
+      </p:par>
+    </p:tnLst>
+  </p:timing>
 </p:sld>
 </file>
 
@@ -7747,7 +7874,7 @@
   <p:timing>
     <p:tnLst>
       <p:par>
-        <p:cTn id="1" dur="indefinite" restart="never" nodeType="tmRoot">
+        <p:cTn xmlns:p14="http://schemas.microsoft.com/office/powerpoint/2010/main" id="1" dur="indefinite" restart="never" nodeType="tmRoot">
           <p:childTnLst>
             <p:seq concurrent="1" nextAc="seek">
               <p:cTn id="2" dur="indefinite" nodeType="mainSeq">
@@ -8744,6 +8871,13 @@
   <p:clrMapOvr>
     <a:masterClrMapping/>
   </p:clrMapOvr>
+  <p:timing>
+    <p:tnLst>
+      <p:par>
+        <p:cTn xmlns:p14="http://schemas.microsoft.com/office/powerpoint/2010/main" id="1" dur="indefinite" restart="never" nodeType="tmRoot"/>
+      </p:par>
+    </p:tnLst>
+  </p:timing>
 </p:sld>
 </file>
 
@@ -8821,6 +8955,21 @@
   <p:clrMapOvr>
     <a:masterClrMapping/>
   </p:clrMapOvr>
+  <mc:AlternateContent xmlns:mc="http://schemas.openxmlformats.org/markup-compatibility/2006">
+    <mc:Choice xmlns:p14="http://schemas.microsoft.com/office/powerpoint/2010/main" Requires="p14">
+      <p:transition spd="slow" p14:dur="2000"/>
+    </mc:Choice>
+    <mc:Fallback>
+      <p:transition xmlns:p14="http://schemas.microsoft.com/office/powerpoint/2010/main" spd="slow"/>
+    </mc:Fallback>
+  </mc:AlternateContent>
+  <p:timing>
+    <p:tnLst>
+      <p:par>
+        <p:cTn xmlns:p14="http://schemas.microsoft.com/office/powerpoint/2010/main" id="1" dur="indefinite" restart="never" nodeType="tmRoot"/>
+      </p:par>
+    </p:tnLst>
+  </p:timing>
 </p:sld>
 </file>
 
@@ -8919,6 +9068,13 @@
   <p:clrMapOvr>
     <a:masterClrMapping/>
   </p:clrMapOvr>
+  <p:timing>
+    <p:tnLst>
+      <p:par>
+        <p:cTn xmlns:p14="http://schemas.microsoft.com/office/powerpoint/2010/main" id="1" dur="indefinite" restart="never" nodeType="tmRoot"/>
+      </p:par>
+    </p:tnLst>
+  </p:timing>
 </p:sld>
 </file>
 
@@ -9017,6 +9173,13 @@
   <p:clrMapOvr>
     <a:masterClrMapping/>
   </p:clrMapOvr>
+  <p:timing>
+    <p:tnLst>
+      <p:par>
+        <p:cTn xmlns:p14="http://schemas.microsoft.com/office/powerpoint/2010/main" id="1" dur="indefinite" restart="never" nodeType="tmRoot"/>
+      </p:par>
+    </p:tnLst>
+  </p:timing>
 </p:sld>
 </file>
 
@@ -9115,6 +9278,13 @@
   <p:clrMapOvr>
     <a:masterClrMapping/>
   </p:clrMapOvr>
+  <p:timing>
+    <p:tnLst>
+      <p:par>
+        <p:cTn xmlns:p14="http://schemas.microsoft.com/office/powerpoint/2010/main" id="1" dur="indefinite" restart="never" nodeType="tmRoot"/>
+      </p:par>
+    </p:tnLst>
+  </p:timing>
 </p:sld>
 </file>
 
@@ -9210,6 +9380,13 @@
   <p:clrMapOvr>
     <a:masterClrMapping/>
   </p:clrMapOvr>
+  <p:timing>
+    <p:tnLst>
+      <p:par>
+        <p:cTn xmlns:p14="http://schemas.microsoft.com/office/powerpoint/2010/main" id="1" dur="indefinite" restart="never" nodeType="tmRoot"/>
+      </p:par>
+    </p:tnLst>
+  </p:timing>
 </p:sld>
 </file>
 
@@ -9347,6 +9524,13 @@
   <p:clrMapOvr>
     <a:masterClrMapping/>
   </p:clrMapOvr>
+  <p:timing>
+    <p:tnLst>
+      <p:par>
+        <p:cTn xmlns:p14="http://schemas.microsoft.com/office/powerpoint/2010/main" id="1" dur="indefinite" restart="never" nodeType="tmRoot"/>
+      </p:par>
+    </p:tnLst>
+  </p:timing>
 </p:sld>
 </file>
 
@@ -9479,6 +9663,13 @@
   <p:clrMapOvr>
     <a:masterClrMapping/>
   </p:clrMapOvr>
+  <p:timing>
+    <p:tnLst>
+      <p:par>
+        <p:cTn xmlns:p14="http://schemas.microsoft.com/office/powerpoint/2010/main" id="1" dur="indefinite" restart="never" nodeType="tmRoot"/>
+      </p:par>
+    </p:tnLst>
+  </p:timing>
 </p:sld>
 </file>
 
@@ -9575,6 +9766,13 @@
   <p:clrMapOvr>
     <a:masterClrMapping/>
   </p:clrMapOvr>
+  <p:timing>
+    <p:tnLst>
+      <p:par>
+        <p:cTn xmlns:p14="http://schemas.microsoft.com/office/powerpoint/2010/main" id="1" dur="indefinite" restart="never" nodeType="tmRoot"/>
+      </p:par>
+    </p:tnLst>
+  </p:timing>
 </p:sld>
 </file>
 
@@ -9641,6 +9839,10 @@
               </a:rPr>
               <a:t>pipeline/3/pump/1239/temperature</a:t>
             </a:r>
+            <a:r>
+              <a:rPr lang="en-US" dirty="0"/>
+              <a:t/>
+            </a:r>
             <a:br>
               <a:rPr lang="en-US" dirty="0"/>
             </a:br>
@@ -9682,6 +9884,13 @@
   <p:clrMapOvr>
     <a:masterClrMapping/>
   </p:clrMapOvr>
+  <p:timing>
+    <p:tnLst>
+      <p:par>
+        <p:cTn xmlns:p14="http://schemas.microsoft.com/office/powerpoint/2010/main" id="1" dur="indefinite" restart="never" nodeType="tmRoot"/>
+      </p:par>
+    </p:tnLst>
+  </p:timing>
 </p:sld>
 </file>
 
@@ -9785,6 +9994,13 @@
   <p:clrMapOvr>
     <a:masterClrMapping/>
   </p:clrMapOvr>
+  <p:timing>
+    <p:tnLst>
+      <p:par>
+        <p:cTn xmlns:p14="http://schemas.microsoft.com/office/powerpoint/2010/main" id="1" dur="indefinite" restart="never" nodeType="tmRoot"/>
+      </p:par>
+    </p:tnLst>
+  </p:timing>
 </p:sld>
 </file>
 
@@ -9840,7 +10056,7 @@
           <p:cNvPr id="1026" name="Picture 2" descr="publish_qos0_flow">
             <a:extLst>
               <a:ext uri="{FF2B5EF4-FFF2-40B4-BE49-F238E27FC236}">
-                <a16:creationId xmlns:a16="http://schemas.microsoft.com/office/drawing/2014/main" id="{E5BF1022-A365-496D-9123-932662C11E1E}"/>
+                <a16:creationId xmlns:a16="http://schemas.microsoft.com/office/drawing/2014/main" xmlns="" id="{E5BF1022-A365-496D-9123-932662C11E1E}"/>
               </a:ext>
             </a:extLst>
           </p:cNvPr>
@@ -9874,7 +10090,7 @@
           </a:prstGeom>
           <a:noFill/>
           <a:extLst>
-            <a:ext uri="{909E8E84-426E-40DD-AFC4-6F175D3DCCD1}">
+            <a:ext uri="{909E8E84-426E-40dd-AFC4-6F175D3DCCD1}">
               <a14:hiddenFill xmlns:a14="http://schemas.microsoft.com/office/drawing/2010/main">
                 <a:solidFill>
                   <a:srgbClr val="FFFFFF"/>
@@ -9889,7 +10105,7 @@
           <p:cNvPr id="4" name="TextBox 3">
             <a:extLst>
               <a:ext uri="{FF2B5EF4-FFF2-40B4-BE49-F238E27FC236}">
-                <a16:creationId xmlns:a16="http://schemas.microsoft.com/office/drawing/2014/main" id="{BCF2CD95-9AD2-47C6-AE54-9AF9E6671CC4}"/>
+                <a16:creationId xmlns:a16="http://schemas.microsoft.com/office/drawing/2014/main" xmlns="" id="{BCF2CD95-9AD2-47C6-AE54-9AF9E6671CC4}"/>
               </a:ext>
             </a:extLst>
           </p:cNvPr>
@@ -9935,6 +10151,13 @@
   <p:clrMapOvr>
     <a:masterClrMapping/>
   </p:clrMapOvr>
+  <p:timing>
+    <p:tnLst>
+      <p:par>
+        <p:cTn xmlns:p14="http://schemas.microsoft.com/office/powerpoint/2010/main" id="1" dur="indefinite" restart="never" nodeType="tmRoot"/>
+      </p:par>
+    </p:tnLst>
+  </p:timing>
 </p:sld>
 </file>
 
@@ -10006,6 +10229,13 @@
   <p:clrMapOvr>
     <a:masterClrMapping/>
   </p:clrMapOvr>
+  <p:timing>
+    <p:tnLst>
+      <p:par>
+        <p:cTn xmlns:p14="http://schemas.microsoft.com/office/powerpoint/2010/main" id="1" dur="indefinite" restart="never" nodeType="tmRoot"/>
+      </p:par>
+    </p:tnLst>
+  </p:timing>
 </p:sld>
 </file>
 
@@ -10061,7 +10291,7 @@
           <p:cNvPr id="3074" name="Picture 2" descr="publish_qos1_flow">
             <a:extLst>
               <a:ext uri="{FF2B5EF4-FFF2-40B4-BE49-F238E27FC236}">
-                <a16:creationId xmlns:a16="http://schemas.microsoft.com/office/drawing/2014/main" id="{F3E7F9DB-A4E8-46DF-9F4F-1725CB53548E}"/>
+                <a16:creationId xmlns:a16="http://schemas.microsoft.com/office/drawing/2014/main" xmlns="" id="{F3E7F9DB-A4E8-46DF-9F4F-1725CB53548E}"/>
               </a:ext>
             </a:extLst>
           </p:cNvPr>
@@ -10093,7 +10323,7 @@
           </a:prstGeom>
           <a:noFill/>
           <a:extLst>
-            <a:ext uri="{909E8E84-426E-40DD-AFC4-6F175D3DCCD1}">
+            <a:ext uri="{909E8E84-426E-40dd-AFC4-6F175D3DCCD1}">
               <a14:hiddenFill xmlns:a14="http://schemas.microsoft.com/office/drawing/2010/main">
                 <a:solidFill>
                   <a:srgbClr val="FFFFFF"/>
@@ -10108,7 +10338,7 @@
           <p:cNvPr id="8" name="TextBox 7">
             <a:extLst>
               <a:ext uri="{FF2B5EF4-FFF2-40B4-BE49-F238E27FC236}">
-                <a16:creationId xmlns:a16="http://schemas.microsoft.com/office/drawing/2014/main" id="{16D65E68-902A-4059-A5F3-683385A21EFB}"/>
+                <a16:creationId xmlns:a16="http://schemas.microsoft.com/office/drawing/2014/main" xmlns="" id="{16D65E68-902A-4059-A5F3-683385A21EFB}"/>
               </a:ext>
             </a:extLst>
           </p:cNvPr>
@@ -10154,6 +10384,13 @@
   <p:clrMapOvr>
     <a:masterClrMapping/>
   </p:clrMapOvr>
+  <p:timing>
+    <p:tnLst>
+      <p:par>
+        <p:cTn xmlns:p14="http://schemas.microsoft.com/office/powerpoint/2010/main" id="1" dur="indefinite" restart="never" nodeType="tmRoot"/>
+      </p:par>
+    </p:tnLst>
+  </p:timing>
 </p:sld>
 </file>
 
@@ -10190,6 +10427,116 @@
           <a:lstStyle/>
           <a:p>
             <a:r>
+              <a:rPr lang="en-US" dirty="0" smtClean="0"/>
+              <a:t>Retain Flag</a:t>
+            </a:r>
+            <a:endParaRPr lang="en-US" dirty="0"/>
+          </a:p>
+        </p:txBody>
+      </p:sp>
+      <p:sp>
+        <p:nvSpPr>
+          <p:cNvPr id="3" name="Content Placeholder 2"/>
+          <p:cNvSpPr>
+            <a:spLocks noGrp="1"/>
+          </p:cNvSpPr>
+          <p:nvPr>
+            <p:ph idx="1"/>
+          </p:nvPr>
+        </p:nvSpPr>
+        <p:spPr/>
+        <p:txBody>
+          <a:bodyPr/>
+          <a:lstStyle/>
+          <a:p>
+            <a:pPr marL="0" indent="0">
+              <a:buNone/>
+            </a:pPr>
+            <a:r>
+              <a:rPr lang="en-US" dirty="0" smtClean="0"/>
+              <a:t>The broker will store the last message published to a topic if it is marked as “retain”.</a:t>
+            </a:r>
+          </a:p>
+          <a:p>
+            <a:pPr marL="0" indent="0">
+              <a:buNone/>
+            </a:pPr>
+            <a:endParaRPr lang="en-US" dirty="0"/>
+          </a:p>
+          <a:p>
+            <a:r>
+              <a:rPr lang="en-US" dirty="0" smtClean="0"/>
+              <a:t>Retained messages are sent immediately upon </a:t>
+            </a:r>
+            <a:r>
+              <a:rPr lang="en-US" smtClean="0"/>
+              <a:t>new subscription</a:t>
+            </a:r>
+          </a:p>
+          <a:p>
+            <a:r>
+              <a:rPr lang="en-US" dirty="0" smtClean="0"/>
+              <a:t>Can be used as “seed” data for newly connected clients</a:t>
+            </a:r>
+          </a:p>
+          <a:p>
+            <a:endParaRPr lang="en-US" dirty="0"/>
+          </a:p>
+        </p:txBody>
+      </p:sp>
+    </p:spTree>
+    <p:extLst>
+      <p:ext uri="{BB962C8B-B14F-4D97-AF65-F5344CB8AC3E}">
+        <p14:creationId xmlns:p14="http://schemas.microsoft.com/office/powerpoint/2010/main" val="1177433142"/>
+      </p:ext>
+    </p:extLst>
+  </p:cSld>
+  <p:clrMapOvr>
+    <a:masterClrMapping/>
+  </p:clrMapOvr>
+  <p:timing>
+    <p:tnLst>
+      <p:par>
+        <p:cTn xmlns:p14="http://schemas.microsoft.com/office/powerpoint/2010/main" id="1" dur="indefinite" restart="never" nodeType="tmRoot"/>
+      </p:par>
+    </p:tnLst>
+  </p:timing>
+</p:sld>
+</file>
+
+<file path=ppt/slides/slide32.xml><?xml version="1.0" encoding="utf-8"?>
+<p:sld xmlns:a="http://schemas.openxmlformats.org/drawingml/2006/main" xmlns:r="http://schemas.openxmlformats.org/officeDocument/2006/relationships" xmlns:p="http://schemas.openxmlformats.org/presentationml/2006/main">
+  <p:cSld>
+    <p:spTree>
+      <p:nvGrpSpPr>
+        <p:cNvPr id="1" name=""/>
+        <p:cNvGrpSpPr/>
+        <p:nvPr/>
+      </p:nvGrpSpPr>
+      <p:grpSpPr>
+        <a:xfrm>
+          <a:off x="0" y="0"/>
+          <a:ext cx="0" cy="0"/>
+          <a:chOff x="0" y="0"/>
+          <a:chExt cx="0" cy="0"/>
+        </a:xfrm>
+      </p:grpSpPr>
+      <p:sp>
+        <p:nvSpPr>
+          <p:cNvPr id="2" name="Title 1"/>
+          <p:cNvSpPr>
+            <a:spLocks noGrp="1"/>
+          </p:cNvSpPr>
+          <p:nvPr>
+            <p:ph type="title"/>
+          </p:nvPr>
+        </p:nvSpPr>
+        <p:spPr/>
+        <p:txBody>
+          <a:bodyPr/>
+          <a:lstStyle/>
+          <a:p>
+            <a:r>
               <a:rPr lang="en-US" dirty="0"/>
               <a:t>Quality of Service (</a:t>
             </a:r>
@@ -10209,7 +10556,7 @@
           <p:cNvPr id="2050" name="Picture 2" descr="publish_qos2_flow">
             <a:extLst>
               <a:ext uri="{FF2B5EF4-FFF2-40B4-BE49-F238E27FC236}">
-                <a16:creationId xmlns:a16="http://schemas.microsoft.com/office/drawing/2014/main" id="{35F49B62-7E2A-4F47-8762-54229D523E9E}"/>
+                <a16:creationId xmlns:a16="http://schemas.microsoft.com/office/drawing/2014/main" xmlns="" id="{35F49B62-7E2A-4F47-8762-54229D523E9E}"/>
               </a:ext>
             </a:extLst>
           </p:cNvPr>
@@ -10241,7 +10588,7 @@
           </a:prstGeom>
           <a:noFill/>
           <a:extLst>
-            <a:ext uri="{909E8E84-426E-40DD-AFC4-6F175D3DCCD1}">
+            <a:ext uri="{909E8E84-426E-40dd-AFC4-6F175D3DCCD1}">
               <a14:hiddenFill xmlns:a14="http://schemas.microsoft.com/office/drawing/2010/main">
                 <a:solidFill>
                   <a:srgbClr val="FFFFFF"/>
@@ -10256,7 +10603,7 @@
           <p:cNvPr id="7" name="TextBox 6">
             <a:extLst>
               <a:ext uri="{FF2B5EF4-FFF2-40B4-BE49-F238E27FC236}">
-                <a16:creationId xmlns:a16="http://schemas.microsoft.com/office/drawing/2014/main" id="{552D4E6B-36FD-4449-BA42-E1DC215A9A1B}"/>
+                <a16:creationId xmlns:a16="http://schemas.microsoft.com/office/drawing/2014/main" xmlns="" id="{552D4E6B-36FD-4449-BA42-E1DC215A9A1B}"/>
               </a:ext>
             </a:extLst>
           </p:cNvPr>
@@ -10302,87 +10649,13 @@
   <p:clrMapOvr>
     <a:masterClrMapping/>
   </p:clrMapOvr>
-</p:sld>
-</file>
-
-<file path=ppt/slides/slide32.xml><?xml version="1.0" encoding="utf-8"?>
-<p:sld xmlns:a="http://schemas.openxmlformats.org/drawingml/2006/main" xmlns:r="http://schemas.openxmlformats.org/officeDocument/2006/relationships" xmlns:p="http://schemas.openxmlformats.org/presentationml/2006/main">
-  <p:cSld>
-    <p:spTree>
-      <p:nvGrpSpPr>
-        <p:cNvPr id="1" name=""/>
-        <p:cNvGrpSpPr/>
-        <p:nvPr/>
-      </p:nvGrpSpPr>
-      <p:grpSpPr>
-        <a:xfrm>
-          <a:off x="0" y="0"/>
-          <a:ext cx="0" cy="0"/>
-          <a:chOff x="0" y="0"/>
-          <a:chExt cx="0" cy="0"/>
-        </a:xfrm>
-      </p:grpSpPr>
-      <p:sp>
-        <p:nvSpPr>
-          <p:cNvPr id="2" name="Title 1"/>
-          <p:cNvSpPr>
-            <a:spLocks noGrp="1"/>
-          </p:cNvSpPr>
-          <p:nvPr>
-            <p:ph type="title"/>
-          </p:nvPr>
-        </p:nvSpPr>
-        <p:spPr/>
-        <p:txBody>
-          <a:bodyPr/>
-          <a:lstStyle/>
-          <a:p>
-            <a:r>
-              <a:rPr lang="en-US" dirty="0"/>
-              <a:t>SUBSCRIBE</a:t>
-            </a:r>
-          </a:p>
-        </p:txBody>
-      </p:sp>
-      <p:sp>
-        <p:nvSpPr>
-          <p:cNvPr id="3" name="Content Placeholder 2"/>
-          <p:cNvSpPr>
-            <a:spLocks noGrp="1"/>
-          </p:cNvSpPr>
-          <p:nvPr>
-            <p:ph idx="1"/>
-          </p:nvPr>
-        </p:nvSpPr>
-        <p:spPr/>
-        <p:txBody>
-          <a:bodyPr/>
-          <a:lstStyle/>
-          <a:p>
-            <a:r>
-              <a:rPr lang="en-US" dirty="0" err="1"/>
-              <a:t>QoS</a:t>
-            </a:r>
-            <a:endParaRPr lang="en-US" dirty="0"/>
-          </a:p>
-          <a:p>
-            <a:r>
-              <a:rPr lang="en-US" dirty="0"/>
-              <a:t>Topic(s) to subscribe to</a:t>
-            </a:r>
-          </a:p>
-        </p:txBody>
-      </p:sp>
-    </p:spTree>
-    <p:extLst>
-      <p:ext uri="{BB962C8B-B14F-4D97-AF65-F5344CB8AC3E}">
-        <p14:creationId xmlns:p14="http://schemas.microsoft.com/office/powerpoint/2010/main" val="1404300477"/>
-      </p:ext>
-    </p:extLst>
-  </p:cSld>
-  <p:clrMapOvr>
-    <a:masterClrMapping/>
-  </p:clrMapOvr>
+  <p:timing>
+    <p:tnLst>
+      <p:par>
+        <p:cTn xmlns:p14="http://schemas.microsoft.com/office/powerpoint/2010/main" id="1" dur="indefinite" restart="never" nodeType="tmRoot"/>
+      </p:par>
+    </p:tnLst>
+  </p:timing>
 </p:sld>
 </file>
 
@@ -10420,7 +10693,7 @@
           <a:p>
             <a:r>
               <a:rPr lang="en-US" dirty="0"/>
-              <a:t>Wildcard Characters	</a:t>
+              <a:t>SUBSCRIBE</a:t>
             </a:r>
           </a:p>
         </p:txBody>
@@ -10437,248 +10710,40 @@
         </p:nvSpPr>
         <p:spPr/>
         <p:txBody>
-          <a:bodyPr>
-            <a:normAutofit fontScale="77500" lnSpcReduction="20000"/>
-          </a:bodyPr>
+          <a:bodyPr/>
           <a:lstStyle/>
           <a:p>
-            <a:pPr marL="0" indent="0">
-              <a:buNone/>
-            </a:pPr>
-            <a:r>
-              <a:rPr lang="en-US" dirty="0"/>
-              <a:t>Wildcards for subscriptions: </a:t>
-            </a:r>
-            <a:r>
-              <a:rPr lang="en-US" b="1" dirty="0"/>
-              <a:t>#</a:t>
-            </a:r>
-            <a:r>
-              <a:rPr lang="en-US" dirty="0"/>
-              <a:t> and </a:t>
-            </a:r>
-            <a:r>
-              <a:rPr lang="en-US" b="1" dirty="0"/>
-              <a:t>+</a:t>
-            </a:r>
-            <a:br>
-              <a:rPr lang="en-US" dirty="0"/>
-            </a:br>
+            <a:r>
+              <a:rPr lang="en-US" dirty="0" err="1"/>
+              <a:t>QoS</a:t>
+            </a:r>
             <a:endParaRPr lang="en-US" dirty="0"/>
           </a:p>
           <a:p>
             <a:r>
               <a:rPr lang="en-US" dirty="0"/>
-              <a:t>Example: </a:t>
-            </a:r>
-            <a:r>
-              <a:rPr lang="en-US" dirty="0">
-                <a:latin typeface="Consolas" panose="020B0609020204030204" pitchFamily="49" charset="0"/>
-              </a:rPr>
-              <a:t>pipeline/3/pump/</a:t>
-            </a:r>
-            <a:r>
-              <a:rPr lang="en-US" b="1" dirty="0">
-                <a:solidFill>
-                  <a:srgbClr val="FF0000"/>
-                </a:solidFill>
-                <a:latin typeface="Consolas" panose="020B0609020204030204" pitchFamily="49" charset="0"/>
-              </a:rPr>
-              <a:t>+</a:t>
-            </a:r>
-            <a:r>
-              <a:rPr lang="en-US" dirty="0">
-                <a:latin typeface="Consolas" panose="020B0609020204030204" pitchFamily="49" charset="0"/>
-              </a:rPr>
-              <a:t>/temperature</a:t>
-            </a:r>
-            <a:br>
-              <a:rPr lang="en-US" dirty="0"/>
-            </a:br>
-            <a:br>
-              <a:rPr lang="en-US" sz="3100" dirty="0"/>
-            </a:br>
-            <a:r>
-              <a:rPr lang="en-US" sz="3600" dirty="0">
-                <a:latin typeface="Consolas" panose="020B0609020204030204" pitchFamily="49" charset="0"/>
-              </a:rPr>
-              <a:t>pipeline/3/pump/</a:t>
-            </a:r>
-            <a:r>
-              <a:rPr lang="en-US" sz="3600" dirty="0">
-                <a:solidFill>
-                  <a:srgbClr val="FF0000"/>
-                </a:solidFill>
-                <a:latin typeface="Consolas" panose="020B0609020204030204" pitchFamily="49" charset="0"/>
-              </a:rPr>
-              <a:t>1239</a:t>
-            </a:r>
-            <a:r>
-              <a:rPr lang="en-US" sz="3600" dirty="0">
-                <a:latin typeface="Consolas" panose="020B0609020204030204" pitchFamily="49" charset="0"/>
-              </a:rPr>
-              <a:t>/temperature</a:t>
-            </a:r>
-            <a:br>
-              <a:rPr lang="en-US" sz="3600" dirty="0">
-                <a:latin typeface="Consolas" panose="020B0609020204030204" pitchFamily="49" charset="0"/>
-              </a:rPr>
-            </a:br>
-            <a:r>
-              <a:rPr lang="en-US" sz="3600" dirty="0">
-                <a:latin typeface="Consolas" panose="020B0609020204030204" pitchFamily="49" charset="0"/>
-              </a:rPr>
-              <a:t>pipeline/3/pump/</a:t>
-            </a:r>
-            <a:r>
-              <a:rPr lang="en-US" sz="3600" dirty="0">
-                <a:solidFill>
-                  <a:srgbClr val="FF0000"/>
-                </a:solidFill>
-                <a:latin typeface="Consolas" panose="020B0609020204030204" pitchFamily="49" charset="0"/>
-              </a:rPr>
-              <a:t>4445</a:t>
-            </a:r>
-            <a:r>
-              <a:rPr lang="en-US" sz="3600" dirty="0">
-                <a:latin typeface="Consolas" panose="020B0609020204030204" pitchFamily="49" charset="0"/>
-              </a:rPr>
-              <a:t>/temperature</a:t>
-            </a:r>
-            <a:br>
-              <a:rPr lang="en-US" sz="3600" dirty="0">
-                <a:latin typeface="Consolas" panose="020B0609020204030204" pitchFamily="49" charset="0"/>
-              </a:rPr>
-            </a:br>
-            <a:r>
-              <a:rPr lang="en-US" sz="3600" dirty="0">
-                <a:latin typeface="Consolas" panose="020B0609020204030204" pitchFamily="49" charset="0"/>
-              </a:rPr>
-              <a:t>pipeline/3/pump/</a:t>
-            </a:r>
-            <a:r>
-              <a:rPr lang="en-US" sz="3600" dirty="0">
-                <a:solidFill>
-                  <a:srgbClr val="FF0000"/>
-                </a:solidFill>
-                <a:latin typeface="Consolas" panose="020B0609020204030204" pitchFamily="49" charset="0"/>
-              </a:rPr>
-              <a:t>3224</a:t>
-            </a:r>
-            <a:r>
-              <a:rPr lang="en-US" sz="3600" dirty="0">
-                <a:latin typeface="Consolas" panose="020B0609020204030204" pitchFamily="49" charset="0"/>
-              </a:rPr>
-              <a:t>/temperature</a:t>
-            </a:r>
-          </a:p>
-          <a:p>
-            <a:pPr marL="0" indent="0">
-              <a:buNone/>
-            </a:pPr>
-            <a:endParaRPr lang="en-US" dirty="0"/>
-          </a:p>
-          <a:p>
-            <a:r>
-              <a:rPr lang="en-US" dirty="0"/>
-              <a:t>Example: </a:t>
-            </a:r>
-            <a:r>
-              <a:rPr lang="en-US" dirty="0">
-                <a:latin typeface="Consolas" panose="020B0609020204030204" pitchFamily="49" charset="0"/>
-              </a:rPr>
-              <a:t>pipeline/3/</a:t>
-            </a:r>
-            <a:r>
-              <a:rPr lang="en-US" b="1" dirty="0">
-                <a:solidFill>
-                  <a:srgbClr val="FF0000"/>
-                </a:solidFill>
-                <a:latin typeface="Consolas" panose="020B0609020204030204" pitchFamily="49" charset="0"/>
-              </a:rPr>
-              <a:t>#</a:t>
-            </a:r>
-            <a:br>
-              <a:rPr lang="en-US" dirty="0"/>
-            </a:br>
-            <a:br>
-              <a:rPr lang="en-US" dirty="0"/>
-            </a:br>
-            <a:r>
-              <a:rPr lang="en-US" sz="3800" dirty="0">
-                <a:latin typeface="Consolas" panose="020B0609020204030204" pitchFamily="49" charset="0"/>
-              </a:rPr>
-              <a:t>pipeline/3/</a:t>
-            </a:r>
-            <a:r>
-              <a:rPr lang="en-US" sz="3800" dirty="0">
-                <a:solidFill>
-                  <a:srgbClr val="FF0000"/>
-                </a:solidFill>
-                <a:latin typeface="Consolas" panose="020B0609020204030204" pitchFamily="49" charset="0"/>
-              </a:rPr>
-              <a:t>pump/1239/temperature</a:t>
-            </a:r>
-            <a:br>
-              <a:rPr lang="en-US" sz="3800" dirty="0">
-                <a:solidFill>
-                  <a:srgbClr val="FF0000"/>
-                </a:solidFill>
-                <a:latin typeface="Consolas" panose="020B0609020204030204" pitchFamily="49" charset="0"/>
-              </a:rPr>
-            </a:br>
-            <a:r>
-              <a:rPr lang="en-US" sz="3800" dirty="0">
-                <a:latin typeface="Consolas" panose="020B0609020204030204" pitchFamily="49" charset="0"/>
-              </a:rPr>
-              <a:t>pipeline/3/</a:t>
-            </a:r>
-            <a:r>
-              <a:rPr lang="en-US" sz="3800" dirty="0">
-                <a:solidFill>
-                  <a:srgbClr val="FF0000"/>
-                </a:solidFill>
-                <a:latin typeface="Consolas" panose="020B0609020204030204" pitchFamily="49" charset="0"/>
-              </a:rPr>
-              <a:t>pump/1239/pressure</a:t>
-            </a:r>
-            <a:br>
-              <a:rPr lang="en-US" sz="3800" dirty="0">
-                <a:latin typeface="Consolas" panose="020B0609020204030204" pitchFamily="49" charset="0"/>
-              </a:rPr>
-            </a:br>
-            <a:r>
-              <a:rPr lang="en-US" sz="3800" dirty="0">
-                <a:latin typeface="Consolas" panose="020B0609020204030204" pitchFamily="49" charset="0"/>
-              </a:rPr>
-              <a:t>pipeline/3/</a:t>
-            </a:r>
-            <a:r>
-              <a:rPr lang="en-US" sz="3800" dirty="0">
-                <a:solidFill>
-                  <a:srgbClr val="FF0000"/>
-                </a:solidFill>
-                <a:latin typeface="Consolas" panose="020B0609020204030204" pitchFamily="49" charset="0"/>
-              </a:rPr>
-              <a:t>valve/1239/state</a:t>
-            </a:r>
-            <a:br>
-              <a:rPr lang="en-US" dirty="0"/>
-            </a:br>
-            <a:endParaRPr lang="en-US" dirty="0"/>
+              <a:t>Topic(s) to subscribe to</a:t>
+            </a:r>
           </a:p>
         </p:txBody>
       </p:sp>
     </p:spTree>
     <p:extLst>
       <p:ext uri="{BB962C8B-B14F-4D97-AF65-F5344CB8AC3E}">
-        <p14:creationId xmlns:p14="http://schemas.microsoft.com/office/powerpoint/2010/main" val="1773459131"/>
+        <p14:creationId xmlns:p14="http://schemas.microsoft.com/office/powerpoint/2010/main" val="1404300477"/>
       </p:ext>
     </p:extLst>
   </p:cSld>
   <p:clrMapOvr>
     <a:masterClrMapping/>
   </p:clrMapOvr>
+  <p:timing>
+    <p:tnLst>
+      <p:par>
+        <p:cTn xmlns:p14="http://schemas.microsoft.com/office/powerpoint/2010/main" id="1" dur="indefinite" restart="never" nodeType="tmRoot"/>
+      </p:par>
+    </p:tnLst>
+  </p:timing>
 </p:sld>
 </file>
 
@@ -10716,7 +10781,7 @@
           <a:p>
             <a:r>
               <a:rPr lang="en-US" dirty="0"/>
-              <a:t>Persistent Connection</a:t>
+              <a:t>Wildcard Characters	</a:t>
             </a:r>
           </a:p>
         </p:txBody>
@@ -10733,7 +10798,9 @@
         </p:nvSpPr>
         <p:spPr/>
         <p:txBody>
-          <a:bodyPr/>
+          <a:bodyPr>
+            <a:normAutofit fontScale="77500" lnSpcReduction="20000"/>
+          </a:bodyPr>
           <a:lstStyle/>
           <a:p>
             <a:pPr marL="0" indent="0">
@@ -10741,7 +10808,23 @@
             </a:pPr>
             <a:r>
               <a:rPr lang="en-US" dirty="0"/>
-              <a:t>When Clean Session Flag = False during CONNECT:</a:t>
+              <a:t>Wildcards for subscriptions: </a:t>
+            </a:r>
+            <a:r>
+              <a:rPr lang="en-US" b="1" dirty="0"/>
+              <a:t>#</a:t>
+            </a:r>
+            <a:r>
+              <a:rPr lang="en-US" dirty="0"/>
+              <a:t> and </a:t>
+            </a:r>
+            <a:r>
+              <a:rPr lang="en-US" b="1" dirty="0"/>
+              <a:t>+</a:t>
+            </a:r>
+            <a:r>
+              <a:rPr lang="en-US" dirty="0"/>
+              <a:t/>
             </a:r>
             <a:br>
               <a:rPr lang="en-US" dirty="0"/>
@@ -10749,101 +10832,251 @@
             <a:endParaRPr lang="en-US" dirty="0"/>
           </a:p>
           <a:p>
-            <a:pPr lvl="1"/>
-            <a:r>
-              <a:rPr lang="en-US" dirty="0"/>
-              <a:t>All subscriptions are maintained while offline</a:t>
-            </a:r>
-          </a:p>
-          <a:p>
-            <a:pPr lvl="1"/>
-            <a:r>
-              <a:rPr lang="en-US" dirty="0"/>
-              <a:t>All </a:t>
-            </a:r>
-            <a:r>
-              <a:rPr lang="en-US" dirty="0" err="1"/>
-              <a:t>QoS</a:t>
-            </a:r>
-            <a:r>
-              <a:rPr lang="en-US" dirty="0"/>
-              <a:t> 1 &amp; 2 messages not confirmed by client will finish up upon reconnect</a:t>
-            </a:r>
-          </a:p>
-          <a:p>
-            <a:pPr lvl="1"/>
-            <a:r>
-              <a:rPr lang="en-US" dirty="0"/>
-              <a:t>All new </a:t>
-            </a:r>
-            <a:r>
-              <a:rPr lang="en-US" dirty="0" err="1"/>
-              <a:t>QoS</a:t>
-            </a:r>
-            <a:r>
-              <a:rPr lang="en-US" dirty="0"/>
-              <a:t> 1 &amp; 2 sent while offline will be saved and sent upon reconnect</a:t>
-            </a:r>
-          </a:p>
-          <a:p>
-            <a:endParaRPr lang="en-US" dirty="0"/>
-          </a:p>
-          <a:p>
-            <a:endParaRPr lang="en-US" dirty="0"/>
-          </a:p>
-          <a:p>
-            <a:endParaRPr lang="en-US" dirty="0"/>
+            <a:r>
+              <a:rPr lang="en-US" dirty="0"/>
+              <a:t>Example: </a:t>
+            </a:r>
+            <a:r>
+              <a:rPr lang="en-US" dirty="0">
+                <a:latin typeface="Consolas" panose="020B0609020204030204" pitchFamily="49" charset="0"/>
+              </a:rPr>
+              <a:t>pipeline/3/pump/</a:t>
+            </a:r>
+            <a:r>
+              <a:rPr lang="en-US" b="1" dirty="0">
+                <a:solidFill>
+                  <a:srgbClr val="FF0000"/>
+                </a:solidFill>
+                <a:latin typeface="Consolas" panose="020B0609020204030204" pitchFamily="49" charset="0"/>
+              </a:rPr>
+              <a:t>+</a:t>
+            </a:r>
+            <a:r>
+              <a:rPr lang="en-US" dirty="0">
+                <a:latin typeface="Consolas" panose="020B0609020204030204" pitchFamily="49" charset="0"/>
+              </a:rPr>
+              <a:t>/temperature</a:t>
+            </a:r>
+            <a:r>
+              <a:rPr lang="en-US" dirty="0"/>
+              <a:t/>
+            </a:r>
+            <a:br>
+              <a:rPr lang="en-US" dirty="0"/>
+            </a:br>
+            <a:r>
+              <a:rPr lang="en-US" sz="3100" dirty="0"/>
+              <a:t/>
+            </a:r>
+            <a:br>
+              <a:rPr lang="en-US" sz="3100" dirty="0"/>
+            </a:br>
+            <a:r>
+              <a:rPr lang="en-US" sz="3600" dirty="0">
+                <a:latin typeface="Consolas" panose="020B0609020204030204" pitchFamily="49" charset="0"/>
+              </a:rPr>
+              <a:t>pipeline/3/pump/</a:t>
+            </a:r>
+            <a:r>
+              <a:rPr lang="en-US" sz="3600" dirty="0">
+                <a:solidFill>
+                  <a:srgbClr val="FF0000"/>
+                </a:solidFill>
+                <a:latin typeface="Consolas" panose="020B0609020204030204" pitchFamily="49" charset="0"/>
+              </a:rPr>
+              <a:t>1239</a:t>
+            </a:r>
+            <a:r>
+              <a:rPr lang="en-US" sz="3600" dirty="0">
+                <a:latin typeface="Consolas" panose="020B0609020204030204" pitchFamily="49" charset="0"/>
+              </a:rPr>
+              <a:t>/temperature</a:t>
+            </a:r>
+            <a:br>
+              <a:rPr lang="en-US" sz="3600" dirty="0">
+                <a:latin typeface="Consolas" panose="020B0609020204030204" pitchFamily="49" charset="0"/>
+              </a:rPr>
+            </a:br>
+            <a:r>
+              <a:rPr lang="en-US" sz="3600" dirty="0">
+                <a:latin typeface="Consolas" panose="020B0609020204030204" pitchFamily="49" charset="0"/>
+              </a:rPr>
+              <a:t>pipeline/3/pump/</a:t>
+            </a:r>
+            <a:r>
+              <a:rPr lang="en-US" sz="3600" dirty="0">
+                <a:solidFill>
+                  <a:srgbClr val="FF0000"/>
+                </a:solidFill>
+                <a:latin typeface="Consolas" panose="020B0609020204030204" pitchFamily="49" charset="0"/>
+              </a:rPr>
+              <a:t>4445</a:t>
+            </a:r>
+            <a:r>
+              <a:rPr lang="en-US" sz="3600" dirty="0">
+                <a:latin typeface="Consolas" panose="020B0609020204030204" pitchFamily="49" charset="0"/>
+              </a:rPr>
+              <a:t>/temperature</a:t>
+            </a:r>
+            <a:br>
+              <a:rPr lang="en-US" sz="3600" dirty="0">
+                <a:latin typeface="Consolas" panose="020B0609020204030204" pitchFamily="49" charset="0"/>
+              </a:rPr>
+            </a:br>
+            <a:r>
+              <a:rPr lang="en-US" sz="3600" dirty="0">
+                <a:latin typeface="Consolas" panose="020B0609020204030204" pitchFamily="49" charset="0"/>
+              </a:rPr>
+              <a:t>pipeline/3/pump/</a:t>
+            </a:r>
+            <a:r>
+              <a:rPr lang="en-US" sz="3600" dirty="0">
+                <a:solidFill>
+                  <a:srgbClr val="FF0000"/>
+                </a:solidFill>
+                <a:latin typeface="Consolas" panose="020B0609020204030204" pitchFamily="49" charset="0"/>
+              </a:rPr>
+              <a:t>3224</a:t>
+            </a:r>
+            <a:r>
+              <a:rPr lang="en-US" sz="3600" dirty="0">
+                <a:latin typeface="Consolas" panose="020B0609020204030204" pitchFamily="49" charset="0"/>
+              </a:rPr>
+              <a:t>/temperature</a:t>
+            </a:r>
           </a:p>
           <a:p>
             <a:pPr marL="0" indent="0">
               <a:buNone/>
             </a:pPr>
-            <a:r>
-              <a:rPr lang="en-US" sz="2400" dirty="0">
+            <a:endParaRPr lang="en-US" dirty="0"/>
+          </a:p>
+          <a:p>
+            <a:r>
+              <a:rPr lang="en-US" dirty="0"/>
+              <a:t>Example: </a:t>
+            </a:r>
+            <a:r>
+              <a:rPr lang="en-US" dirty="0">
+                <a:latin typeface="Consolas" panose="020B0609020204030204" pitchFamily="49" charset="0"/>
+              </a:rPr>
+              <a:t>pipeline/3/</a:t>
+            </a:r>
+            <a:r>
+              <a:rPr lang="en-US" b="1" dirty="0">
                 <a:solidFill>
-                  <a:schemeClr val="tx1">
-                    <a:lumMod val="75000"/>
-                    <a:lumOff val="25000"/>
-                  </a:schemeClr>
+                  <a:srgbClr val="FF0000"/>
                 </a:solidFill>
+                <a:latin typeface="Consolas" panose="020B0609020204030204" pitchFamily="49" charset="0"/>
               </a:rPr>
-              <a:t>Note: </a:t>
-            </a:r>
-            <a:r>
-              <a:rPr lang="en-US" sz="2400" dirty="0" err="1">
+              <a:t>#</a:t>
+            </a:r>
+            <a:r>
+              <a:rPr lang="en-US" dirty="0"/>
+              <a:t/>
+            </a:r>
+            <a:br>
+              <a:rPr lang="en-US" dirty="0"/>
+            </a:br>
+            <a:r>
+              <a:rPr lang="en-US" dirty="0"/>
+              <a:t/>
+            </a:r>
+            <a:br>
+              <a:rPr lang="en-US" dirty="0"/>
+            </a:br>
+            <a:r>
+              <a:rPr lang="en-US" sz="3800" dirty="0">
+                <a:latin typeface="Consolas" panose="020B0609020204030204" pitchFamily="49" charset="0"/>
+              </a:rPr>
+              <a:t>pipeline/3/</a:t>
+            </a:r>
+            <a:r>
+              <a:rPr lang="en-US" sz="3800" dirty="0">
                 <a:solidFill>
-                  <a:schemeClr val="tx1">
-                    <a:lumMod val="75000"/>
-                    <a:lumOff val="25000"/>
-                  </a:schemeClr>
+                  <a:srgbClr val="FF0000"/>
                 </a:solidFill>
+                <a:latin typeface="Consolas" panose="020B0609020204030204" pitchFamily="49" charset="0"/>
               </a:rPr>
-              <a:t>QoS</a:t>
-            </a:r>
-            <a:r>
-              <a:rPr lang="en-US" sz="2400" dirty="0">
+              <a:t>pump/1239/temperature</a:t>
+            </a:r>
+            <a:br>
+              <a:rPr lang="en-US" sz="3800" dirty="0">
                 <a:solidFill>
-                  <a:schemeClr val="tx1">
-                    <a:lumMod val="75000"/>
-                    <a:lumOff val="25000"/>
-                  </a:schemeClr>
+                  <a:srgbClr val="FF0000"/>
                 </a:solidFill>
+                <a:latin typeface="Consolas" panose="020B0609020204030204" pitchFamily="49" charset="0"/>
               </a:rPr>
-              <a:t> 0 subscription messages are not preserved while offline</a:t>
-            </a:r>
+            </a:br>
+            <a:r>
+              <a:rPr lang="en-US" sz="3800" dirty="0">
+                <a:latin typeface="Consolas" panose="020B0609020204030204" pitchFamily="49" charset="0"/>
+              </a:rPr>
+              <a:t>pipeline/3/</a:t>
+            </a:r>
+            <a:r>
+              <a:rPr lang="en-US" sz="3800" dirty="0">
+                <a:solidFill>
+                  <a:srgbClr val="FF0000"/>
+                </a:solidFill>
+                <a:latin typeface="Consolas" panose="020B0609020204030204" pitchFamily="49" charset="0"/>
+              </a:rPr>
+              <a:t>pump/1239/pressure</a:t>
+            </a:r>
+            <a:r>
+              <a:rPr lang="en-US" sz="3800" dirty="0">
+                <a:latin typeface="Consolas" panose="020B0609020204030204" pitchFamily="49" charset="0"/>
+              </a:rPr>
+              <a:t/>
+            </a:r>
+            <a:br>
+              <a:rPr lang="en-US" sz="3800" dirty="0">
+                <a:latin typeface="Consolas" panose="020B0609020204030204" pitchFamily="49" charset="0"/>
+              </a:rPr>
+            </a:br>
+            <a:r>
+              <a:rPr lang="en-US" sz="3800" dirty="0">
+                <a:latin typeface="Consolas" panose="020B0609020204030204" pitchFamily="49" charset="0"/>
+              </a:rPr>
+              <a:t>pipeline/3/</a:t>
+            </a:r>
+            <a:r>
+              <a:rPr lang="en-US" sz="3800" dirty="0">
+                <a:solidFill>
+                  <a:srgbClr val="FF0000"/>
+                </a:solidFill>
+                <a:latin typeface="Consolas" panose="020B0609020204030204" pitchFamily="49" charset="0"/>
+              </a:rPr>
+              <a:t>valve/1239/state</a:t>
+            </a:r>
+            <a:r>
+              <a:rPr lang="en-US" dirty="0"/>
+              <a:t/>
+            </a:r>
+            <a:br>
+              <a:rPr lang="en-US" dirty="0"/>
+            </a:br>
+            <a:endParaRPr lang="en-US" dirty="0"/>
           </a:p>
         </p:txBody>
       </p:sp>
     </p:spTree>
     <p:extLst>
       <p:ext uri="{BB962C8B-B14F-4D97-AF65-F5344CB8AC3E}">
-        <p14:creationId xmlns:p14="http://schemas.microsoft.com/office/powerpoint/2010/main" val="1453693589"/>
+        <p14:creationId xmlns:p14="http://schemas.microsoft.com/office/powerpoint/2010/main" val="1773459131"/>
       </p:ext>
     </p:extLst>
   </p:cSld>
   <p:clrMapOvr>
     <a:masterClrMapping/>
   </p:clrMapOvr>
+  <p:timing>
+    <p:tnLst>
+      <p:par>
+        <p:cTn xmlns:p14="http://schemas.microsoft.com/office/powerpoint/2010/main" id="1" dur="indefinite" restart="never" nodeType="tmRoot"/>
+      </p:par>
+    </p:tnLst>
+  </p:timing>
 </p:sld>
 </file>
 
@@ -10881,6 +11114,178 @@
           <a:p>
             <a:r>
               <a:rPr lang="en-US" dirty="0"/>
+              <a:t>Persistent Connection</a:t>
+            </a:r>
+          </a:p>
+        </p:txBody>
+      </p:sp>
+      <p:sp>
+        <p:nvSpPr>
+          <p:cNvPr id="3" name="Content Placeholder 2"/>
+          <p:cNvSpPr>
+            <a:spLocks noGrp="1"/>
+          </p:cNvSpPr>
+          <p:nvPr>
+            <p:ph idx="1"/>
+          </p:nvPr>
+        </p:nvSpPr>
+        <p:spPr/>
+        <p:txBody>
+          <a:bodyPr/>
+          <a:lstStyle/>
+          <a:p>
+            <a:pPr marL="0" indent="0">
+              <a:buNone/>
+            </a:pPr>
+            <a:r>
+              <a:rPr lang="en-US" dirty="0"/>
+              <a:t>When Clean Session Flag = False during CONNECT:</a:t>
+            </a:r>
+            <a:br>
+              <a:rPr lang="en-US" dirty="0"/>
+            </a:br>
+            <a:endParaRPr lang="en-US" dirty="0"/>
+          </a:p>
+          <a:p>
+            <a:pPr lvl="1"/>
+            <a:r>
+              <a:rPr lang="en-US" dirty="0"/>
+              <a:t>All subscriptions are maintained while offline</a:t>
+            </a:r>
+          </a:p>
+          <a:p>
+            <a:pPr lvl="1"/>
+            <a:r>
+              <a:rPr lang="en-US" dirty="0"/>
+              <a:t>All </a:t>
+            </a:r>
+            <a:r>
+              <a:rPr lang="en-US" dirty="0" err="1"/>
+              <a:t>QoS</a:t>
+            </a:r>
+            <a:r>
+              <a:rPr lang="en-US" dirty="0"/>
+              <a:t> 1 &amp; 2 messages not confirmed by client will finish up upon reconnect</a:t>
+            </a:r>
+          </a:p>
+          <a:p>
+            <a:pPr lvl="1"/>
+            <a:r>
+              <a:rPr lang="en-US" dirty="0"/>
+              <a:t>All new </a:t>
+            </a:r>
+            <a:r>
+              <a:rPr lang="en-US" dirty="0" err="1"/>
+              <a:t>QoS</a:t>
+            </a:r>
+            <a:r>
+              <a:rPr lang="en-US" dirty="0"/>
+              <a:t> 1 &amp; 2 sent while offline will be saved and sent upon reconnect</a:t>
+            </a:r>
+          </a:p>
+          <a:p>
+            <a:endParaRPr lang="en-US" dirty="0"/>
+          </a:p>
+          <a:p>
+            <a:endParaRPr lang="en-US" dirty="0"/>
+          </a:p>
+          <a:p>
+            <a:endParaRPr lang="en-US" dirty="0"/>
+          </a:p>
+          <a:p>
+            <a:pPr marL="0" indent="0">
+              <a:buNone/>
+            </a:pPr>
+            <a:r>
+              <a:rPr lang="en-US" sz="2400" dirty="0">
+                <a:solidFill>
+                  <a:schemeClr val="tx1">
+                    <a:lumMod val="75000"/>
+                    <a:lumOff val="25000"/>
+                  </a:schemeClr>
+                </a:solidFill>
+              </a:rPr>
+              <a:t>Note: </a:t>
+            </a:r>
+            <a:r>
+              <a:rPr lang="en-US" sz="2400" dirty="0" err="1">
+                <a:solidFill>
+                  <a:schemeClr val="tx1">
+                    <a:lumMod val="75000"/>
+                    <a:lumOff val="25000"/>
+                  </a:schemeClr>
+                </a:solidFill>
+              </a:rPr>
+              <a:t>QoS</a:t>
+            </a:r>
+            <a:r>
+              <a:rPr lang="en-US" sz="2400" dirty="0">
+                <a:solidFill>
+                  <a:schemeClr val="tx1">
+                    <a:lumMod val="75000"/>
+                    <a:lumOff val="25000"/>
+                  </a:schemeClr>
+                </a:solidFill>
+              </a:rPr>
+              <a:t> 0 subscription messages are not preserved while offline</a:t>
+            </a:r>
+          </a:p>
+        </p:txBody>
+      </p:sp>
+    </p:spTree>
+    <p:extLst>
+      <p:ext uri="{BB962C8B-B14F-4D97-AF65-F5344CB8AC3E}">
+        <p14:creationId xmlns:p14="http://schemas.microsoft.com/office/powerpoint/2010/main" val="1453693589"/>
+      </p:ext>
+    </p:extLst>
+  </p:cSld>
+  <p:clrMapOvr>
+    <a:masterClrMapping/>
+  </p:clrMapOvr>
+  <p:timing>
+    <p:tnLst>
+      <p:par>
+        <p:cTn xmlns:p14="http://schemas.microsoft.com/office/powerpoint/2010/main" id="1" dur="indefinite" restart="never" nodeType="tmRoot"/>
+      </p:par>
+    </p:tnLst>
+  </p:timing>
+</p:sld>
+</file>
+
+<file path=ppt/slides/slide36.xml><?xml version="1.0" encoding="utf-8"?>
+<p:sld xmlns:a="http://schemas.openxmlformats.org/drawingml/2006/main" xmlns:r="http://schemas.openxmlformats.org/officeDocument/2006/relationships" xmlns:p="http://schemas.openxmlformats.org/presentationml/2006/main">
+  <p:cSld>
+    <p:spTree>
+      <p:nvGrpSpPr>
+        <p:cNvPr id="1" name=""/>
+        <p:cNvGrpSpPr/>
+        <p:nvPr/>
+      </p:nvGrpSpPr>
+      <p:grpSpPr>
+        <a:xfrm>
+          <a:off x="0" y="0"/>
+          <a:ext cx="0" cy="0"/>
+          <a:chOff x="0" y="0"/>
+          <a:chExt cx="0" cy="0"/>
+        </a:xfrm>
+      </p:grpSpPr>
+      <p:sp>
+        <p:nvSpPr>
+          <p:cNvPr id="2" name="Title 1"/>
+          <p:cNvSpPr>
+            <a:spLocks noGrp="1"/>
+          </p:cNvSpPr>
+          <p:nvPr>
+            <p:ph type="title"/>
+          </p:nvPr>
+        </p:nvSpPr>
+        <p:spPr/>
+        <p:txBody>
+          <a:bodyPr/>
+          <a:lstStyle/>
+          <a:p>
+            <a:r>
+              <a:rPr lang="en-US" dirty="0"/>
               <a:t>Publisher/Subscriber Decoupling</a:t>
             </a:r>
           </a:p>
@@ -10891,7 +11296,7 @@
           <p:cNvPr id="4" name="Rectangle: Rounded Corners 3">
             <a:extLst>
               <a:ext uri="{FF2B5EF4-FFF2-40B4-BE49-F238E27FC236}">
-                <a16:creationId xmlns:a16="http://schemas.microsoft.com/office/drawing/2014/main" id="{DD93AAC4-4D83-4500-AF84-09AE2CA03C4E}"/>
+                <a16:creationId xmlns:a16="http://schemas.microsoft.com/office/drawing/2014/main" xmlns="" id="{DD93AAC4-4D83-4500-AF84-09AE2CA03C4E}"/>
               </a:ext>
             </a:extLst>
           </p:cNvPr>
@@ -10940,7 +11345,7 @@
           <p:cNvPr id="5" name="Rectangle: Rounded Corners 4">
             <a:extLst>
               <a:ext uri="{FF2B5EF4-FFF2-40B4-BE49-F238E27FC236}">
-                <a16:creationId xmlns:a16="http://schemas.microsoft.com/office/drawing/2014/main" id="{1ED6DF0E-A56F-42AF-80E4-0D35592053B4}"/>
+                <a16:creationId xmlns:a16="http://schemas.microsoft.com/office/drawing/2014/main" xmlns="" id="{1ED6DF0E-A56F-42AF-80E4-0D35592053B4}"/>
               </a:ext>
             </a:extLst>
           </p:cNvPr>
@@ -10989,7 +11394,7 @@
           <p:cNvPr id="6" name="Rectangle: Rounded Corners 5">
             <a:extLst>
               <a:ext uri="{FF2B5EF4-FFF2-40B4-BE49-F238E27FC236}">
-                <a16:creationId xmlns:a16="http://schemas.microsoft.com/office/drawing/2014/main" id="{286FCBF6-1300-418C-9F0F-873AC183BAD5}"/>
+                <a16:creationId xmlns:a16="http://schemas.microsoft.com/office/drawing/2014/main" xmlns="" id="{286FCBF6-1300-418C-9F0F-873AC183BAD5}"/>
               </a:ext>
             </a:extLst>
           </p:cNvPr>
@@ -11038,7 +11443,7 @@
           <p:cNvPr id="7" name="Rectangle: Rounded Corners 6">
             <a:extLst>
               <a:ext uri="{FF2B5EF4-FFF2-40B4-BE49-F238E27FC236}">
-                <a16:creationId xmlns:a16="http://schemas.microsoft.com/office/drawing/2014/main" id="{5DE898A0-0F78-4256-B9C1-071661BE1BC4}"/>
+                <a16:creationId xmlns:a16="http://schemas.microsoft.com/office/drawing/2014/main" xmlns="" id="{5DE898A0-0F78-4256-B9C1-071661BE1BC4}"/>
               </a:ext>
             </a:extLst>
           </p:cNvPr>
@@ -11087,7 +11492,7 @@
           <p:cNvPr id="8" name="Straight Arrow Connector 7">
             <a:extLst>
               <a:ext uri="{FF2B5EF4-FFF2-40B4-BE49-F238E27FC236}">
-                <a16:creationId xmlns:a16="http://schemas.microsoft.com/office/drawing/2014/main" id="{243CF50F-F807-4AFE-B8F9-1A95FCEBF68C}"/>
+                <a16:creationId xmlns:a16="http://schemas.microsoft.com/office/drawing/2014/main" xmlns="" id="{243CF50F-F807-4AFE-B8F9-1A95FCEBF68C}"/>
               </a:ext>
             </a:extLst>
           </p:cNvPr>
@@ -11129,7 +11534,7 @@
           <p:cNvPr id="9" name="Straight Arrow Connector 8">
             <a:extLst>
               <a:ext uri="{FF2B5EF4-FFF2-40B4-BE49-F238E27FC236}">
-                <a16:creationId xmlns:a16="http://schemas.microsoft.com/office/drawing/2014/main" id="{75113D3C-5652-4C7B-BDCC-54FEB415A228}"/>
+                <a16:creationId xmlns:a16="http://schemas.microsoft.com/office/drawing/2014/main" xmlns="" id="{75113D3C-5652-4C7B-BDCC-54FEB415A228}"/>
               </a:ext>
             </a:extLst>
           </p:cNvPr>
@@ -11172,7 +11577,7 @@
           <p:cNvPr id="10" name="Straight Arrow Connector 9">
             <a:extLst>
               <a:ext uri="{FF2B5EF4-FFF2-40B4-BE49-F238E27FC236}">
-                <a16:creationId xmlns:a16="http://schemas.microsoft.com/office/drawing/2014/main" id="{20F144C7-3BE9-40BB-BB33-37BA3FA7F108}"/>
+                <a16:creationId xmlns:a16="http://schemas.microsoft.com/office/drawing/2014/main" xmlns="" id="{20F144C7-3BE9-40BB-BB33-37BA3FA7F108}"/>
               </a:ext>
             </a:extLst>
           </p:cNvPr>
@@ -11215,7 +11620,7 @@
           <p:cNvPr id="11" name="Straight Arrow Connector 10">
             <a:extLst>
               <a:ext uri="{FF2B5EF4-FFF2-40B4-BE49-F238E27FC236}">
-                <a16:creationId xmlns:a16="http://schemas.microsoft.com/office/drawing/2014/main" id="{C366545C-1322-4BB1-956D-44FAFD94DBC2}"/>
+                <a16:creationId xmlns:a16="http://schemas.microsoft.com/office/drawing/2014/main" xmlns="" id="{C366545C-1322-4BB1-956D-44FAFD94DBC2}"/>
               </a:ext>
             </a:extLst>
           </p:cNvPr>
@@ -11258,7 +11663,7 @@
           <p:cNvPr id="12" name="Cube 11">
             <a:extLst>
               <a:ext uri="{FF2B5EF4-FFF2-40B4-BE49-F238E27FC236}">
-                <a16:creationId xmlns:a16="http://schemas.microsoft.com/office/drawing/2014/main" id="{5B03EE1C-30CA-44E1-89F4-F08280C69856}"/>
+                <a16:creationId xmlns:a16="http://schemas.microsoft.com/office/drawing/2014/main" xmlns="" id="{5B03EE1C-30CA-44E1-89F4-F08280C69856}"/>
               </a:ext>
             </a:extLst>
           </p:cNvPr>
@@ -11313,7 +11718,7 @@
           <p:cNvPr id="13" name="TextBox 12">
             <a:extLst>
               <a:ext uri="{FF2B5EF4-FFF2-40B4-BE49-F238E27FC236}">
-                <a16:creationId xmlns:a16="http://schemas.microsoft.com/office/drawing/2014/main" id="{69EE6EB3-EAAF-47A0-9CC7-601C1BA7ABBA}"/>
+                <a16:creationId xmlns:a16="http://schemas.microsoft.com/office/drawing/2014/main" xmlns="" id="{69EE6EB3-EAAF-47A0-9CC7-601C1BA7ABBA}"/>
               </a:ext>
             </a:extLst>
           </p:cNvPr>
@@ -11343,6 +11748,10 @@
             <a:br>
               <a:rPr lang="en-US" dirty="0"/>
             </a:br>
+            <a:r>
+              <a:rPr lang="en-US" dirty="0"/>
+              <a:t/>
+            </a:r>
             <a:br>
               <a:rPr lang="en-US" dirty="0"/>
             </a:br>
@@ -11362,7 +11771,7 @@
           <p:cNvPr id="14" name="TextBox 13">
             <a:extLst>
               <a:ext uri="{FF2B5EF4-FFF2-40B4-BE49-F238E27FC236}">
-                <a16:creationId xmlns:a16="http://schemas.microsoft.com/office/drawing/2014/main" id="{BC21CB5D-00CC-488C-8EC8-102D6D4ABCEB}"/>
+                <a16:creationId xmlns:a16="http://schemas.microsoft.com/office/drawing/2014/main" xmlns="" id="{BC21CB5D-00CC-488C-8EC8-102D6D4ABCEB}"/>
               </a:ext>
             </a:extLst>
           </p:cNvPr>
@@ -11405,7 +11814,7 @@
           <p:cNvPr id="15" name="TextBox 14">
             <a:extLst>
               <a:ext uri="{FF2B5EF4-FFF2-40B4-BE49-F238E27FC236}">
-                <a16:creationId xmlns:a16="http://schemas.microsoft.com/office/drawing/2014/main" id="{96852E4A-E2DA-4CF1-98BF-D56727084A73}"/>
+                <a16:creationId xmlns:a16="http://schemas.microsoft.com/office/drawing/2014/main" xmlns="" id="{96852E4A-E2DA-4CF1-98BF-D56727084A73}"/>
               </a:ext>
             </a:extLst>
           </p:cNvPr>
@@ -11440,7 +11849,7 @@
           <p:cNvPr id="16" name="TextBox 15">
             <a:extLst>
               <a:ext uri="{FF2B5EF4-FFF2-40B4-BE49-F238E27FC236}">
-                <a16:creationId xmlns:a16="http://schemas.microsoft.com/office/drawing/2014/main" id="{3E33DBE2-B8A5-47C5-9D6B-E705ED05C7F5}"/>
+                <a16:creationId xmlns:a16="http://schemas.microsoft.com/office/drawing/2014/main" xmlns="" id="{3E33DBE2-B8A5-47C5-9D6B-E705ED05C7F5}"/>
               </a:ext>
             </a:extLst>
           </p:cNvPr>
@@ -11483,7 +11892,7 @@
           <p:cNvPr id="17" name="TextBox 16">
             <a:extLst>
               <a:ext uri="{FF2B5EF4-FFF2-40B4-BE49-F238E27FC236}">
-                <a16:creationId xmlns:a16="http://schemas.microsoft.com/office/drawing/2014/main" id="{FBE3228F-53B0-4156-AEBE-B01778AAE522}"/>
+                <a16:creationId xmlns:a16="http://schemas.microsoft.com/office/drawing/2014/main" xmlns="" id="{FBE3228F-53B0-4156-AEBE-B01778AAE522}"/>
               </a:ext>
             </a:extLst>
           </p:cNvPr>
@@ -11524,7 +11933,7 @@
           <p:cNvPr id="18" name="TextBox 17">
             <a:extLst>
               <a:ext uri="{FF2B5EF4-FFF2-40B4-BE49-F238E27FC236}">
-                <a16:creationId xmlns:a16="http://schemas.microsoft.com/office/drawing/2014/main" id="{7BEDFF3C-C39E-42C5-8B67-B07D58797CC3}"/>
+                <a16:creationId xmlns:a16="http://schemas.microsoft.com/office/drawing/2014/main" xmlns="" id="{7BEDFF3C-C39E-42C5-8B67-B07D58797CC3}"/>
               </a:ext>
             </a:extLst>
           </p:cNvPr>
@@ -11572,7 +11981,7 @@
           <p:cNvPr id="19" name="TextBox 18">
             <a:extLst>
               <a:ext uri="{FF2B5EF4-FFF2-40B4-BE49-F238E27FC236}">
-                <a16:creationId xmlns:a16="http://schemas.microsoft.com/office/drawing/2014/main" id="{79FF4654-D6B9-477F-B48C-46C907677386}"/>
+                <a16:creationId xmlns:a16="http://schemas.microsoft.com/office/drawing/2014/main" xmlns="" id="{79FF4654-D6B9-477F-B48C-46C907677386}"/>
               </a:ext>
             </a:extLst>
           </p:cNvPr>
@@ -11613,7 +12022,7 @@
           <p:cNvPr id="20" name="Rectangle 19">
             <a:extLst>
               <a:ext uri="{FF2B5EF4-FFF2-40B4-BE49-F238E27FC236}">
-                <a16:creationId xmlns:a16="http://schemas.microsoft.com/office/drawing/2014/main" id="{48D97172-71B8-4D46-926D-EB08460B4A24}"/>
+                <a16:creationId xmlns:a16="http://schemas.microsoft.com/office/drawing/2014/main" xmlns="" id="{48D97172-71B8-4D46-926D-EB08460B4A24}"/>
               </a:ext>
             </a:extLst>
           </p:cNvPr>
@@ -11665,7 +12074,7 @@
           <p:cNvPr id="21" name="Rectangle 20">
             <a:extLst>
               <a:ext uri="{FF2B5EF4-FFF2-40B4-BE49-F238E27FC236}">
-                <a16:creationId xmlns:a16="http://schemas.microsoft.com/office/drawing/2014/main" id="{FB5BD4BD-511E-43CB-AB36-1465580C9757}"/>
+                <a16:creationId xmlns:a16="http://schemas.microsoft.com/office/drawing/2014/main" xmlns="" id="{FB5BD4BD-511E-43CB-AB36-1465580C9757}"/>
               </a:ext>
             </a:extLst>
           </p:cNvPr>
@@ -11717,7 +12126,7 @@
           <p:cNvPr id="22" name="TextBox 21">
             <a:extLst>
               <a:ext uri="{FF2B5EF4-FFF2-40B4-BE49-F238E27FC236}">
-                <a16:creationId xmlns:a16="http://schemas.microsoft.com/office/drawing/2014/main" id="{1C62BFD2-E07C-46C6-871B-7EBCB9971064}"/>
+                <a16:creationId xmlns:a16="http://schemas.microsoft.com/office/drawing/2014/main" xmlns="" id="{1C62BFD2-E07C-46C6-871B-7EBCB9971064}"/>
               </a:ext>
             </a:extLst>
           </p:cNvPr>
@@ -11761,7 +12170,7 @@
           <p:cNvPr id="23" name="Rectangle 22">
             <a:extLst>
               <a:ext uri="{FF2B5EF4-FFF2-40B4-BE49-F238E27FC236}">
-                <a16:creationId xmlns:a16="http://schemas.microsoft.com/office/drawing/2014/main" id="{A7CD57C4-C382-4A1D-ABDD-C309DB854726}"/>
+                <a16:creationId xmlns:a16="http://schemas.microsoft.com/office/drawing/2014/main" xmlns="" id="{A7CD57C4-C382-4A1D-ABDD-C309DB854726}"/>
               </a:ext>
             </a:extLst>
           </p:cNvPr>
@@ -11804,7 +12213,7 @@
           <p:cNvPr id="24" name="Rectangle 23">
             <a:extLst>
               <a:ext uri="{FF2B5EF4-FFF2-40B4-BE49-F238E27FC236}">
-                <a16:creationId xmlns:a16="http://schemas.microsoft.com/office/drawing/2014/main" id="{987C246C-FD26-4EFC-83BC-1024E22EE4D9}"/>
+                <a16:creationId xmlns:a16="http://schemas.microsoft.com/office/drawing/2014/main" xmlns="" id="{987C246C-FD26-4EFC-83BC-1024E22EE4D9}"/>
               </a:ext>
             </a:extLst>
           </p:cNvPr>
@@ -11847,7 +12256,7 @@
           <p:cNvPr id="25" name="TextBox 24">
             <a:extLst>
               <a:ext uri="{FF2B5EF4-FFF2-40B4-BE49-F238E27FC236}">
-                <a16:creationId xmlns:a16="http://schemas.microsoft.com/office/drawing/2014/main" id="{64D17D68-3428-401A-B15D-7945B40DF85D}"/>
+                <a16:creationId xmlns:a16="http://schemas.microsoft.com/office/drawing/2014/main" xmlns="" id="{64D17D68-3428-401A-B15D-7945B40DF85D}"/>
               </a:ext>
             </a:extLst>
           </p:cNvPr>
@@ -11899,7 +12308,7 @@
   <p:timing>
     <p:tnLst>
       <p:par>
-        <p:cTn id="1" dur="indefinite" restart="never" nodeType="tmRoot">
+        <p:cTn xmlns:p14="http://schemas.microsoft.com/office/powerpoint/2010/main" id="1" dur="indefinite" restart="never" nodeType="tmRoot">
           <p:childTnLst>
             <p:seq concurrent="1" nextAc="seek">
               <p:cTn id="2" dur="indefinite" nodeType="mainSeq">
@@ -13159,77 +13568,6 @@
 </p:sld>
 </file>
 
-<file path=ppt/slides/slide36.xml><?xml version="1.0" encoding="utf-8"?>
-<p:sld xmlns:a="http://schemas.openxmlformats.org/drawingml/2006/main" xmlns:r="http://schemas.openxmlformats.org/officeDocument/2006/relationships" xmlns:p="http://schemas.openxmlformats.org/presentationml/2006/main">
-  <p:cSld>
-    <p:spTree>
-      <p:nvGrpSpPr>
-        <p:cNvPr id="1" name=""/>
-        <p:cNvGrpSpPr/>
-        <p:nvPr/>
-      </p:nvGrpSpPr>
-      <p:grpSpPr>
-        <a:xfrm>
-          <a:off x="0" y="0"/>
-          <a:ext cx="0" cy="0"/>
-          <a:chOff x="0" y="0"/>
-          <a:chExt cx="0" cy="0"/>
-        </a:xfrm>
-      </p:grpSpPr>
-      <p:sp>
-        <p:nvSpPr>
-          <p:cNvPr id="4" name="Title 3"/>
-          <p:cNvSpPr>
-            <a:spLocks noGrp="1"/>
-          </p:cNvSpPr>
-          <p:nvPr>
-            <p:ph type="title"/>
-          </p:nvPr>
-        </p:nvSpPr>
-        <p:spPr/>
-        <p:txBody>
-          <a:bodyPr/>
-          <a:lstStyle/>
-          <a:p>
-            <a:r>
-              <a:rPr lang="en-US" dirty="0"/>
-              <a:t>Facebook Messenger Story</a:t>
-            </a:r>
-          </a:p>
-        </p:txBody>
-      </p:sp>
-      <p:sp>
-        <p:nvSpPr>
-          <p:cNvPr id="5" name="Text Placeholder 4"/>
-          <p:cNvSpPr>
-            <a:spLocks noGrp="1"/>
-          </p:cNvSpPr>
-          <p:nvPr>
-            <p:ph type="body" idx="1"/>
-          </p:nvPr>
-        </p:nvSpPr>
-        <p:spPr/>
-        <p:txBody>
-          <a:bodyPr/>
-          <a:lstStyle/>
-          <a:p>
-            <a:endParaRPr lang="en-US"/>
-          </a:p>
-        </p:txBody>
-      </p:sp>
-    </p:spTree>
-    <p:extLst>
-      <p:ext uri="{BB962C8B-B14F-4D97-AF65-F5344CB8AC3E}">
-        <p14:creationId xmlns:p14="http://schemas.microsoft.com/office/powerpoint/2010/main" val="992834903"/>
-      </p:ext>
-    </p:extLst>
-  </p:cSld>
-  <p:clrMapOvr>
-    <a:masterClrMapping/>
-  </p:clrMapOvr>
-</p:sld>
-</file>
-
 <file path=ppt/slides/slide37.xml><?xml version="1.0" encoding="utf-8"?>
 <p:sld xmlns:a="http://schemas.openxmlformats.org/drawingml/2006/main" xmlns:r="http://schemas.openxmlformats.org/officeDocument/2006/relationships" xmlns:p="http://schemas.openxmlformats.org/presentationml/2006/main">
   <p:cSld>
@@ -13264,66 +13602,47 @@
           <a:p>
             <a:r>
               <a:rPr lang="en-US" dirty="0"/>
-              <a:t>Facebook Messenger</a:t>
-            </a:r>
-          </a:p>
-        </p:txBody>
-      </p:sp>
-      <p:sp>
-        <p:nvSpPr>
-          <p:cNvPr id="5" name="Content Placeholder 4"/>
+              <a:t>Facebook Messenger Story</a:t>
+            </a:r>
+          </a:p>
+        </p:txBody>
+      </p:sp>
+      <p:sp>
+        <p:nvSpPr>
+          <p:cNvPr id="5" name="Text Placeholder 4"/>
           <p:cNvSpPr>
             <a:spLocks noGrp="1"/>
           </p:cNvSpPr>
           <p:nvPr>
-            <p:ph idx="1"/>
+            <p:ph type="body" idx="1"/>
           </p:nvPr>
         </p:nvSpPr>
-        <p:spPr>
-          <a:xfrm>
-            <a:off x="838200" y="1825625"/>
-            <a:ext cx="10848278" cy="4351338"/>
-          </a:xfrm>
-        </p:spPr>
+        <p:spPr/>
         <p:txBody>
           <a:bodyPr/>
           <a:lstStyle/>
           <a:p>
-            <a:r>
-              <a:rPr lang="en-US" dirty="0"/>
-              <a:t>First implementation had issues with long latency. Was reliable but slow.</a:t>
-            </a:r>
-          </a:p>
-          <a:p>
-            <a:r>
-              <a:rPr lang="en-US" dirty="0"/>
-              <a:t>With only weeks before launch, refactored to use MQTT</a:t>
-            </a:r>
-          </a:p>
-          <a:p>
-            <a:r>
-              <a:rPr lang="en-US" dirty="0"/>
-              <a:t>Designed to use bandwidth and battery sparingly (important for mobile apps)</a:t>
-            </a:r>
-          </a:p>
-          <a:p>
-            <a:pPr marL="0" indent="0">
-              <a:buNone/>
-            </a:pPr>
-            <a:endParaRPr lang="en-US" dirty="0"/>
+            <a:endParaRPr lang="en-US"/>
           </a:p>
         </p:txBody>
       </p:sp>
     </p:spTree>
     <p:extLst>
       <p:ext uri="{BB962C8B-B14F-4D97-AF65-F5344CB8AC3E}">
-        <p14:creationId xmlns:p14="http://schemas.microsoft.com/office/powerpoint/2010/main" val="1338110876"/>
+        <p14:creationId xmlns:p14="http://schemas.microsoft.com/office/powerpoint/2010/main" val="992834903"/>
       </p:ext>
     </p:extLst>
   </p:cSld>
   <p:clrMapOvr>
     <a:masterClrMapping/>
   </p:clrMapOvr>
+  <p:timing>
+    <p:tnLst>
+      <p:par>
+        <p:cTn xmlns:p14="http://schemas.microsoft.com/office/powerpoint/2010/main" id="1" dur="indefinite" restart="never" nodeType="tmRoot"/>
+      </p:par>
+    </p:tnLst>
+  </p:timing>
 </p:sld>
 </file>
 
@@ -13346,39 +13665,61 @@
       </p:grpSpPr>
       <p:sp>
         <p:nvSpPr>
-          <p:cNvPr id="3" name="Content Placeholder 2"/>
+          <p:cNvPr id="4" name="Title 3"/>
           <p:cNvSpPr>
             <a:spLocks noGrp="1"/>
           </p:cNvSpPr>
           <p:nvPr>
-            <p:ph idx="4294967295"/>
+            <p:ph type="title"/>
+          </p:nvPr>
+        </p:nvSpPr>
+        <p:spPr/>
+        <p:txBody>
+          <a:bodyPr/>
+          <a:lstStyle/>
+          <a:p>
+            <a:r>
+              <a:rPr lang="en-US" dirty="0"/>
+              <a:t>Facebook Messenger</a:t>
+            </a:r>
+          </a:p>
+        </p:txBody>
+      </p:sp>
+      <p:sp>
+        <p:nvSpPr>
+          <p:cNvPr id="5" name="Content Placeholder 4"/>
+          <p:cNvSpPr>
+            <a:spLocks noGrp="1"/>
+          </p:cNvSpPr>
+          <p:nvPr>
+            <p:ph idx="1"/>
           </p:nvPr>
         </p:nvSpPr>
         <p:spPr>
           <a:xfrm>
-            <a:off x="838200" y="1136309"/>
-            <a:ext cx="10515600" cy="4351338"/>
+            <a:off x="838200" y="1825625"/>
+            <a:ext cx="10848278" cy="4351338"/>
           </a:xfrm>
         </p:spPr>
         <p:txBody>
           <a:bodyPr/>
           <a:lstStyle/>
           <a:p>
-            <a:pPr marL="0" indent="0">
-              <a:buNone/>
-            </a:pPr>
-            <a:r>
-              <a:rPr lang="en-US" sz="4000" dirty="0"/>
-              <a:t>“By maintaining a MQTT connection and routing messages through our chat pipeline, we were able to often achieve phone-to-phone delivery in the hundreds of milliseconds rather than multiple seconds” </a:t>
-            </a:r>
-          </a:p>
-          <a:p>
-            <a:pPr marL="0" indent="0" algn="r">
-              <a:buNone/>
-            </a:pPr>
-            <a:r>
-              <a:rPr lang="en-US" sz="4000" dirty="0"/>
-              <a:t>– Lucy Zhang, Facebook</a:t>
+            <a:r>
+              <a:rPr lang="en-US" dirty="0"/>
+              <a:t>First implementation had issues with long latency. Was reliable but slow.</a:t>
+            </a:r>
+          </a:p>
+          <a:p>
+            <a:r>
+              <a:rPr lang="en-US" dirty="0"/>
+              <a:t>With only weeks before launch, refactored to use MQTT</a:t>
+            </a:r>
+          </a:p>
+          <a:p>
+            <a:r>
+              <a:rPr lang="en-US" dirty="0"/>
+              <a:t>Designed to use bandwidth and battery sparingly (important for mobile apps)</a:t>
             </a:r>
           </a:p>
           <a:p>
@@ -13389,53 +13730,23 @@
           </a:p>
         </p:txBody>
       </p:sp>
-      <p:sp>
-        <p:nvSpPr>
-          <p:cNvPr id="4" name="TextBox 3"/>
-          <p:cNvSpPr txBox="1"/>
-          <p:nvPr/>
-        </p:nvSpPr>
-        <p:spPr>
-          <a:xfrm>
-            <a:off x="801231" y="6311900"/>
-            <a:ext cx="10552569" cy="369332"/>
-          </a:xfrm>
-          <a:prstGeom prst="rect">
-            <a:avLst/>
-          </a:prstGeom>
-          <a:noFill/>
-        </p:spPr>
-        <p:txBody>
-          <a:bodyPr wrap="none" rtlCol="0">
-            <a:spAutoFit/>
-          </a:bodyPr>
-          <a:lstStyle/>
-          <a:p>
-            <a:pPr algn="ctr"/>
-            <a:r>
-              <a:rPr lang="en-US" dirty="0">
-                <a:solidFill>
-                  <a:schemeClr val="tx1">
-                    <a:lumMod val="50000"/>
-                    <a:lumOff val="50000"/>
-                  </a:schemeClr>
-                </a:solidFill>
-              </a:rPr>
-              <a:t>https://www.facebook.com/notes/facebook-engineering/building-facebook-messenger/10150259350998920/</a:t>
-            </a:r>
-          </a:p>
-        </p:txBody>
-      </p:sp>
     </p:spTree>
     <p:extLst>
       <p:ext uri="{BB962C8B-B14F-4D97-AF65-F5344CB8AC3E}">
-        <p14:creationId xmlns:p14="http://schemas.microsoft.com/office/powerpoint/2010/main" val="3302624920"/>
+        <p14:creationId xmlns:p14="http://schemas.microsoft.com/office/powerpoint/2010/main" val="1338110876"/>
       </p:ext>
     </p:extLst>
   </p:cSld>
   <p:clrMapOvr>
     <a:masterClrMapping/>
   </p:clrMapOvr>
+  <p:timing>
+    <p:tnLst>
+      <p:par>
+        <p:cTn xmlns:p14="http://schemas.microsoft.com/office/powerpoint/2010/main" id="1" dur="indefinite" restart="never" nodeType="tmRoot"/>
+      </p:par>
+    </p:tnLst>
+  </p:timing>
 </p:sld>
 </file>
 
@@ -13458,55 +13769,103 @@
       </p:grpSpPr>
       <p:sp>
         <p:nvSpPr>
-          <p:cNvPr id="4" name="Title 3"/>
+          <p:cNvPr id="3" name="Content Placeholder 2"/>
           <p:cNvSpPr>
             <a:spLocks noGrp="1"/>
           </p:cNvSpPr>
           <p:nvPr>
-            <p:ph type="title"/>
+            <p:ph idx="4294967295"/>
           </p:nvPr>
         </p:nvSpPr>
-        <p:spPr/>
+        <p:spPr>
+          <a:xfrm>
+            <a:off x="838200" y="1136309"/>
+            <a:ext cx="10515600" cy="4351338"/>
+          </a:xfrm>
+        </p:spPr>
         <p:txBody>
           <a:bodyPr/>
           <a:lstStyle/>
           <a:p>
-            <a:r>
-              <a:rPr lang="en-US" dirty="0"/>
-              <a:t>Web Apps</a:t>
-            </a:r>
-          </a:p>
-        </p:txBody>
-      </p:sp>
-      <p:sp>
-        <p:nvSpPr>
-          <p:cNvPr id="5" name="Text Placeholder 4"/>
-          <p:cNvSpPr>
-            <a:spLocks noGrp="1"/>
-          </p:cNvSpPr>
-          <p:nvPr>
-            <p:ph type="body" idx="1"/>
-          </p:nvPr>
-        </p:nvSpPr>
-        <p:spPr/>
-        <p:txBody>
-          <a:bodyPr/>
+            <a:pPr marL="0" indent="0">
+              <a:buNone/>
+            </a:pPr>
+            <a:r>
+              <a:rPr lang="en-US" sz="4000" dirty="0"/>
+              <a:t>“By maintaining a MQTT connection and routing messages through our chat pipeline, we were able to often achieve phone-to-phone delivery in the hundreds of milliseconds rather than multiple seconds” </a:t>
+            </a:r>
+          </a:p>
+          <a:p>
+            <a:pPr marL="0" indent="0" algn="r">
+              <a:buNone/>
+            </a:pPr>
+            <a:r>
+              <a:rPr lang="en-US" sz="4000" dirty="0"/>
+              <a:t>– Lucy Zhang, Facebook</a:t>
+            </a:r>
+          </a:p>
+          <a:p>
+            <a:pPr marL="0" indent="0">
+              <a:buNone/>
+            </a:pPr>
+            <a:endParaRPr lang="en-US" dirty="0"/>
+          </a:p>
+        </p:txBody>
+      </p:sp>
+      <p:sp>
+        <p:nvSpPr>
+          <p:cNvPr id="4" name="TextBox 3"/>
+          <p:cNvSpPr txBox="1"/>
+          <p:nvPr/>
+        </p:nvSpPr>
+        <p:spPr>
+          <a:xfrm>
+            <a:off x="801231" y="6311900"/>
+            <a:ext cx="10552569" cy="369332"/>
+          </a:xfrm>
+          <a:prstGeom prst="rect">
+            <a:avLst/>
+          </a:prstGeom>
+          <a:noFill/>
+        </p:spPr>
+        <p:txBody>
+          <a:bodyPr wrap="none" rtlCol="0">
+            <a:spAutoFit/>
+          </a:bodyPr>
           <a:lstStyle/>
           <a:p>
-            <a:endParaRPr lang="en-US"/>
+            <a:pPr algn="ctr"/>
+            <a:r>
+              <a:rPr lang="en-US" dirty="0">
+                <a:solidFill>
+                  <a:schemeClr val="tx1">
+                    <a:lumMod val="50000"/>
+                    <a:lumOff val="50000"/>
+                  </a:schemeClr>
+                </a:solidFill>
+              </a:rPr>
+              <a:t>https://www.facebook.com/notes/facebook-engineering/building-facebook-messenger/10150259350998920/</a:t>
+            </a:r>
           </a:p>
         </p:txBody>
       </p:sp>
     </p:spTree>
     <p:extLst>
       <p:ext uri="{BB962C8B-B14F-4D97-AF65-F5344CB8AC3E}">
-        <p14:creationId xmlns:p14="http://schemas.microsoft.com/office/powerpoint/2010/main" val="1509704479"/>
+        <p14:creationId xmlns:p14="http://schemas.microsoft.com/office/powerpoint/2010/main" val="3302624920"/>
       </p:ext>
     </p:extLst>
   </p:cSld>
   <p:clrMapOvr>
     <a:masterClrMapping/>
   </p:clrMapOvr>
+  <p:timing>
+    <p:tnLst>
+      <p:par>
+        <p:cTn xmlns:p14="http://schemas.microsoft.com/office/powerpoint/2010/main" id="1" dur="indefinite" restart="never" nodeType="tmRoot"/>
+      </p:par>
+    </p:tnLst>
+  </p:timing>
 </p:sld>
 </file>
 
@@ -13558,7 +13917,7 @@
           </a:prstGeom>
           <a:noFill/>
           <a:extLst>
-            <a:ext uri="{909E8E84-426E-40DD-AFC4-6F175D3DCCD1}">
+            <a:ext uri="{909E8E84-426E-40dd-AFC4-6F175D3DCCD1}">
               <a14:hiddenFill xmlns:a14="http://schemas.microsoft.com/office/drawing/2010/main">
                 <a:solidFill>
                   <a:srgbClr val="FFFFFF"/>
@@ -13611,6 +13970,13 @@
   <p:clrMapOvr>
     <a:masterClrMapping/>
   </p:clrMapOvr>
+  <p:timing>
+    <p:tnLst>
+      <p:par>
+        <p:cTn xmlns:p14="http://schemas.microsoft.com/office/powerpoint/2010/main" id="1" dur="indefinite" restart="never" nodeType="tmRoot"/>
+      </p:par>
+    </p:tnLst>
+  </p:timing>
 </p:sld>
 </file>
 
@@ -13647,6 +14013,84 @@
           <a:lstStyle/>
           <a:p>
             <a:r>
+              <a:rPr lang="en-US" dirty="0"/>
+              <a:t>Web Apps</a:t>
+            </a:r>
+          </a:p>
+        </p:txBody>
+      </p:sp>
+      <p:sp>
+        <p:nvSpPr>
+          <p:cNvPr id="5" name="Text Placeholder 4"/>
+          <p:cNvSpPr>
+            <a:spLocks noGrp="1"/>
+          </p:cNvSpPr>
+          <p:nvPr>
+            <p:ph type="body" idx="1"/>
+          </p:nvPr>
+        </p:nvSpPr>
+        <p:spPr/>
+        <p:txBody>
+          <a:bodyPr/>
+          <a:lstStyle/>
+          <a:p>
+            <a:endParaRPr lang="en-US"/>
+          </a:p>
+        </p:txBody>
+      </p:sp>
+    </p:spTree>
+    <p:extLst>
+      <p:ext uri="{BB962C8B-B14F-4D97-AF65-F5344CB8AC3E}">
+        <p14:creationId xmlns:p14="http://schemas.microsoft.com/office/powerpoint/2010/main" val="1509704479"/>
+      </p:ext>
+    </p:extLst>
+  </p:cSld>
+  <p:clrMapOvr>
+    <a:masterClrMapping/>
+  </p:clrMapOvr>
+  <p:timing>
+    <p:tnLst>
+      <p:par>
+        <p:cTn xmlns:p14="http://schemas.microsoft.com/office/powerpoint/2010/main" id="1" dur="indefinite" restart="never" nodeType="tmRoot"/>
+      </p:par>
+    </p:tnLst>
+  </p:timing>
+</p:sld>
+</file>
+
+<file path=ppt/slides/slide41.xml><?xml version="1.0" encoding="utf-8"?>
+<p:sld xmlns:a="http://schemas.openxmlformats.org/drawingml/2006/main" xmlns:r="http://schemas.openxmlformats.org/officeDocument/2006/relationships" xmlns:p="http://schemas.openxmlformats.org/presentationml/2006/main">
+  <p:cSld>
+    <p:spTree>
+      <p:nvGrpSpPr>
+        <p:cNvPr id="1" name=""/>
+        <p:cNvGrpSpPr/>
+        <p:nvPr/>
+      </p:nvGrpSpPr>
+      <p:grpSpPr>
+        <a:xfrm>
+          <a:off x="0" y="0"/>
+          <a:ext cx="0" cy="0"/>
+          <a:chOff x="0" y="0"/>
+          <a:chExt cx="0" cy="0"/>
+        </a:xfrm>
+      </p:grpSpPr>
+      <p:sp>
+        <p:nvSpPr>
+          <p:cNvPr id="4" name="Title 3"/>
+          <p:cNvSpPr>
+            <a:spLocks noGrp="1"/>
+          </p:cNvSpPr>
+          <p:nvPr>
+            <p:ph type="title"/>
+          </p:nvPr>
+        </p:nvSpPr>
+        <p:spPr/>
+        <p:txBody>
+          <a:bodyPr/>
+          <a:lstStyle/>
+          <a:p>
+            <a:r>
               <a:rPr lang="en-US" dirty="0" err="1"/>
               <a:t>Websockets</a:t>
             </a:r>
@@ -13736,10 +14180,17 @@
   <p:clrMapOvr>
     <a:masterClrMapping/>
   </p:clrMapOvr>
+  <p:timing>
+    <p:tnLst>
+      <p:par>
+        <p:cTn xmlns:p14="http://schemas.microsoft.com/office/powerpoint/2010/main" id="1" dur="indefinite" restart="never" nodeType="tmRoot"/>
+      </p:par>
+    </p:tnLst>
+  </p:timing>
 </p:sld>
 </file>
 
-<file path=ppt/slides/slide41.xml><?xml version="1.0" encoding="utf-8"?>
+<file path=ppt/slides/slide42.xml><?xml version="1.0" encoding="utf-8"?>
 <p:sld xmlns:a="http://schemas.openxmlformats.org/drawingml/2006/main" xmlns:r="http://schemas.openxmlformats.org/officeDocument/2006/relationships" xmlns:p="http://schemas.openxmlformats.org/presentationml/2006/main">
   <p:cSld>
     <p:spTree>
@@ -13863,10 +14314,17 @@
   <p:clrMapOvr>
     <a:masterClrMapping/>
   </p:clrMapOvr>
+  <p:timing>
+    <p:tnLst>
+      <p:par>
+        <p:cTn xmlns:p14="http://schemas.microsoft.com/office/powerpoint/2010/main" id="1" dur="indefinite" restart="never" nodeType="tmRoot"/>
+      </p:par>
+    </p:tnLst>
+  </p:timing>
 </p:sld>
 </file>
 
-<file path=ppt/slides/slide42.xml><?xml version="1.0" encoding="utf-8"?>
+<file path=ppt/slides/slide43.xml><?xml version="1.0" encoding="utf-8"?>
 <p:sld xmlns:a="http://schemas.openxmlformats.org/drawingml/2006/main" xmlns:r="http://schemas.openxmlformats.org/officeDocument/2006/relationships" xmlns:p="http://schemas.openxmlformats.org/presentationml/2006/main">
   <p:cSld>
     <p:spTree>
@@ -13982,10 +14440,17 @@
   <p:clrMapOvr>
     <a:masterClrMapping/>
   </p:clrMapOvr>
+  <p:timing>
+    <p:tnLst>
+      <p:par>
+        <p:cTn xmlns:p14="http://schemas.microsoft.com/office/powerpoint/2010/main" id="1" dur="indefinite" restart="never" nodeType="tmRoot"/>
+      </p:par>
+    </p:tnLst>
+  </p:timing>
 </p:sld>
 </file>
 
-<file path=ppt/slides/slide43.xml><?xml version="1.0" encoding="utf-8"?>
+<file path=ppt/slides/slide44.xml><?xml version="1.0" encoding="utf-8"?>
 <p:sld xmlns:a="http://schemas.openxmlformats.org/drawingml/2006/main" xmlns:r="http://schemas.openxmlformats.org/officeDocument/2006/relationships" xmlns:p="http://schemas.openxmlformats.org/presentationml/2006/main">
   <p:cSld>
     <p:spTree>
@@ -14007,7 +14472,7 @@
           <p:cNvPr id="2" name="Title 1">
             <a:extLst>
               <a:ext uri="{FF2B5EF4-FFF2-40B4-BE49-F238E27FC236}">
-                <a16:creationId xmlns:a16="http://schemas.microsoft.com/office/drawing/2014/main" id="{C98CC361-0A19-4C50-A88E-562BFC3C3587}"/>
+                <a16:creationId xmlns:a16="http://schemas.microsoft.com/office/drawing/2014/main" xmlns="" id="{C98CC361-0A19-4C50-A88E-562BFC3C3587}"/>
               </a:ext>
             </a:extLst>
           </p:cNvPr>
@@ -14035,7 +14500,7 @@
           <p:cNvPr id="4" name="Text Placeholder 3">
             <a:extLst>
               <a:ext uri="{FF2B5EF4-FFF2-40B4-BE49-F238E27FC236}">
-                <a16:creationId xmlns:a16="http://schemas.microsoft.com/office/drawing/2014/main" id="{0FD847C0-AC95-4968-B816-A5BD147DBBC8}"/>
+                <a16:creationId xmlns:a16="http://schemas.microsoft.com/office/drawing/2014/main" xmlns="" id="{0FD847C0-AC95-4968-B816-A5BD147DBBC8}"/>
               </a:ext>
             </a:extLst>
           </p:cNvPr>
@@ -14065,10 +14530,17 @@
   <p:clrMapOvr>
     <a:masterClrMapping/>
   </p:clrMapOvr>
+  <p:timing>
+    <p:tnLst>
+      <p:par>
+        <p:cTn xmlns:p14="http://schemas.microsoft.com/office/powerpoint/2010/main" id="1" dur="indefinite" restart="never" nodeType="tmRoot"/>
+      </p:par>
+    </p:tnLst>
+  </p:timing>
 </p:sld>
 </file>
 
-<file path=ppt/slides/slide44.xml><?xml version="1.0" encoding="utf-8"?>
+<file path=ppt/slides/slide45.xml><?xml version="1.0" encoding="utf-8"?>
 <p:sld xmlns:a="http://schemas.openxmlformats.org/drawingml/2006/main" xmlns:r="http://schemas.openxmlformats.org/officeDocument/2006/relationships" xmlns:p="http://schemas.openxmlformats.org/presentationml/2006/main">
   <p:cSld>
     <p:spTree>
@@ -14116,7 +14588,7 @@
           </a:prstGeom>
           <a:noFill/>
           <a:extLst>
-            <a:ext uri="{909E8E84-426E-40DD-AFC4-6F175D3DCCD1}">
+            <a:ext uri="{909E8E84-426E-40dd-AFC4-6F175D3DCCD1}">
               <a14:hiddenFill xmlns:a14="http://schemas.microsoft.com/office/drawing/2010/main">
                 <a:solidFill>
                   <a:srgbClr val="FFFFFF"/>
@@ -14162,10 +14634,17 @@
   <p:clrMapOvr>
     <a:masterClrMapping/>
   </p:clrMapOvr>
+  <p:timing>
+    <p:tnLst>
+      <p:par>
+        <p:cTn xmlns:p14="http://schemas.microsoft.com/office/powerpoint/2010/main" id="1" dur="indefinite" restart="never" nodeType="tmRoot"/>
+      </p:par>
+    </p:tnLst>
+  </p:timing>
 </p:sld>
 </file>
 
-<file path=ppt/slides/slide45.xml><?xml version="1.0" encoding="utf-8"?>
+<file path=ppt/slides/slide46.xml><?xml version="1.0" encoding="utf-8"?>
 <p:sld xmlns:a="http://schemas.openxmlformats.org/drawingml/2006/main" xmlns:r="http://schemas.openxmlformats.org/officeDocument/2006/relationships" xmlns:p="http://schemas.openxmlformats.org/presentationml/2006/main">
   <p:cSld>
     <p:spTree>
@@ -14187,7 +14666,7 @@
           <p:cNvPr id="7" name="Picture 2" descr="http://www.seeedstudio.com/depot/images/113990105%201.jpg">
             <a:extLst>
               <a:ext uri="{FF2B5EF4-FFF2-40B4-BE49-F238E27FC236}">
-                <a16:creationId xmlns:a16="http://schemas.microsoft.com/office/drawing/2014/main" id="{EB5726F5-84C8-46E3-9951-E141F38B3031}"/>
+                <a16:creationId xmlns:a16="http://schemas.microsoft.com/office/drawing/2014/main" xmlns="" id="{EB5726F5-84C8-46E3-9951-E141F38B3031}"/>
               </a:ext>
             </a:extLst>
           </p:cNvPr>
@@ -14219,7 +14698,7 @@
           </a:prstGeom>
           <a:noFill/>
           <a:extLst>
-            <a:ext uri="{909E8E84-426E-40DD-AFC4-6F175D3DCCD1}">
+            <a:ext uri="{909E8E84-426E-40dd-AFC4-6F175D3DCCD1}">
               <a14:hiddenFill xmlns:a14="http://schemas.microsoft.com/office/drawing/2010/main">
                 <a:solidFill>
                   <a:srgbClr val="FFFFFF"/>
@@ -14234,7 +14713,7 @@
           <p:cNvPr id="6" name="Diagram 5">
             <a:extLst>
               <a:ext uri="{FF2B5EF4-FFF2-40B4-BE49-F238E27FC236}">
-                <a16:creationId xmlns:a16="http://schemas.microsoft.com/office/drawing/2014/main" id="{49D3C380-DEA1-4975-88A0-953589CC9E81}"/>
+                <a16:creationId xmlns:a16="http://schemas.microsoft.com/office/drawing/2014/main" xmlns="" id="{49D3C380-DEA1-4975-88A0-953589CC9E81}"/>
               </a:ext>
             </a:extLst>
           </p:cNvPr>
@@ -14262,7 +14741,7 @@
           <p:cNvPr id="8" name="Rectangle 7">
             <a:extLst>
               <a:ext uri="{FF2B5EF4-FFF2-40B4-BE49-F238E27FC236}">
-                <a16:creationId xmlns:a16="http://schemas.microsoft.com/office/drawing/2014/main" id="{4FAC6FB6-9693-4869-BFB3-108B80CEE80D}"/>
+                <a16:creationId xmlns:a16="http://schemas.microsoft.com/office/drawing/2014/main" xmlns="" id="{4FAC6FB6-9693-4869-BFB3-108B80CEE80D}"/>
               </a:ext>
             </a:extLst>
           </p:cNvPr>
@@ -14317,7 +14796,7 @@
           <p:cNvPr id="9" name="Rectangle 8">
             <a:extLst>
               <a:ext uri="{FF2B5EF4-FFF2-40B4-BE49-F238E27FC236}">
-                <a16:creationId xmlns:a16="http://schemas.microsoft.com/office/drawing/2014/main" id="{1B82F0C6-8E4F-498F-A476-37B44FBA2FDB}"/>
+                <a16:creationId xmlns:a16="http://schemas.microsoft.com/office/drawing/2014/main" xmlns="" id="{1B82F0C6-8E4F-498F-A476-37B44FBA2FDB}"/>
               </a:ext>
             </a:extLst>
           </p:cNvPr>
@@ -14372,7 +14851,7 @@
           <p:cNvPr id="10" name="Rectangle 9">
             <a:extLst>
               <a:ext uri="{FF2B5EF4-FFF2-40B4-BE49-F238E27FC236}">
-                <a16:creationId xmlns:a16="http://schemas.microsoft.com/office/drawing/2014/main" id="{14D5E458-2FF0-41E7-A362-A921A17902E3}"/>
+                <a16:creationId xmlns:a16="http://schemas.microsoft.com/office/drawing/2014/main" xmlns="" id="{14D5E458-2FF0-41E7-A362-A921A17902E3}"/>
               </a:ext>
             </a:extLst>
           </p:cNvPr>
@@ -14427,7 +14906,7 @@
           <p:cNvPr id="11" name="Rectangle 10">
             <a:extLst>
               <a:ext uri="{FF2B5EF4-FFF2-40B4-BE49-F238E27FC236}">
-                <a16:creationId xmlns:a16="http://schemas.microsoft.com/office/drawing/2014/main" id="{270E13E5-7496-4357-95A7-29574B29A5F5}"/>
+                <a16:creationId xmlns:a16="http://schemas.microsoft.com/office/drawing/2014/main" xmlns="" id="{270E13E5-7496-4357-95A7-29574B29A5F5}"/>
               </a:ext>
             </a:extLst>
           </p:cNvPr>
@@ -14482,7 +14961,7 @@
           <p:cNvPr id="12" name="Arrow: Down 11">
             <a:extLst>
               <a:ext uri="{FF2B5EF4-FFF2-40B4-BE49-F238E27FC236}">
-                <a16:creationId xmlns:a16="http://schemas.microsoft.com/office/drawing/2014/main" id="{E546D575-5E7A-48E0-B297-37194E3333B9}"/>
+                <a16:creationId xmlns:a16="http://schemas.microsoft.com/office/drawing/2014/main" xmlns="" id="{E546D575-5E7A-48E0-B297-37194E3333B9}"/>
               </a:ext>
             </a:extLst>
           </p:cNvPr>
@@ -14531,7 +15010,7 @@
           <p:cNvPr id="13" name="Arrow: Down 12">
             <a:extLst>
               <a:ext uri="{FF2B5EF4-FFF2-40B4-BE49-F238E27FC236}">
-                <a16:creationId xmlns:a16="http://schemas.microsoft.com/office/drawing/2014/main" id="{FB232B59-4E8B-45FA-A3B3-AB4781604C39}"/>
+                <a16:creationId xmlns:a16="http://schemas.microsoft.com/office/drawing/2014/main" xmlns="" id="{FB232B59-4E8B-45FA-A3B3-AB4781604C39}"/>
               </a:ext>
             </a:extLst>
           </p:cNvPr>
@@ -14580,7 +15059,7 @@
           <p:cNvPr id="2" name="TextBox 1">
             <a:extLst>
               <a:ext uri="{FF2B5EF4-FFF2-40B4-BE49-F238E27FC236}">
-                <a16:creationId xmlns:a16="http://schemas.microsoft.com/office/drawing/2014/main" id="{9E576527-75CB-44B3-9499-246128C39D81}"/>
+                <a16:creationId xmlns:a16="http://schemas.microsoft.com/office/drawing/2014/main" xmlns="" id="{9E576527-75CB-44B3-9499-246128C39D81}"/>
               </a:ext>
             </a:extLst>
           </p:cNvPr>
@@ -14648,7 +15127,7 @@
           <p:cNvPr id="14" name="TextBox 13">
             <a:extLst>
               <a:ext uri="{FF2B5EF4-FFF2-40B4-BE49-F238E27FC236}">
-                <a16:creationId xmlns:a16="http://schemas.microsoft.com/office/drawing/2014/main" id="{F45F38E2-0996-489D-AA19-7CBBAFC38BA7}"/>
+                <a16:creationId xmlns:a16="http://schemas.microsoft.com/office/drawing/2014/main" xmlns="" id="{F45F38E2-0996-489D-AA19-7CBBAFC38BA7}"/>
               </a:ext>
             </a:extLst>
           </p:cNvPr>
@@ -14690,7 +15169,7 @@
           <p:cNvPr id="3" name="TextBox 2">
             <a:extLst>
               <a:ext uri="{FF2B5EF4-FFF2-40B4-BE49-F238E27FC236}">
-                <a16:creationId xmlns:a16="http://schemas.microsoft.com/office/drawing/2014/main" id="{F1D1349F-CCDF-4CBD-B502-8FDC71DF7671}"/>
+                <a16:creationId xmlns:a16="http://schemas.microsoft.com/office/drawing/2014/main" xmlns="" id="{F1D1349F-CCDF-4CBD-B502-8FDC71DF7671}"/>
               </a:ext>
             </a:extLst>
           </p:cNvPr>
@@ -14733,7 +15212,7 @@
   <p:timing>
     <p:tnLst>
       <p:par>
-        <p:cTn id="1" dur="indefinite" restart="never" nodeType="tmRoot">
+        <p:cTn xmlns:p14="http://schemas.microsoft.com/office/powerpoint/2010/main" id="1" dur="indefinite" restart="never" nodeType="tmRoot">
           <p:childTnLst>
             <p:seq concurrent="1" nextAc="seek">
               <p:cTn id="2" dur="indefinite" nodeType="mainSeq">
@@ -15223,7 +15702,7 @@
 </p:sld>
 </file>
 
-<file path=ppt/slides/slide46.xml><?xml version="1.0" encoding="utf-8"?>
+<file path=ppt/slides/slide47.xml><?xml version="1.0" encoding="utf-8"?>
 <p:sld xmlns:a="http://schemas.openxmlformats.org/drawingml/2006/main" xmlns:r="http://schemas.openxmlformats.org/officeDocument/2006/relationships" xmlns:p="http://schemas.openxmlformats.org/presentationml/2006/main">
   <p:cSld>
     <p:spTree>
@@ -15334,10 +15813,17 @@
   <p:clrMapOvr>
     <a:masterClrMapping/>
   </p:clrMapOvr>
+  <p:timing>
+    <p:tnLst>
+      <p:par>
+        <p:cTn xmlns:p14="http://schemas.microsoft.com/office/powerpoint/2010/main" id="1" dur="indefinite" restart="never" nodeType="tmRoot"/>
+      </p:par>
+    </p:tnLst>
+  </p:timing>
 </p:sld>
 </file>
 
-<file path=ppt/slides/slide47.xml><?xml version="1.0" encoding="utf-8"?>
+<file path=ppt/slides/slide48.xml><?xml version="1.0" encoding="utf-8"?>
 <p:sld xmlns:a="http://schemas.openxmlformats.org/drawingml/2006/main" xmlns:r="http://schemas.openxmlformats.org/officeDocument/2006/relationships" xmlns:p="http://schemas.openxmlformats.org/presentationml/2006/main">
   <p:cSld>
     <p:spTree>
@@ -15577,10 +16063,17 @@
   <p:clrMapOvr>
     <a:masterClrMapping/>
   </p:clrMapOvr>
+  <p:timing>
+    <p:tnLst>
+      <p:par>
+        <p:cTn xmlns:p14="http://schemas.microsoft.com/office/powerpoint/2010/main" id="1" dur="indefinite" restart="never" nodeType="tmRoot"/>
+      </p:par>
+    </p:tnLst>
+  </p:timing>
 </p:sld>
 </file>
 
-<file path=ppt/slides/slide48.xml><?xml version="1.0" encoding="utf-8"?>
+<file path=ppt/slides/slide49.xml><?xml version="1.0" encoding="utf-8"?>
 <p:sld xmlns:a="http://schemas.openxmlformats.org/drawingml/2006/main" xmlns:r="http://schemas.openxmlformats.org/officeDocument/2006/relationships" xmlns:p="http://schemas.openxmlformats.org/presentationml/2006/main" show="0">
   <p:cSld>
     <p:spTree>
@@ -15681,6 +16174,21 @@
   <p:clrMapOvr>
     <a:masterClrMapping/>
   </p:clrMapOvr>
+  <mc:AlternateContent xmlns:mc="http://schemas.openxmlformats.org/markup-compatibility/2006">
+    <mc:Choice xmlns:p14="http://schemas.microsoft.com/office/powerpoint/2010/main" Requires="p14">
+      <p:transition spd="slow" p14:dur="2000"/>
+    </mc:Choice>
+    <mc:Fallback>
+      <p:transition xmlns:p14="http://schemas.microsoft.com/office/powerpoint/2010/main" spd="slow"/>
+    </mc:Fallback>
+  </mc:AlternateContent>
+  <p:timing>
+    <p:tnLst>
+      <p:par>
+        <p:cTn xmlns:p14="http://schemas.microsoft.com/office/powerpoint/2010/main" id="1" dur="indefinite" restart="never" nodeType="tmRoot"/>
+      </p:par>
+    </p:tnLst>
+  </p:timing>
 </p:sld>
 </file>
 
@@ -15740,7 +16248,7 @@
           </a:prstGeom>
           <a:noFill/>
           <a:extLst>
-            <a:ext uri="{909E8E84-426E-40DD-AFC4-6F175D3DCCD1}">
+            <a:ext uri="{909E8E84-426E-40dd-AFC4-6F175D3DCCD1}">
               <a14:hiddenFill xmlns:a14="http://schemas.microsoft.com/office/drawing/2010/main">
                 <a:solidFill>
                   <a:srgbClr val="FFFFFF"/>
@@ -15760,6 +16268,13 @@
   <p:clrMapOvr>
     <a:masterClrMapping/>
   </p:clrMapOvr>
+  <p:timing>
+    <p:tnLst>
+      <p:par>
+        <p:cTn xmlns:p14="http://schemas.microsoft.com/office/powerpoint/2010/main" id="1" dur="indefinite" restart="never" nodeType="tmRoot"/>
+      </p:par>
+    </p:tnLst>
+  </p:timing>
 </p:sld>
 </file>
 
@@ -15819,7 +16334,7 @@
           </a:prstGeom>
           <a:noFill/>
           <a:extLst>
-            <a:ext uri="{909E8E84-426E-40DD-AFC4-6F175D3DCCD1}">
+            <a:ext uri="{909E8E84-426E-40dd-AFC4-6F175D3DCCD1}">
               <a14:hiddenFill xmlns:a14="http://schemas.microsoft.com/office/drawing/2010/main">
                 <a:solidFill>
                   <a:srgbClr val="FFFFFF"/>
@@ -15839,6 +16354,13 @@
   <p:clrMapOvr>
     <a:masterClrMapping/>
   </p:clrMapOvr>
+  <p:timing>
+    <p:tnLst>
+      <p:par>
+        <p:cTn xmlns:p14="http://schemas.microsoft.com/office/powerpoint/2010/main" id="1" dur="indefinite" restart="never" nodeType="tmRoot"/>
+      </p:par>
+    </p:tnLst>
+  </p:timing>
 </p:sld>
 </file>
 
@@ -16017,6 +16539,13 @@
   <p:clrMapOvr>
     <a:masterClrMapping/>
   </p:clrMapOvr>
+  <p:timing>
+    <p:tnLst>
+      <p:par>
+        <p:cTn xmlns:p14="http://schemas.microsoft.com/office/powerpoint/2010/main" id="1" dur="indefinite" restart="never" nodeType="tmRoot"/>
+      </p:par>
+    </p:tnLst>
+  </p:timing>
 </p:sld>
 </file>
 
@@ -16068,7 +16597,7 @@
           </a:prstGeom>
           <a:noFill/>
           <a:extLst>
-            <a:ext uri="{909E8E84-426E-40DD-AFC4-6F175D3DCCD1}">
+            <a:ext uri="{909E8E84-426E-40dd-AFC4-6F175D3DCCD1}">
               <a14:hiddenFill xmlns:a14="http://schemas.microsoft.com/office/drawing/2010/main">
                 <a:solidFill>
                   <a:srgbClr val="FFFFFF"/>
@@ -16109,7 +16638,7 @@
           </a:prstGeom>
           <a:noFill/>
           <a:extLst>
-            <a:ext uri="{909E8E84-426E-40DD-AFC4-6F175D3DCCD1}">
+            <a:ext uri="{909E8E84-426E-40dd-AFC4-6F175D3DCCD1}">
               <a14:hiddenFill xmlns:a14="http://schemas.microsoft.com/office/drawing/2010/main">
                 <a:solidFill>
                   <a:srgbClr val="FFFFFF"/>
@@ -16231,7 +16760,7 @@
           </a:prstGeom>
           <a:noFill/>
           <a:extLst>
-            <a:ext uri="{909E8E84-426E-40DD-AFC4-6F175D3DCCD1}">
+            <a:ext uri="{909E8E84-426E-40dd-AFC4-6F175D3DCCD1}">
               <a14:hiddenFill xmlns:a14="http://schemas.microsoft.com/office/drawing/2010/main">
                 <a:solidFill>
                   <a:srgbClr val="FFFFFF"/>
@@ -16272,7 +16801,7 @@
           </a:prstGeom>
           <a:noFill/>
           <a:extLst>
-            <a:ext uri="{909E8E84-426E-40DD-AFC4-6F175D3DCCD1}">
+            <a:ext uri="{909E8E84-426E-40dd-AFC4-6F175D3DCCD1}">
               <a14:hiddenFill xmlns:a14="http://schemas.microsoft.com/office/drawing/2010/main">
                 <a:solidFill>
                   <a:srgbClr val="FFFFFF"/>
@@ -16292,6 +16821,13 @@
   <p:clrMapOvr>
     <a:masterClrMapping/>
   </p:clrMapOvr>
+  <p:timing>
+    <p:tnLst>
+      <p:par>
+        <p:cTn xmlns:p14="http://schemas.microsoft.com/office/powerpoint/2010/main" id="1" dur="indefinite" restart="never" nodeType="tmRoot"/>
+      </p:par>
+    </p:tnLst>
+  </p:timing>
 </p:sld>
 </file>
 
@@ -16343,7 +16879,7 @@
           </a:prstGeom>
           <a:noFill/>
           <a:extLst>
-            <a:ext uri="{909E8E84-426E-40DD-AFC4-6F175D3DCCD1}">
+            <a:ext uri="{909E8E84-426E-40dd-AFC4-6F175D3DCCD1}">
               <a14:hiddenFill xmlns:a14="http://schemas.microsoft.com/office/drawing/2010/main">
                 <a:solidFill>
                   <a:srgbClr val="FFFFFF"/>
@@ -16363,6 +16899,13 @@
   <p:clrMapOvr>
     <a:masterClrMapping/>
   </p:clrMapOvr>
+  <p:timing>
+    <p:tnLst>
+      <p:par>
+        <p:cTn xmlns:p14="http://schemas.microsoft.com/office/powerpoint/2010/main" id="1" dur="indefinite" restart="never" nodeType="tmRoot"/>
+      </p:par>
+    </p:tnLst>
+  </p:timing>
 </p:sld>
 </file>
 
@@ -16409,7 +16952,7 @@
     </a:clrScheme>
     <a:fontScheme name="Office">
       <a:majorFont>
-        <a:latin typeface="Calibri Light" panose="020F0302020204030204"/>
+        <a:latin typeface="Calibri Light"/>
         <a:ea typeface=""/>
         <a:cs typeface=""/>
         <a:font script="Jpan" typeface="游ゴシック Light"/>
@@ -16461,7 +17004,7 @@
         <a:font script="Tfng" typeface="Ebrima"/>
       </a:majorFont>
       <a:minorFont>
-        <a:latin typeface="Calibri" panose="020F0502020204030204"/>
+        <a:latin typeface="Calibri"/>
         <a:ea typeface=""/>
         <a:cs typeface=""/>
         <a:font script="Jpan" typeface="游ゴシック"/>
@@ -16655,7 +17198,7 @@
   <a:extraClrSchemeLst/>
   <a:extLst>
     <a:ext uri="{05A4C25C-085E-4340-85A3-A5531E510DB2}">
-      <thm15:themeFamily xmlns:thm15="http://schemas.microsoft.com/office/thememl/2012/main" name="Office Theme" id="{62F939B6-93AF-4DB8-9C6B-D6C7DFDC589F}" vid="{4A3C46E8-61CC-4603-A589-7422A47A8E4A}"/>
+      <thm15:themeFamily xmlns:thm15="http://schemas.microsoft.com/office/thememl/2012/main" xmlns="" name="Office Theme" id="{62F939B6-93AF-4DB8-9C6B-D6C7DFDC589F}" vid="{4A3C46E8-61CC-4603-A589-7422A47A8E4A}"/>
     </a:ext>
   </a:extLst>
 </a:theme>
@@ -16704,7 +17247,7 @@
     </a:clrScheme>
     <a:fontScheme name="Office">
       <a:majorFont>
-        <a:latin typeface="Calibri Light" panose="020F0302020204030204"/>
+        <a:latin typeface="Calibri Light"/>
         <a:ea typeface=""/>
         <a:cs typeface=""/>
         <a:font script="Jpan" typeface="游ゴシック Light"/>
@@ -16756,7 +17299,7 @@
         <a:font script="Tfng" typeface="Ebrima"/>
       </a:majorFont>
       <a:minorFont>
-        <a:latin typeface="Calibri" panose="020F0502020204030204"/>
+        <a:latin typeface="Calibri"/>
         <a:ea typeface=""/>
         <a:cs typeface=""/>
         <a:font script="Jpan" typeface="游ゴシック"/>
@@ -16950,7 +17493,7 @@
   <a:extraClrSchemeLst/>
   <a:extLst>
     <a:ext uri="{05A4C25C-085E-4340-85A3-A5531E510DB2}">
-      <thm15:themeFamily xmlns:thm15="http://schemas.microsoft.com/office/thememl/2012/main" name="Office Theme" id="{62F939B6-93AF-4DB8-9C6B-D6C7DFDC589F}" vid="{4A3C46E8-61CC-4603-A589-7422A47A8E4A}"/>
+      <thm15:themeFamily xmlns:thm15="http://schemas.microsoft.com/office/thememl/2012/main" xmlns="" name="Office Theme" id="{62F939B6-93AF-4DB8-9C6B-D6C7DFDC589F}" vid="{4A3C46E8-61CC-4603-A589-7422A47A8E4A}"/>
     </a:ext>
   </a:extLst>
 </a:theme>

</xml_diff>